<commit_message>
PPT Files updated based on Microsoft SME feedback.
</commit_message>
<xml_diff>
--- a/azure-marketplace-workshop/Day 2 - Skilling Deck for Microsoft Marketplace.pptx
+++ b/azure-marketplace-workshop/Day 2 - Skilling Deck for Microsoft Marketplace.pptx
@@ -139,9 +139,7 @@
 <file path=ppt/revisionInfo.xml><?xml version="1.0" encoding="utf-8"?>
 <p1510:revInfo xmlns:a="http://schemas.openxmlformats.org/drawingml/2006/main" xmlns:r="http://schemas.openxmlformats.org/officeDocument/2006/relationships" xmlns:p1510="http://schemas.microsoft.com/office/powerpoint/2015/10/main">
   <p1510:revLst>
-    <p1510:client id="{67AF20B4-6DC7-492D-BA3B-9FCF6F9AD6CF}" v="119" dt="2023-09-15T12:33:18.323"/>
-    <p1510:client id="{71AAC7CB-8687-4658-9B09-DDB30BE95366}" v="376" dt="2023-09-15T13:05:51.954"/>
-    <p1510:client id="{E91C9C7B-BB2D-4AFD-B454-4D10D65794B7}" v="3156" dt="2023-09-14T19:08:05.804"/>
+    <p1510:client id="{E95F42E3-C4F3-474F-B9C2-A0BA12FFF20C}" v="97" dt="2023-11-13T15:46:59.410"/>
   </p1510:revLst>
 </p1510:revInfo>
 </file>
@@ -1089,6 +1087,1417 @@
             <pc:docMk/>
             <pc:sldMk cId="3543320482" sldId="2147470606"/>
             <ac:spMk id="3" creationId="{DDB7FF23-C1F3-ECC1-8CF4-0F54F4733DD3}"/>
+          </ac:spMkLst>
+        </pc:spChg>
+      </pc:sldChg>
+    </pc:docChg>
+  </pc:docChgLst>
+  <pc:docChgLst>
+    <pc:chgData name="Dwayne Natwick" userId="d11f0013982d5c78" providerId="Windows Live" clId="Web-{E91C9C7B-BB2D-4AFD-B454-4D10D65794B7}"/>
+    <pc:docChg chg="addSld delSld modSld sldOrd">
+      <pc:chgData name="Dwayne Natwick" userId="d11f0013982d5c78" providerId="Windows Live" clId="Web-{E91C9C7B-BB2D-4AFD-B454-4D10D65794B7}" dt="2023-09-14T19:08:05.804" v="1664"/>
+      <pc:docMkLst>
+        <pc:docMk/>
+      </pc:docMkLst>
+      <pc:sldChg chg="del">
+        <pc:chgData name="Dwayne Natwick" userId="d11f0013982d5c78" providerId="Windows Live" clId="Web-{E91C9C7B-BB2D-4AFD-B454-4D10D65794B7}" dt="2023-09-14T17:31:17.464" v="0"/>
+        <pc:sldMkLst>
+          <pc:docMk/>
+          <pc:sldMk cId="3164376787" sldId="2076137029"/>
+        </pc:sldMkLst>
+      </pc:sldChg>
+      <pc:sldChg chg="del">
+        <pc:chgData name="Dwayne Natwick" userId="d11f0013982d5c78" providerId="Windows Live" clId="Web-{E91C9C7B-BB2D-4AFD-B454-4D10D65794B7}" dt="2023-09-14T17:31:17.464" v="2"/>
+        <pc:sldMkLst>
+          <pc:docMk/>
+          <pc:sldMk cId="2024722602" sldId="2145705724"/>
+        </pc:sldMkLst>
+      </pc:sldChg>
+      <pc:sldChg chg="del">
+        <pc:chgData name="Dwayne Natwick" userId="d11f0013982d5c78" providerId="Windows Live" clId="Web-{E91C9C7B-BB2D-4AFD-B454-4D10D65794B7}" dt="2023-09-14T17:31:17.464" v="1"/>
+        <pc:sldMkLst>
+          <pc:docMk/>
+          <pc:sldMk cId="682611613" sldId="2147470555"/>
+        </pc:sldMkLst>
+      </pc:sldChg>
+      <pc:sldChg chg="ord">
+        <pc:chgData name="Dwayne Natwick" userId="d11f0013982d5c78" providerId="Windows Live" clId="Web-{E91C9C7B-BB2D-4AFD-B454-4D10D65794B7}" dt="2023-09-14T17:51:26.121" v="590"/>
+        <pc:sldMkLst>
+          <pc:docMk/>
+          <pc:sldMk cId="3682517411" sldId="2147470559"/>
+        </pc:sldMkLst>
+      </pc:sldChg>
+      <pc:sldChg chg="modSp modNotes">
+        <pc:chgData name="Dwayne Natwick" userId="d11f0013982d5c78" providerId="Windows Live" clId="Web-{E91C9C7B-BB2D-4AFD-B454-4D10D65794B7}" dt="2023-09-14T17:42:38.560" v="492"/>
+        <pc:sldMkLst>
+          <pc:docMk/>
+          <pc:sldMk cId="3861986293" sldId="2147470583"/>
+        </pc:sldMkLst>
+        <pc:spChg chg="mod">
+          <ac:chgData name="Dwayne Natwick" userId="d11f0013982d5c78" providerId="Windows Live" clId="Web-{E91C9C7B-BB2D-4AFD-B454-4D10D65794B7}" dt="2023-09-14T17:42:38.560" v="492"/>
+          <ac:spMkLst>
+            <pc:docMk/>
+            <pc:sldMk cId="3861986293" sldId="2147470583"/>
+            <ac:spMk id="4" creationId="{B269E640-ABA6-E084-C63A-7A1C976F25BF}"/>
+          </ac:spMkLst>
+        </pc:spChg>
+      </pc:sldChg>
+      <pc:sldChg chg="delSp modSp new mod ord modClrScheme chgLayout">
+        <pc:chgData name="Dwayne Natwick" userId="d11f0013982d5c78" providerId="Windows Live" clId="Web-{E91C9C7B-BB2D-4AFD-B454-4D10D65794B7}" dt="2023-09-14T17:33:46.078" v="165" actId="20577"/>
+        <pc:sldMkLst>
+          <pc:docMk/>
+          <pc:sldMk cId="2839524364" sldId="2147470607"/>
+        </pc:sldMkLst>
+        <pc:spChg chg="mod ord">
+          <ac:chgData name="Dwayne Natwick" userId="d11f0013982d5c78" providerId="Windows Live" clId="Web-{E91C9C7B-BB2D-4AFD-B454-4D10D65794B7}" dt="2023-09-14T17:31:51.387" v="29" actId="20577"/>
+          <ac:spMkLst>
+            <pc:docMk/>
+            <pc:sldMk cId="2839524364" sldId="2147470607"/>
+            <ac:spMk id="2" creationId="{09C07B8E-14FF-3C2D-BE0E-F25E0D4B4DB3}"/>
+          </ac:spMkLst>
+        </pc:spChg>
+        <pc:spChg chg="mod ord">
+          <ac:chgData name="Dwayne Natwick" userId="d11f0013982d5c78" providerId="Windows Live" clId="Web-{E91C9C7B-BB2D-4AFD-B454-4D10D65794B7}" dt="2023-09-14T17:33:46.078" v="165" actId="20577"/>
+          <ac:spMkLst>
+            <pc:docMk/>
+            <pc:sldMk cId="2839524364" sldId="2147470607"/>
+            <ac:spMk id="3" creationId="{C9D88242-39E7-FD9D-8E94-B07DD53805B5}"/>
+          </ac:spMkLst>
+        </pc:spChg>
+        <pc:spChg chg="del">
+          <ac:chgData name="Dwayne Natwick" userId="d11f0013982d5c78" providerId="Windows Live" clId="Web-{E91C9C7B-BB2D-4AFD-B454-4D10D65794B7}" dt="2023-09-14T17:31:33.340" v="4"/>
+          <ac:spMkLst>
+            <pc:docMk/>
+            <pc:sldMk cId="2839524364" sldId="2147470607"/>
+            <ac:spMk id="4" creationId="{5042A307-8831-D2F5-44AC-94A741452604}"/>
+          </ac:spMkLst>
+        </pc:spChg>
+      </pc:sldChg>
+      <pc:sldChg chg="modSp new">
+        <pc:chgData name="Dwayne Natwick" userId="d11f0013982d5c78" providerId="Windows Live" clId="Web-{E91C9C7B-BB2D-4AFD-B454-4D10D65794B7}" dt="2023-09-14T17:37:51.240" v="443" actId="20577"/>
+        <pc:sldMkLst>
+          <pc:docMk/>
+          <pc:sldMk cId="4086260143" sldId="2147470608"/>
+        </pc:sldMkLst>
+        <pc:spChg chg="mod">
+          <ac:chgData name="Dwayne Natwick" userId="d11f0013982d5c78" providerId="Windows Live" clId="Web-{E91C9C7B-BB2D-4AFD-B454-4D10D65794B7}" dt="2023-09-14T17:34:02.313" v="184" actId="20577"/>
+          <ac:spMkLst>
+            <pc:docMk/>
+            <pc:sldMk cId="4086260143" sldId="2147470608"/>
+            <ac:spMk id="2" creationId="{BA3D571B-B150-1C46-5F05-A09D93B7AE7A}"/>
+          </ac:spMkLst>
+        </pc:spChg>
+        <pc:spChg chg="mod">
+          <ac:chgData name="Dwayne Natwick" userId="d11f0013982d5c78" providerId="Windows Live" clId="Web-{E91C9C7B-BB2D-4AFD-B454-4D10D65794B7}" dt="2023-09-14T17:37:51.240" v="443" actId="20577"/>
+          <ac:spMkLst>
+            <pc:docMk/>
+            <pc:sldMk cId="4086260143" sldId="2147470608"/>
+            <ac:spMk id="3" creationId="{EEA0802F-FB95-E549-566C-5C162DF6AE92}"/>
+          </ac:spMkLst>
+        </pc:spChg>
+      </pc:sldChg>
+      <pc:sldChg chg="addSp delSp modSp new modNotes">
+        <pc:chgData name="Dwayne Natwick" userId="d11f0013982d5c78" providerId="Windows Live" clId="Web-{E91C9C7B-BB2D-4AFD-B454-4D10D65794B7}" dt="2023-09-14T17:40:31.854" v="487" actId="20577"/>
+        <pc:sldMkLst>
+          <pc:docMk/>
+          <pc:sldMk cId="379969417" sldId="2147470609"/>
+        </pc:sldMkLst>
+        <pc:spChg chg="mod">
+          <ac:chgData name="Dwayne Natwick" userId="d11f0013982d5c78" providerId="Windows Live" clId="Web-{E91C9C7B-BB2D-4AFD-B454-4D10D65794B7}" dt="2023-09-14T17:38:02.037" v="449" actId="20577"/>
+          <ac:spMkLst>
+            <pc:docMk/>
+            <pc:sldMk cId="379969417" sldId="2147470609"/>
+            <ac:spMk id="2" creationId="{C144469C-FA2E-89F4-8275-78C7809263F1}"/>
+          </ac:spMkLst>
+        </pc:spChg>
+        <pc:spChg chg="mod">
+          <ac:chgData name="Dwayne Natwick" userId="d11f0013982d5c78" providerId="Windows Live" clId="Web-{E91C9C7B-BB2D-4AFD-B454-4D10D65794B7}" dt="2023-09-14T17:40:31.854" v="487" actId="20577"/>
+          <ac:spMkLst>
+            <pc:docMk/>
+            <pc:sldMk cId="379969417" sldId="2147470609"/>
+            <ac:spMk id="3" creationId="{F3C47606-EBF4-2063-DFC2-36C74BD4FA71}"/>
+          </ac:spMkLst>
+        </pc:spChg>
+        <pc:spChg chg="add del mod">
+          <ac:chgData name="Dwayne Natwick" userId="d11f0013982d5c78" providerId="Windows Live" clId="Web-{E91C9C7B-BB2D-4AFD-B454-4D10D65794B7}" dt="2023-09-14T17:39:56.619" v="477"/>
+          <ac:spMkLst>
+            <pc:docMk/>
+            <pc:sldMk cId="379969417" sldId="2147470609"/>
+            <ac:spMk id="4" creationId="{90CC4371-D359-AE00-7C53-DC23F88881E8}"/>
+          </ac:spMkLst>
+        </pc:spChg>
+        <pc:spChg chg="add del mod">
+          <ac:chgData name="Dwayne Natwick" userId="d11f0013982d5c78" providerId="Windows Live" clId="Web-{E91C9C7B-BB2D-4AFD-B454-4D10D65794B7}" dt="2023-09-14T17:40:24.385" v="483"/>
+          <ac:spMkLst>
+            <pc:docMk/>
+            <pc:sldMk cId="379969417" sldId="2147470609"/>
+            <ac:spMk id="5" creationId="{4209EB24-B1ED-706B-D799-95AD17C92A69}"/>
+          </ac:spMkLst>
+        </pc:spChg>
+      </pc:sldChg>
+      <pc:sldChg chg="modSp new ord">
+        <pc:chgData name="Dwayne Natwick" userId="d11f0013982d5c78" providerId="Windows Live" clId="Web-{E91C9C7B-BB2D-4AFD-B454-4D10D65794B7}" dt="2023-09-14T18:55:40.078" v="1008" actId="20577"/>
+        <pc:sldMkLst>
+          <pc:docMk/>
+          <pc:sldMk cId="1929971971" sldId="2147470610"/>
+        </pc:sldMkLst>
+        <pc:spChg chg="mod">
+          <ac:chgData name="Dwayne Natwick" userId="d11f0013982d5c78" providerId="Windows Live" clId="Web-{E91C9C7B-BB2D-4AFD-B454-4D10D65794B7}" dt="2023-09-14T17:43:54.203" v="519" actId="20577"/>
+          <ac:spMkLst>
+            <pc:docMk/>
+            <pc:sldMk cId="1929971971" sldId="2147470610"/>
+            <ac:spMk id="2" creationId="{105B6354-2028-24B8-66E1-0D45962243CA}"/>
+          </ac:spMkLst>
+        </pc:spChg>
+        <pc:spChg chg="mod">
+          <ac:chgData name="Dwayne Natwick" userId="d11f0013982d5c78" providerId="Windows Live" clId="Web-{E91C9C7B-BB2D-4AFD-B454-4D10D65794B7}" dt="2023-09-14T18:55:40.078" v="1008" actId="20577"/>
+          <ac:spMkLst>
+            <pc:docMk/>
+            <pc:sldMk cId="1929971971" sldId="2147470610"/>
+            <ac:spMk id="3" creationId="{7407A4C3-86E5-EFE8-1E18-DC50FF22703B}"/>
+          </ac:spMkLst>
+        </pc:spChg>
+      </pc:sldChg>
+      <pc:sldChg chg="delSp modSp new mod modClrScheme chgLayout">
+        <pc:chgData name="Dwayne Natwick" userId="d11f0013982d5c78" providerId="Windows Live" clId="Web-{E91C9C7B-BB2D-4AFD-B454-4D10D65794B7}" dt="2023-09-14T17:56:40.582" v="716" actId="20577"/>
+        <pc:sldMkLst>
+          <pc:docMk/>
+          <pc:sldMk cId="2421521076" sldId="2147470611"/>
+        </pc:sldMkLst>
+        <pc:spChg chg="mod ord">
+          <ac:chgData name="Dwayne Natwick" userId="d11f0013982d5c78" providerId="Windows Live" clId="Web-{E91C9C7B-BB2D-4AFD-B454-4D10D65794B7}" dt="2023-09-14T17:46:12.159" v="549" actId="20577"/>
+          <ac:spMkLst>
+            <pc:docMk/>
+            <pc:sldMk cId="2421521076" sldId="2147470611"/>
+            <ac:spMk id="2" creationId="{0F4D640B-8499-E0C5-C508-35266E13B6E6}"/>
+          </ac:spMkLst>
+        </pc:spChg>
+        <pc:spChg chg="mod ord">
+          <ac:chgData name="Dwayne Natwick" userId="d11f0013982d5c78" providerId="Windows Live" clId="Web-{E91C9C7B-BB2D-4AFD-B454-4D10D65794B7}" dt="2023-09-14T17:56:40.582" v="716" actId="20577"/>
+          <ac:spMkLst>
+            <pc:docMk/>
+            <pc:sldMk cId="2421521076" sldId="2147470611"/>
+            <ac:spMk id="3" creationId="{358EA097-101A-43CC-781A-E0E92A4D22E7}"/>
+          </ac:spMkLst>
+        </pc:spChg>
+        <pc:spChg chg="del">
+          <ac:chgData name="Dwayne Natwick" userId="d11f0013982d5c78" providerId="Windows Live" clId="Web-{E91C9C7B-BB2D-4AFD-B454-4D10D65794B7}" dt="2023-09-14T17:45:27.769" v="522"/>
+          <ac:spMkLst>
+            <pc:docMk/>
+            <pc:sldMk cId="2421521076" sldId="2147470611"/>
+            <ac:spMk id="4" creationId="{9F2C3E0F-6202-6F36-75C7-7F943D05D8A4}"/>
+          </ac:spMkLst>
+        </pc:spChg>
+      </pc:sldChg>
+      <pc:sldChg chg="addSp modSp new">
+        <pc:chgData name="Dwayne Natwick" userId="d11f0013982d5c78" providerId="Windows Live" clId="Web-{E91C9C7B-BB2D-4AFD-B454-4D10D65794B7}" dt="2023-09-14T18:53:57.232" v="890" actId="20577"/>
+        <pc:sldMkLst>
+          <pc:docMk/>
+          <pc:sldMk cId="2524577050" sldId="2147470612"/>
+        </pc:sldMkLst>
+        <pc:spChg chg="mod">
+          <ac:chgData name="Dwayne Natwick" userId="d11f0013982d5c78" providerId="Windows Live" clId="Web-{E91C9C7B-BB2D-4AFD-B454-4D10D65794B7}" dt="2023-09-14T18:53:57.232" v="890" actId="20577"/>
+          <ac:spMkLst>
+            <pc:docMk/>
+            <pc:sldMk cId="2524577050" sldId="2147470612"/>
+            <ac:spMk id="2" creationId="{CDF7A4E4-C3FF-9DA3-1E01-6E7681781D01}"/>
+          </ac:spMkLst>
+        </pc:spChg>
+        <pc:spChg chg="mod">
+          <ac:chgData name="Dwayne Natwick" userId="d11f0013982d5c78" providerId="Windows Live" clId="Web-{E91C9C7B-BB2D-4AFD-B454-4D10D65794B7}" dt="2023-09-14T17:52:29.669" v="601" actId="20577"/>
+          <ac:spMkLst>
+            <pc:docMk/>
+            <pc:sldMk cId="2524577050" sldId="2147470612"/>
+            <ac:spMk id="3" creationId="{675F152E-D720-B366-A514-0FB945F73594}"/>
+          </ac:spMkLst>
+        </pc:spChg>
+        <pc:spChg chg="add mod">
+          <ac:chgData name="Dwayne Natwick" userId="d11f0013982d5c78" providerId="Windows Live" clId="Web-{E91C9C7B-BB2D-4AFD-B454-4D10D65794B7}" dt="2023-09-14T17:52:43.216" v="605" actId="1076"/>
+          <ac:spMkLst>
+            <pc:docMk/>
+            <pc:sldMk cId="2524577050" sldId="2147470612"/>
+            <ac:spMk id="4" creationId="{57240181-C93A-F4E8-472C-1AF0F2C2A855}"/>
+          </ac:spMkLst>
+        </pc:spChg>
+        <pc:spChg chg="add mod">
+          <ac:chgData name="Dwayne Natwick" userId="d11f0013982d5c78" providerId="Windows Live" clId="Web-{E91C9C7B-BB2D-4AFD-B454-4D10D65794B7}" dt="2023-09-14T17:54:08.515" v="611" actId="1076"/>
+          <ac:spMkLst>
+            <pc:docMk/>
+            <pc:sldMk cId="2524577050" sldId="2147470612"/>
+            <ac:spMk id="5" creationId="{D3A447DE-6903-1590-61FB-AB160302D80B}"/>
+          </ac:spMkLst>
+        </pc:spChg>
+        <pc:spChg chg="add mod">
+          <ac:chgData name="Dwayne Natwick" userId="d11f0013982d5c78" providerId="Windows Live" clId="Web-{E91C9C7B-BB2D-4AFD-B454-4D10D65794B7}" dt="2023-09-14T17:54:29.157" v="615" actId="1076"/>
+          <ac:spMkLst>
+            <pc:docMk/>
+            <pc:sldMk cId="2524577050" sldId="2147470612"/>
+            <ac:spMk id="6" creationId="{520C77B9-C55A-8B6C-DC16-CEE27B62CD45}"/>
+          </ac:spMkLst>
+        </pc:spChg>
+        <pc:spChg chg="add mod">
+          <ac:chgData name="Dwayne Natwick" userId="d11f0013982d5c78" providerId="Windows Live" clId="Web-{E91C9C7B-BB2D-4AFD-B454-4D10D65794B7}" dt="2023-09-14T17:54:58.704" v="620" actId="14100"/>
+          <ac:spMkLst>
+            <pc:docMk/>
+            <pc:sldMk cId="2524577050" sldId="2147470612"/>
+            <ac:spMk id="7" creationId="{C25B8EDA-4C77-A71B-612F-D5F8559DF688}"/>
+          </ac:spMkLst>
+        </pc:spChg>
+      </pc:sldChg>
+      <pc:sldChg chg="addSp delSp modSp new mod modClrScheme chgLayout modNotes">
+        <pc:chgData name="Dwayne Natwick" userId="d11f0013982d5c78" providerId="Windows Live" clId="Web-{E91C9C7B-BB2D-4AFD-B454-4D10D65794B7}" dt="2023-09-14T18:49:56.021" v="875"/>
+        <pc:sldMkLst>
+          <pc:docMk/>
+          <pc:sldMk cId="848203549" sldId="2147470613"/>
+        </pc:sldMkLst>
+        <pc:spChg chg="mod">
+          <ac:chgData name="Dwayne Natwick" userId="d11f0013982d5c78" providerId="Windows Live" clId="Web-{E91C9C7B-BB2D-4AFD-B454-4D10D65794B7}" dt="2023-09-14T18:49:22.770" v="864"/>
+          <ac:spMkLst>
+            <pc:docMk/>
+            <pc:sldMk cId="848203549" sldId="2147470613"/>
+            <ac:spMk id="2" creationId="{63644AF7-A23F-1DD9-6E3C-EE7368917D77}"/>
+          </ac:spMkLst>
+        </pc:spChg>
+        <pc:spChg chg="mod">
+          <ac:chgData name="Dwayne Natwick" userId="d11f0013982d5c78" providerId="Windows Live" clId="Web-{E91C9C7B-BB2D-4AFD-B454-4D10D65794B7}" dt="2023-09-14T18:49:35.833" v="868" actId="14100"/>
+          <ac:spMkLst>
+            <pc:docMk/>
+            <pc:sldMk cId="848203549" sldId="2147470613"/>
+            <ac:spMk id="3" creationId="{2E50BA7C-3255-BC69-812B-892217F5D36D}"/>
+          </ac:spMkLst>
+        </pc:spChg>
+        <pc:spChg chg="add del mod">
+          <ac:chgData name="Dwayne Natwick" userId="d11f0013982d5c78" providerId="Windows Live" clId="Web-{E91C9C7B-BB2D-4AFD-B454-4D10D65794B7}" dt="2023-09-14T18:49:56.021" v="875"/>
+          <ac:spMkLst>
+            <pc:docMk/>
+            <pc:sldMk cId="848203549" sldId="2147470613"/>
+            <ac:spMk id="5" creationId="{922D9E5B-053B-2662-2AD3-E7F26E827B71}"/>
+          </ac:spMkLst>
+        </pc:spChg>
+        <pc:picChg chg="add mod">
+          <ac:chgData name="Dwayne Natwick" userId="d11f0013982d5c78" providerId="Windows Live" clId="Web-{E91C9C7B-BB2D-4AFD-B454-4D10D65794B7}" dt="2023-09-14T18:49:22.770" v="864"/>
+          <ac:picMkLst>
+            <pc:docMk/>
+            <pc:sldMk cId="848203549" sldId="2147470613"/>
+            <ac:picMk id="4" creationId="{D26C38C8-22B0-0868-2D0E-669BDC2059B1}"/>
+          </ac:picMkLst>
+        </pc:picChg>
+      </pc:sldChg>
+      <pc:sldChg chg="addSp delSp modSp new modNotes">
+        <pc:chgData name="Dwayne Natwick" userId="d11f0013982d5c78" providerId="Windows Live" clId="Web-{E91C9C7B-BB2D-4AFD-B454-4D10D65794B7}" dt="2023-09-14T18:57:11.581" v="1105"/>
+        <pc:sldMkLst>
+          <pc:docMk/>
+          <pc:sldMk cId="3770102974" sldId="2147470614"/>
+        </pc:sldMkLst>
+        <pc:spChg chg="mod">
+          <ac:chgData name="Dwayne Natwick" userId="d11f0013982d5c78" providerId="Windows Live" clId="Web-{E91C9C7B-BB2D-4AFD-B454-4D10D65794B7}" dt="2023-09-14T18:54:08.513" v="904" actId="20577"/>
+          <ac:spMkLst>
+            <pc:docMk/>
+            <pc:sldMk cId="3770102974" sldId="2147470614"/>
+            <ac:spMk id="2" creationId="{CFCF5E71-8482-5C4A-1937-62180CED69B1}"/>
+          </ac:spMkLst>
+        </pc:spChg>
+        <pc:spChg chg="mod">
+          <ac:chgData name="Dwayne Natwick" userId="d11f0013982d5c78" providerId="Windows Live" clId="Web-{E91C9C7B-BB2D-4AFD-B454-4D10D65794B7}" dt="2023-09-14T18:56:47.659" v="1101" actId="20577"/>
+          <ac:spMkLst>
+            <pc:docMk/>
+            <pc:sldMk cId="3770102974" sldId="2147470614"/>
+            <ac:spMk id="3" creationId="{2E8F6CC6-DEE5-E7CD-0610-AF173BD7F8EC}"/>
+          </ac:spMkLst>
+        </pc:spChg>
+        <pc:spChg chg="add del mod">
+          <ac:chgData name="Dwayne Natwick" userId="d11f0013982d5c78" providerId="Windows Live" clId="Web-{E91C9C7B-BB2D-4AFD-B454-4D10D65794B7}" dt="2023-09-14T18:57:11.581" v="1105"/>
+          <ac:spMkLst>
+            <pc:docMk/>
+            <pc:sldMk cId="3770102974" sldId="2147470614"/>
+            <ac:spMk id="4" creationId="{F59A0AD9-2731-F101-8A88-A97CEEED7C5D}"/>
+          </ac:spMkLst>
+        </pc:spChg>
+      </pc:sldChg>
+      <pc:sldChg chg="addSp delSp modSp new mod chgLayout">
+        <pc:chgData name="Dwayne Natwick" userId="d11f0013982d5c78" providerId="Windows Live" clId="Web-{E91C9C7B-BB2D-4AFD-B454-4D10D65794B7}" dt="2023-09-14T18:57:20.347" v="1109"/>
+        <pc:sldMkLst>
+          <pc:docMk/>
+          <pc:sldMk cId="3933044535" sldId="2147470615"/>
+        </pc:sldMkLst>
+        <pc:spChg chg="mod ord">
+          <ac:chgData name="Dwayne Natwick" userId="d11f0013982d5c78" providerId="Windows Live" clId="Web-{E91C9C7B-BB2D-4AFD-B454-4D10D65794B7}" dt="2023-09-14T18:50:45.163" v="882" actId="20577"/>
+          <ac:spMkLst>
+            <pc:docMk/>
+            <pc:sldMk cId="3933044535" sldId="2147470615"/>
+            <ac:spMk id="2" creationId="{EDF87A23-46AF-F5CE-1408-BC8C91B71A9B}"/>
+          </ac:spMkLst>
+        </pc:spChg>
+        <pc:spChg chg="del">
+          <ac:chgData name="Dwayne Natwick" userId="d11f0013982d5c78" providerId="Windows Live" clId="Web-{E91C9C7B-BB2D-4AFD-B454-4D10D65794B7}" dt="2023-09-14T18:50:39.101" v="878"/>
+          <ac:spMkLst>
+            <pc:docMk/>
+            <pc:sldMk cId="3933044535" sldId="2147470615"/>
+            <ac:spMk id="3" creationId="{884F335E-7FF2-0DF4-80B1-93DACA319859}"/>
+          </ac:spMkLst>
+        </pc:spChg>
+        <pc:spChg chg="add del mod">
+          <ac:chgData name="Dwayne Natwick" userId="d11f0013982d5c78" providerId="Windows Live" clId="Web-{E91C9C7B-BB2D-4AFD-B454-4D10D65794B7}" dt="2023-09-14T18:57:20.347" v="1109"/>
+          <ac:spMkLst>
+            <pc:docMk/>
+            <pc:sldMk cId="3933044535" sldId="2147470615"/>
+            <ac:spMk id="4" creationId="{86024C3E-11CA-B130-F720-2EDCEA10853F}"/>
+          </ac:spMkLst>
+        </pc:spChg>
+      </pc:sldChg>
+      <pc:sldChg chg="add replId">
+        <pc:chgData name="Dwayne Natwick" userId="d11f0013982d5c78" providerId="Windows Live" clId="Web-{E91C9C7B-BB2D-4AFD-B454-4D10D65794B7}" dt="2023-09-14T18:51:18.305" v="883"/>
+        <pc:sldMkLst>
+          <pc:docMk/>
+          <pc:sldMk cId="3921617707" sldId="2147470616"/>
+        </pc:sldMkLst>
+      </pc:sldChg>
+      <pc:sldChg chg="modSp add replId">
+        <pc:chgData name="Dwayne Natwick" userId="d11f0013982d5c78" providerId="Windows Live" clId="Web-{E91C9C7B-BB2D-4AFD-B454-4D10D65794B7}" dt="2023-09-14T18:51:54.634" v="887" actId="20577"/>
+        <pc:sldMkLst>
+          <pc:docMk/>
+          <pc:sldMk cId="1753990868" sldId="2147470617"/>
+        </pc:sldMkLst>
+        <pc:spChg chg="mod">
+          <ac:chgData name="Dwayne Natwick" userId="d11f0013982d5c78" providerId="Windows Live" clId="Web-{E91C9C7B-BB2D-4AFD-B454-4D10D65794B7}" dt="2023-09-14T18:51:54.634" v="887" actId="20577"/>
+          <ac:spMkLst>
+            <pc:docMk/>
+            <pc:sldMk cId="1753990868" sldId="2147470617"/>
+            <ac:spMk id="2" creationId="{EDF87A23-46AF-F5CE-1408-BC8C91B71A9B}"/>
+          </ac:spMkLst>
+        </pc:spChg>
+      </pc:sldChg>
+      <pc:sldChg chg="add replId">
+        <pc:chgData name="Dwayne Natwick" userId="d11f0013982d5c78" providerId="Windows Live" clId="Web-{E91C9C7B-BB2D-4AFD-B454-4D10D65794B7}" dt="2023-09-14T18:52:16.213" v="888"/>
+        <pc:sldMkLst>
+          <pc:docMk/>
+          <pc:sldMk cId="3572404749" sldId="2147470618"/>
+        </pc:sldMkLst>
+      </pc:sldChg>
+      <pc:sldChg chg="modSp new mod chgLayout">
+        <pc:chgData name="Dwayne Natwick" userId="d11f0013982d5c78" providerId="Windows Live" clId="Web-{E91C9C7B-BB2D-4AFD-B454-4D10D65794B7}" dt="2023-09-14T18:57:44.895" v="1139" actId="20577"/>
+        <pc:sldMkLst>
+          <pc:docMk/>
+          <pc:sldMk cId="2409884957" sldId="2147470619"/>
+        </pc:sldMkLst>
+        <pc:spChg chg="mod ord">
+          <ac:chgData name="Dwayne Natwick" userId="d11f0013982d5c78" providerId="Windows Live" clId="Web-{E91C9C7B-BB2D-4AFD-B454-4D10D65794B7}" dt="2023-09-14T18:57:44.895" v="1139" actId="20577"/>
+          <ac:spMkLst>
+            <pc:docMk/>
+            <pc:sldMk cId="2409884957" sldId="2147470619"/>
+            <ac:spMk id="2" creationId="{DD98F413-FA4A-5DAC-66E1-E02E10AE53D2}"/>
+          </ac:spMkLst>
+        </pc:spChg>
+      </pc:sldChg>
+      <pc:sldChg chg="modSp new">
+        <pc:chgData name="Dwayne Natwick" userId="d11f0013982d5c78" providerId="Windows Live" clId="Web-{E91C9C7B-BB2D-4AFD-B454-4D10D65794B7}" dt="2023-09-14T19:03:13.373" v="1632" actId="20577"/>
+        <pc:sldMkLst>
+          <pc:docMk/>
+          <pc:sldMk cId="3776730813" sldId="2147470620"/>
+        </pc:sldMkLst>
+        <pc:spChg chg="mod">
+          <ac:chgData name="Dwayne Natwick" userId="d11f0013982d5c78" providerId="Windows Live" clId="Web-{E91C9C7B-BB2D-4AFD-B454-4D10D65794B7}" dt="2023-09-14T18:57:56.348" v="1142" actId="20577"/>
+          <ac:spMkLst>
+            <pc:docMk/>
+            <pc:sldMk cId="3776730813" sldId="2147470620"/>
+            <ac:spMk id="2" creationId="{B98733DD-1422-5649-B7EC-6C22F68294E7}"/>
+          </ac:spMkLst>
+        </pc:spChg>
+        <pc:spChg chg="mod">
+          <ac:chgData name="Dwayne Natwick" userId="d11f0013982d5c78" providerId="Windows Live" clId="Web-{E91C9C7B-BB2D-4AFD-B454-4D10D65794B7}" dt="2023-09-14T19:03:13.373" v="1632" actId="20577"/>
+          <ac:spMkLst>
+            <pc:docMk/>
+            <pc:sldMk cId="3776730813" sldId="2147470620"/>
+            <ac:spMk id="3" creationId="{6877C1DD-3080-4AEC-3E55-CF8ED035D114}"/>
+          </ac:spMkLst>
+        </pc:spChg>
+      </pc:sldChg>
+      <pc:sldChg chg="addSp delSp modSp new modNotes">
+        <pc:chgData name="Dwayne Natwick" userId="d11f0013982d5c78" providerId="Windows Live" clId="Web-{E91C9C7B-BB2D-4AFD-B454-4D10D65794B7}" dt="2023-09-14T19:08:05.804" v="1664"/>
+        <pc:sldMkLst>
+          <pc:docMk/>
+          <pc:sldMk cId="1675599562" sldId="2147470621"/>
+        </pc:sldMkLst>
+        <pc:spChg chg="mod">
+          <ac:chgData name="Dwayne Natwick" userId="d11f0013982d5c78" providerId="Windows Live" clId="Web-{E91C9C7B-BB2D-4AFD-B454-4D10D65794B7}" dt="2023-09-14T19:03:28.920" v="1644" actId="20577"/>
+          <ac:spMkLst>
+            <pc:docMk/>
+            <pc:sldMk cId="1675599562" sldId="2147470621"/>
+            <ac:spMk id="2" creationId="{4F2E3601-0348-0AC8-926D-2963A6EBDE54}"/>
+          </ac:spMkLst>
+        </pc:spChg>
+        <pc:spChg chg="mod">
+          <ac:chgData name="Dwayne Natwick" userId="d11f0013982d5c78" providerId="Windows Live" clId="Web-{E91C9C7B-BB2D-4AFD-B454-4D10D65794B7}" dt="2023-09-14T19:03:35.499" v="1647" actId="20577"/>
+          <ac:spMkLst>
+            <pc:docMk/>
+            <pc:sldMk cId="1675599562" sldId="2147470621"/>
+            <ac:spMk id="3" creationId="{226A9B3B-731B-E601-049B-025098728B19}"/>
+          </ac:spMkLst>
+        </pc:spChg>
+        <pc:spChg chg="add del mod">
+          <ac:chgData name="Dwayne Natwick" userId="d11f0013982d5c78" providerId="Windows Live" clId="Web-{E91C9C7B-BB2D-4AFD-B454-4D10D65794B7}" dt="2023-09-14T19:08:05.804" v="1664"/>
+          <ac:spMkLst>
+            <pc:docMk/>
+            <pc:sldMk cId="1675599562" sldId="2147470621"/>
+            <ac:spMk id="4" creationId="{475DAF6E-27CB-D2FC-04C5-770BF18601CB}"/>
+          </ac:spMkLst>
+        </pc:spChg>
+      </pc:sldChg>
+      <pc:sldChg chg="addSp modSp new modNotes">
+        <pc:chgData name="Dwayne Natwick" userId="d11f0013982d5c78" providerId="Windows Live" clId="Web-{E91C9C7B-BB2D-4AFD-B454-4D10D65794B7}" dt="2023-09-14T19:04:44.751" v="1660" actId="1076"/>
+        <pc:sldMkLst>
+          <pc:docMk/>
+          <pc:sldMk cId="4211696148" sldId="2147470622"/>
+        </pc:sldMkLst>
+        <pc:spChg chg="mod">
+          <ac:chgData name="Dwayne Natwick" userId="d11f0013982d5c78" providerId="Windows Live" clId="Web-{E91C9C7B-BB2D-4AFD-B454-4D10D65794B7}" dt="2023-09-14T19:04:26.719" v="1655" actId="20577"/>
+          <ac:spMkLst>
+            <pc:docMk/>
+            <pc:sldMk cId="4211696148" sldId="2147470622"/>
+            <ac:spMk id="2" creationId="{BFA64A8C-98C4-0EC5-C359-C3F08F09CCD2}"/>
+          </ac:spMkLst>
+        </pc:spChg>
+        <pc:spChg chg="add mod">
+          <ac:chgData name="Dwayne Natwick" userId="d11f0013982d5c78" providerId="Windows Live" clId="Web-{E91C9C7B-BB2D-4AFD-B454-4D10D65794B7}" dt="2023-09-14T19:04:44.751" v="1660" actId="1076"/>
+          <ac:spMkLst>
+            <pc:docMk/>
+            <pc:sldMk cId="4211696148" sldId="2147470622"/>
+            <ac:spMk id="4" creationId="{894C4432-C891-B2F2-36B5-DC9ABE788A25}"/>
+          </ac:spMkLst>
+        </pc:spChg>
+      </pc:sldChg>
+    </pc:docChg>
+  </pc:docChgLst>
+  <pc:docChgLst>
+    <pc:chgData name="Dwayne Natwick" userId="3561b13b-c7da-4a5b-9614-8a4db83ccfee" providerId="ADAL" clId="{E95F42E3-C4F3-474F-B9C2-A0BA12FFF20C}"/>
+    <pc:docChg chg="modSld">
+      <pc:chgData name="Dwayne Natwick" userId="3561b13b-c7da-4a5b-9614-8a4db83ccfee" providerId="ADAL" clId="{E95F42E3-C4F3-474F-B9C2-A0BA12FFF20C}" dt="2023-11-13T15:49:05.045" v="211" actId="1076"/>
+      <pc:docMkLst>
+        <pc:docMk/>
+      </pc:docMkLst>
+      <pc:sldChg chg="modSp mod">
+        <pc:chgData name="Dwayne Natwick" userId="3561b13b-c7da-4a5b-9614-8a4db83ccfee" providerId="ADAL" clId="{E95F42E3-C4F3-474F-B9C2-A0BA12FFF20C}" dt="2023-11-13T15:43:05.223" v="9" actId="20577"/>
+        <pc:sldMkLst>
+          <pc:docMk/>
+          <pc:sldMk cId="19297968" sldId="2147470553"/>
+        </pc:sldMkLst>
+        <pc:spChg chg="mod">
+          <ac:chgData name="Dwayne Natwick" userId="3561b13b-c7da-4a5b-9614-8a4db83ccfee" providerId="ADAL" clId="{E95F42E3-C4F3-474F-B9C2-A0BA12FFF20C}" dt="2023-11-13T15:43:05.223" v="9" actId="20577"/>
+          <ac:spMkLst>
+            <pc:docMk/>
+            <pc:sldMk cId="19297968" sldId="2147470553"/>
+            <ac:spMk id="2" creationId="{A1A8D485-FD33-2DA7-238E-EDF73027901B}"/>
+          </ac:spMkLst>
+        </pc:spChg>
+      </pc:sldChg>
+      <pc:sldChg chg="modSp mod">
+        <pc:chgData name="Dwayne Natwick" userId="3561b13b-c7da-4a5b-9614-8a4db83ccfee" providerId="ADAL" clId="{E95F42E3-C4F3-474F-B9C2-A0BA12FFF20C}" dt="2023-11-13T15:43:14.229" v="13" actId="6549"/>
+        <pc:sldMkLst>
+          <pc:docMk/>
+          <pc:sldMk cId="2945821040" sldId="2147470557"/>
+        </pc:sldMkLst>
+        <pc:spChg chg="mod">
+          <ac:chgData name="Dwayne Natwick" userId="3561b13b-c7da-4a5b-9614-8a4db83ccfee" providerId="ADAL" clId="{E95F42E3-C4F3-474F-B9C2-A0BA12FFF20C}" dt="2023-11-13T15:43:09.079" v="10" actId="6549"/>
+          <ac:spMkLst>
+            <pc:docMk/>
+            <pc:sldMk cId="2945821040" sldId="2147470557"/>
+            <ac:spMk id="6" creationId="{34C8A714-55EC-40AC-B65A-1F994DEC5152}"/>
+          </ac:spMkLst>
+        </pc:spChg>
+        <pc:spChg chg="mod">
+          <ac:chgData name="Dwayne Natwick" userId="3561b13b-c7da-4a5b-9614-8a4db83ccfee" providerId="ADAL" clId="{E95F42E3-C4F3-474F-B9C2-A0BA12FFF20C}" dt="2023-11-13T15:43:10.559" v="11" actId="6549"/>
+          <ac:spMkLst>
+            <pc:docMk/>
+            <pc:sldMk cId="2945821040" sldId="2147470557"/>
+            <ac:spMk id="28" creationId="{C9EAB225-5AB7-686B-2B0B-5A0DA0699DAA}"/>
+          </ac:spMkLst>
+        </pc:spChg>
+        <pc:spChg chg="mod">
+          <ac:chgData name="Dwayne Natwick" userId="3561b13b-c7da-4a5b-9614-8a4db83ccfee" providerId="ADAL" clId="{E95F42E3-C4F3-474F-B9C2-A0BA12FFF20C}" dt="2023-11-13T15:43:12.511" v="12" actId="6549"/>
+          <ac:spMkLst>
+            <pc:docMk/>
+            <pc:sldMk cId="2945821040" sldId="2147470557"/>
+            <ac:spMk id="31" creationId="{396F3C3E-06A6-C7C0-E225-74DAE937B4B6}"/>
+          </ac:spMkLst>
+        </pc:spChg>
+        <pc:spChg chg="mod">
+          <ac:chgData name="Dwayne Natwick" userId="3561b13b-c7da-4a5b-9614-8a4db83ccfee" providerId="ADAL" clId="{E95F42E3-C4F3-474F-B9C2-A0BA12FFF20C}" dt="2023-11-13T15:43:14.229" v="13" actId="6549"/>
+          <ac:spMkLst>
+            <pc:docMk/>
+            <pc:sldMk cId="2945821040" sldId="2147470557"/>
+            <ac:spMk id="34" creationId="{A53BEA30-32DF-F647-94E1-F0D90C6E0D13}"/>
+          </ac:spMkLst>
+        </pc:spChg>
+      </pc:sldChg>
+      <pc:sldChg chg="modSp mod">
+        <pc:chgData name="Dwayne Natwick" userId="3561b13b-c7da-4a5b-9614-8a4db83ccfee" providerId="ADAL" clId="{E95F42E3-C4F3-474F-B9C2-A0BA12FFF20C}" dt="2023-11-13T15:43:38.915" v="20" actId="20577"/>
+        <pc:sldMkLst>
+          <pc:docMk/>
+          <pc:sldMk cId="3682517411" sldId="2147470559"/>
+        </pc:sldMkLst>
+        <pc:graphicFrameChg chg="modGraphic">
+          <ac:chgData name="Dwayne Natwick" userId="3561b13b-c7da-4a5b-9614-8a4db83ccfee" providerId="ADAL" clId="{E95F42E3-C4F3-474F-B9C2-A0BA12FFF20C}" dt="2023-11-13T15:43:24.912" v="16" actId="6549"/>
+          <ac:graphicFrameMkLst>
+            <pc:docMk/>
+            <pc:sldMk cId="3682517411" sldId="2147470559"/>
+            <ac:graphicFrameMk id="8" creationId="{CC919F4A-A7D9-8DDD-DB16-BF7FF8DD9E3B}"/>
+          </ac:graphicFrameMkLst>
+        </pc:graphicFrameChg>
+        <pc:graphicFrameChg chg="modGraphic">
+          <ac:chgData name="Dwayne Natwick" userId="3561b13b-c7da-4a5b-9614-8a4db83ccfee" providerId="ADAL" clId="{E95F42E3-C4F3-474F-B9C2-A0BA12FFF20C}" dt="2023-11-13T15:43:38.915" v="20" actId="20577"/>
+          <ac:graphicFrameMkLst>
+            <pc:docMk/>
+            <pc:sldMk cId="3682517411" sldId="2147470559"/>
+            <ac:graphicFrameMk id="11" creationId="{A52E73B0-7A2A-ED30-FEF2-D5B76028305D}"/>
+          </ac:graphicFrameMkLst>
+        </pc:graphicFrameChg>
+      </pc:sldChg>
+      <pc:sldChg chg="modSp mod">
+        <pc:chgData name="Dwayne Natwick" userId="3561b13b-c7da-4a5b-9614-8a4db83ccfee" providerId="ADAL" clId="{E95F42E3-C4F3-474F-B9C2-A0BA12FFF20C}" dt="2023-11-13T15:49:05.045" v="211" actId="1076"/>
+        <pc:sldMkLst>
+          <pc:docMk/>
+          <pc:sldMk cId="1307574574" sldId="2147470566"/>
+        </pc:sldMkLst>
+        <pc:spChg chg="mod">
+          <ac:chgData name="Dwayne Natwick" userId="3561b13b-c7da-4a5b-9614-8a4db83ccfee" providerId="ADAL" clId="{E95F42E3-C4F3-474F-B9C2-A0BA12FFF20C}" dt="2023-11-13T15:48:34.760" v="171" actId="20577"/>
+          <ac:spMkLst>
+            <pc:docMk/>
+            <pc:sldMk cId="1307574574" sldId="2147470566"/>
+            <ac:spMk id="18" creationId="{7D66421A-6C08-23BB-D770-A2A0FF91DD1C}"/>
+          </ac:spMkLst>
+        </pc:spChg>
+        <pc:spChg chg="mod">
+          <ac:chgData name="Dwayne Natwick" userId="3561b13b-c7da-4a5b-9614-8a4db83ccfee" providerId="ADAL" clId="{E95F42E3-C4F3-474F-B9C2-A0BA12FFF20C}" dt="2023-11-13T15:48:53.404" v="210" actId="20577"/>
+          <ac:spMkLst>
+            <pc:docMk/>
+            <pc:sldMk cId="1307574574" sldId="2147470566"/>
+            <ac:spMk id="21" creationId="{87ACA6E9-9681-99AA-65E6-65303BA5F10F}"/>
+          </ac:spMkLst>
+        </pc:spChg>
+        <pc:spChg chg="mod">
+          <ac:chgData name="Dwayne Natwick" userId="3561b13b-c7da-4a5b-9614-8a4db83ccfee" providerId="ADAL" clId="{E95F42E3-C4F3-474F-B9C2-A0BA12FFF20C}" dt="2023-11-13T15:48:07.871" v="154" actId="6549"/>
+          <ac:spMkLst>
+            <pc:docMk/>
+            <pc:sldMk cId="1307574574" sldId="2147470566"/>
+            <ac:spMk id="24" creationId="{86B4A3BC-B5A8-2BE0-1133-3BA9CB7EDFAB}"/>
+          </ac:spMkLst>
+        </pc:spChg>
+        <pc:spChg chg="mod">
+          <ac:chgData name="Dwayne Natwick" userId="3561b13b-c7da-4a5b-9614-8a4db83ccfee" providerId="ADAL" clId="{E95F42E3-C4F3-474F-B9C2-A0BA12FFF20C}" dt="2023-11-13T15:48:02.882" v="153" actId="20577"/>
+          <ac:spMkLst>
+            <pc:docMk/>
+            <pc:sldMk cId="1307574574" sldId="2147470566"/>
+            <ac:spMk id="27" creationId="{9ADD736A-323E-6575-0C10-C5BD32DE5235}"/>
+          </ac:spMkLst>
+        </pc:spChg>
+        <pc:grpChg chg="mod">
+          <ac:chgData name="Dwayne Natwick" userId="3561b13b-c7da-4a5b-9614-8a4db83ccfee" providerId="ADAL" clId="{E95F42E3-C4F3-474F-B9C2-A0BA12FFF20C}" dt="2023-11-13T15:49:05.045" v="211" actId="1076"/>
+          <ac:grpSpMkLst>
+            <pc:docMk/>
+            <pc:sldMk cId="1307574574" sldId="2147470566"/>
+            <ac:grpSpMk id="23" creationId="{9A24B8EE-D560-1520-6402-D508AEA160A5}"/>
+          </ac:grpSpMkLst>
+        </pc:grpChg>
+      </pc:sldChg>
+      <pc:sldChg chg="modSp mod">
+        <pc:chgData name="Dwayne Natwick" userId="3561b13b-c7da-4a5b-9614-8a4db83ccfee" providerId="ADAL" clId="{E95F42E3-C4F3-474F-B9C2-A0BA12FFF20C}" dt="2023-11-13T15:43:19.725" v="14" actId="6549"/>
+        <pc:sldMkLst>
+          <pc:docMk/>
+          <pc:sldMk cId="2251723249" sldId="2147470571"/>
+        </pc:sldMkLst>
+        <pc:spChg chg="mod">
+          <ac:chgData name="Dwayne Natwick" userId="3561b13b-c7da-4a5b-9614-8a4db83ccfee" providerId="ADAL" clId="{E95F42E3-C4F3-474F-B9C2-A0BA12FFF20C}" dt="2023-11-13T15:43:19.725" v="14" actId="6549"/>
+          <ac:spMkLst>
+            <pc:docMk/>
+            <pc:sldMk cId="2251723249" sldId="2147470571"/>
+            <ac:spMk id="4" creationId="{DAA5FD98-5292-2367-63BF-BB583BFC2A96}"/>
+          </ac:spMkLst>
+        </pc:spChg>
+      </pc:sldChg>
+      <pc:sldChg chg="modSp mod">
+        <pc:chgData name="Dwayne Natwick" userId="3561b13b-c7da-4a5b-9614-8a4db83ccfee" providerId="ADAL" clId="{E95F42E3-C4F3-474F-B9C2-A0BA12FFF20C}" dt="2023-11-13T15:44:44.804" v="41" actId="20577"/>
+        <pc:sldMkLst>
+          <pc:docMk/>
+          <pc:sldMk cId="1259147145" sldId="2147470572"/>
+        </pc:sldMkLst>
+        <pc:spChg chg="mod">
+          <ac:chgData name="Dwayne Natwick" userId="3561b13b-c7da-4a5b-9614-8a4db83ccfee" providerId="ADAL" clId="{E95F42E3-C4F3-474F-B9C2-A0BA12FFF20C}" dt="2023-11-13T15:44:04.440" v="22" actId="6549"/>
+          <ac:spMkLst>
+            <pc:docMk/>
+            <pc:sldMk cId="1259147145" sldId="2147470572"/>
+            <ac:spMk id="21" creationId="{68C8CFE1-65AB-E14A-D550-F9CC1A93CFC5}"/>
+          </ac:spMkLst>
+        </pc:spChg>
+        <pc:spChg chg="mod">
+          <ac:chgData name="Dwayne Natwick" userId="3561b13b-c7da-4a5b-9614-8a4db83ccfee" providerId="ADAL" clId="{E95F42E3-C4F3-474F-B9C2-A0BA12FFF20C}" dt="2023-11-13T15:44:06.289" v="23" actId="6549"/>
+          <ac:spMkLst>
+            <pc:docMk/>
+            <pc:sldMk cId="1259147145" sldId="2147470572"/>
+            <ac:spMk id="27" creationId="{2110CA23-E319-B299-E485-6F98BFAFC1EC}"/>
+          </ac:spMkLst>
+        </pc:spChg>
+        <pc:spChg chg="mod">
+          <ac:chgData name="Dwayne Natwick" userId="3561b13b-c7da-4a5b-9614-8a4db83ccfee" providerId="ADAL" clId="{E95F42E3-C4F3-474F-B9C2-A0BA12FFF20C}" dt="2023-11-13T15:44:13.249" v="26" actId="6549"/>
+          <ac:spMkLst>
+            <pc:docMk/>
+            <pc:sldMk cId="1259147145" sldId="2147470572"/>
+            <ac:spMk id="32" creationId="{93C8FB2B-8EDA-992B-5C01-296093DB1125}"/>
+          </ac:spMkLst>
+        </pc:spChg>
+        <pc:spChg chg="mod">
+          <ac:chgData name="Dwayne Natwick" userId="3561b13b-c7da-4a5b-9614-8a4db83ccfee" providerId="ADAL" clId="{E95F42E3-C4F3-474F-B9C2-A0BA12FFF20C}" dt="2023-11-13T15:44:44.804" v="41" actId="20577"/>
+          <ac:spMkLst>
+            <pc:docMk/>
+            <pc:sldMk cId="1259147145" sldId="2147470572"/>
+            <ac:spMk id="56" creationId="{87C697D9-D5F1-EBDD-81F9-D4CB7DC374D4}"/>
+          </ac:spMkLst>
+        </pc:spChg>
+      </pc:sldChg>
+      <pc:sldChg chg="modSp mod">
+        <pc:chgData name="Dwayne Natwick" userId="3561b13b-c7da-4a5b-9614-8a4db83ccfee" providerId="ADAL" clId="{E95F42E3-C4F3-474F-B9C2-A0BA12FFF20C}" dt="2023-11-13T15:46:29.293" v="145" actId="20577"/>
+        <pc:sldMkLst>
+          <pc:docMk/>
+          <pc:sldMk cId="1929971971" sldId="2147470610"/>
+        </pc:sldMkLst>
+        <pc:spChg chg="mod">
+          <ac:chgData name="Dwayne Natwick" userId="3561b13b-c7da-4a5b-9614-8a4db83ccfee" providerId="ADAL" clId="{E95F42E3-C4F3-474F-B9C2-A0BA12FFF20C}" dt="2023-11-13T15:46:29.293" v="145" actId="20577"/>
+          <ac:spMkLst>
+            <pc:docMk/>
+            <pc:sldMk cId="1929971971" sldId="2147470610"/>
+            <ac:spMk id="2" creationId="{105B6354-2028-24B8-66E1-0D45962243CA}"/>
+          </ac:spMkLst>
+        </pc:spChg>
+        <pc:graphicFrameChg chg="mod">
+          <ac:chgData name="Dwayne Natwick" userId="3561b13b-c7da-4a5b-9614-8a4db83ccfee" providerId="ADAL" clId="{E95F42E3-C4F3-474F-B9C2-A0BA12FFF20C}" dt="2023-11-13T15:46:20.626" v="137" actId="20577"/>
+          <ac:graphicFrameMkLst>
+            <pc:docMk/>
+            <pc:sldMk cId="1929971971" sldId="2147470610"/>
+            <ac:graphicFrameMk id="11" creationId="{F05A35D9-D1C5-338E-A24B-63C76BB54E45}"/>
+          </ac:graphicFrameMkLst>
+        </pc:graphicFrameChg>
+      </pc:sldChg>
+      <pc:sldChg chg="modSp">
+        <pc:chgData name="Dwayne Natwick" userId="3561b13b-c7da-4a5b-9614-8a4db83ccfee" providerId="ADAL" clId="{E95F42E3-C4F3-474F-B9C2-A0BA12FFF20C}" dt="2023-11-13T15:46:59.410" v="146" actId="20577"/>
+        <pc:sldMkLst>
+          <pc:docMk/>
+          <pc:sldMk cId="3776730813" sldId="2147470620"/>
+        </pc:sldMkLst>
+        <pc:graphicFrameChg chg="mod">
+          <ac:chgData name="Dwayne Natwick" userId="3561b13b-c7da-4a5b-9614-8a4db83ccfee" providerId="ADAL" clId="{E95F42E3-C4F3-474F-B9C2-A0BA12FFF20C}" dt="2023-11-13T15:46:59.410" v="146" actId="20577"/>
+          <ac:graphicFrameMkLst>
+            <pc:docMk/>
+            <pc:sldMk cId="3776730813" sldId="2147470620"/>
+            <ac:graphicFrameMk id="5" creationId="{EAD11503-D133-32E7-E133-88CB07DFE0F3}"/>
+          </ac:graphicFrameMkLst>
+        </pc:graphicFrameChg>
+      </pc:sldChg>
+    </pc:docChg>
+  </pc:docChgLst>
+  <pc:docChgLst>
+    <pc:chgData name="Dwayne Natwick" userId="d11f0013982d5c78" providerId="LiveId" clId="{67AF20B4-6DC7-492D-BA3B-9FCF6F9AD6CF}"/>
+    <pc:docChg chg="undo custSel modSld">
+      <pc:chgData name="Dwayne Natwick" userId="d11f0013982d5c78" providerId="LiveId" clId="{67AF20B4-6DC7-492D-BA3B-9FCF6F9AD6CF}" dt="2023-09-15T12:33:18.323" v="157" actId="478"/>
+      <pc:docMkLst>
+        <pc:docMk/>
+      </pc:docMkLst>
+      <pc:sldChg chg="addSp modSp mod modClrScheme chgLayout">
+        <pc:chgData name="Dwayne Natwick" userId="d11f0013982d5c78" providerId="LiveId" clId="{67AF20B4-6DC7-492D-BA3B-9FCF6F9AD6CF}" dt="2023-09-15T12:22:20.232" v="0" actId="26606"/>
+        <pc:sldMkLst>
+          <pc:docMk/>
+          <pc:sldMk cId="2839524364" sldId="2147470607"/>
+        </pc:sldMkLst>
+        <pc:spChg chg="mod">
+          <ac:chgData name="Dwayne Natwick" userId="d11f0013982d5c78" providerId="LiveId" clId="{67AF20B4-6DC7-492D-BA3B-9FCF6F9AD6CF}" dt="2023-09-15T12:22:20.232" v="0" actId="26606"/>
+          <ac:spMkLst>
+            <pc:docMk/>
+            <pc:sldMk cId="2839524364" sldId="2147470607"/>
+            <ac:spMk id="2" creationId="{09C07B8E-14FF-3C2D-BE0E-F25E0D4B4DB3}"/>
+          </ac:spMkLst>
+        </pc:spChg>
+        <pc:spChg chg="mod">
+          <ac:chgData name="Dwayne Natwick" userId="d11f0013982d5c78" providerId="LiveId" clId="{67AF20B4-6DC7-492D-BA3B-9FCF6F9AD6CF}" dt="2023-09-15T12:22:20.232" v="0" actId="26606"/>
+          <ac:spMkLst>
+            <pc:docMk/>
+            <pc:sldMk cId="2839524364" sldId="2147470607"/>
+            <ac:spMk id="3" creationId="{C9D88242-39E7-FD9D-8E94-B07DD53805B5}"/>
+          </ac:spMkLst>
+        </pc:spChg>
+        <pc:spChg chg="add mod">
+          <ac:chgData name="Dwayne Natwick" userId="d11f0013982d5c78" providerId="LiveId" clId="{67AF20B4-6DC7-492D-BA3B-9FCF6F9AD6CF}" dt="2023-09-15T12:22:20.232" v="0" actId="26606"/>
+          <ac:spMkLst>
+            <pc:docMk/>
+            <pc:sldMk cId="2839524364" sldId="2147470607"/>
+            <ac:spMk id="8" creationId="{0BEC7ADA-45E0-D0DE-3260-36E676ED3447}"/>
+          </ac:spMkLst>
+        </pc:spChg>
+      </pc:sldChg>
+      <pc:sldChg chg="addSp delSp modSp mod modClrScheme chgLayout">
+        <pc:chgData name="Dwayne Natwick" userId="d11f0013982d5c78" providerId="LiveId" clId="{67AF20B4-6DC7-492D-BA3B-9FCF6F9AD6CF}" dt="2023-09-15T12:22:53.331" v="4" actId="207"/>
+        <pc:sldMkLst>
+          <pc:docMk/>
+          <pc:sldMk cId="4086260143" sldId="2147470608"/>
+        </pc:sldMkLst>
+        <pc:spChg chg="mod">
+          <ac:chgData name="Dwayne Natwick" userId="d11f0013982d5c78" providerId="LiveId" clId="{67AF20B4-6DC7-492D-BA3B-9FCF6F9AD6CF}" dt="2023-09-15T12:22:43.779" v="3" actId="26606"/>
+          <ac:spMkLst>
+            <pc:docMk/>
+            <pc:sldMk cId="4086260143" sldId="2147470608"/>
+            <ac:spMk id="2" creationId="{BA3D571B-B150-1C46-5F05-A09D93B7AE7A}"/>
+          </ac:spMkLst>
+        </pc:spChg>
+        <pc:spChg chg="del">
+          <ac:chgData name="Dwayne Natwick" userId="d11f0013982d5c78" providerId="LiveId" clId="{67AF20B4-6DC7-492D-BA3B-9FCF6F9AD6CF}" dt="2023-09-15T12:22:30.594" v="1" actId="26606"/>
+          <ac:spMkLst>
+            <pc:docMk/>
+            <pc:sldMk cId="4086260143" sldId="2147470608"/>
+            <ac:spMk id="3" creationId="{EEA0802F-FB95-E549-566C-5C162DF6AE92}"/>
+          </ac:spMkLst>
+        </pc:spChg>
+        <pc:spChg chg="add del mod">
+          <ac:chgData name="Dwayne Natwick" userId="d11f0013982d5c78" providerId="LiveId" clId="{67AF20B4-6DC7-492D-BA3B-9FCF6F9AD6CF}" dt="2023-09-15T12:22:37.849" v="2" actId="478"/>
+          <ac:spMkLst>
+            <pc:docMk/>
+            <pc:sldMk cId="4086260143" sldId="2147470608"/>
+            <ac:spMk id="9" creationId="{3C859FFF-7BFD-5EEA-4747-C61450C010D9}"/>
+          </ac:spMkLst>
+        </pc:spChg>
+        <pc:graphicFrameChg chg="add mod modGraphic">
+          <ac:chgData name="Dwayne Natwick" userId="d11f0013982d5c78" providerId="LiveId" clId="{67AF20B4-6DC7-492D-BA3B-9FCF6F9AD6CF}" dt="2023-09-15T12:22:53.331" v="4" actId="207"/>
+          <ac:graphicFrameMkLst>
+            <pc:docMk/>
+            <pc:sldMk cId="4086260143" sldId="2147470608"/>
+            <ac:graphicFrameMk id="5" creationId="{02521839-71E7-D3DB-2A79-15E7270E214C}"/>
+          </ac:graphicFrameMkLst>
+        </pc:graphicFrameChg>
+      </pc:sldChg>
+      <pc:sldChg chg="addSp delSp modSp mod">
+        <pc:chgData name="Dwayne Natwick" userId="d11f0013982d5c78" providerId="LiveId" clId="{67AF20B4-6DC7-492D-BA3B-9FCF6F9AD6CF}" dt="2023-09-15T12:24:13.533" v="6" actId="207"/>
+        <pc:sldMkLst>
+          <pc:docMk/>
+          <pc:sldMk cId="379969417" sldId="2147470609"/>
+        </pc:sldMkLst>
+        <pc:spChg chg="mod">
+          <ac:chgData name="Dwayne Natwick" userId="d11f0013982d5c78" providerId="LiveId" clId="{67AF20B4-6DC7-492D-BA3B-9FCF6F9AD6CF}" dt="2023-09-15T12:23:48.613" v="5" actId="26606"/>
+          <ac:spMkLst>
+            <pc:docMk/>
+            <pc:sldMk cId="379969417" sldId="2147470609"/>
+            <ac:spMk id="2" creationId="{C144469C-FA2E-89F4-8275-78C7809263F1}"/>
+          </ac:spMkLst>
+        </pc:spChg>
+        <pc:spChg chg="del">
+          <ac:chgData name="Dwayne Natwick" userId="d11f0013982d5c78" providerId="LiveId" clId="{67AF20B4-6DC7-492D-BA3B-9FCF6F9AD6CF}" dt="2023-09-15T12:23:48.613" v="5" actId="26606"/>
+          <ac:spMkLst>
+            <pc:docMk/>
+            <pc:sldMk cId="379969417" sldId="2147470609"/>
+            <ac:spMk id="3" creationId="{F3C47606-EBF4-2063-DFC2-36C74BD4FA71}"/>
+          </ac:spMkLst>
+        </pc:spChg>
+        <pc:graphicFrameChg chg="add mod">
+          <ac:chgData name="Dwayne Natwick" userId="d11f0013982d5c78" providerId="LiveId" clId="{67AF20B4-6DC7-492D-BA3B-9FCF6F9AD6CF}" dt="2023-09-15T12:24:13.533" v="6" actId="207"/>
+          <ac:graphicFrameMkLst>
+            <pc:docMk/>
+            <pc:sldMk cId="379969417" sldId="2147470609"/>
+            <ac:graphicFrameMk id="6" creationId="{8F951D51-311C-2EFC-35E8-15B871457F00}"/>
+          </ac:graphicFrameMkLst>
+        </pc:graphicFrameChg>
+      </pc:sldChg>
+      <pc:sldChg chg="addSp delSp modSp mod modClrScheme chgLayout">
+        <pc:chgData name="Dwayne Natwick" userId="d11f0013982d5c78" providerId="LiveId" clId="{67AF20B4-6DC7-492D-BA3B-9FCF6F9AD6CF}" dt="2023-09-15T12:26:06.004" v="28" actId="26606"/>
+        <pc:sldMkLst>
+          <pc:docMk/>
+          <pc:sldMk cId="1929971971" sldId="2147470610"/>
+        </pc:sldMkLst>
+        <pc:spChg chg="mod">
+          <ac:chgData name="Dwayne Natwick" userId="d11f0013982d5c78" providerId="LiveId" clId="{67AF20B4-6DC7-492D-BA3B-9FCF6F9AD6CF}" dt="2023-09-15T12:26:06.004" v="28" actId="26606"/>
+          <ac:spMkLst>
+            <pc:docMk/>
+            <pc:sldMk cId="1929971971" sldId="2147470610"/>
+            <ac:spMk id="2" creationId="{105B6354-2028-24B8-66E1-0D45962243CA}"/>
+          </ac:spMkLst>
+        </pc:spChg>
+        <pc:spChg chg="add del">
+          <ac:chgData name="Dwayne Natwick" userId="d11f0013982d5c78" providerId="LiveId" clId="{67AF20B4-6DC7-492D-BA3B-9FCF6F9AD6CF}" dt="2023-09-15T12:26:06.004" v="28" actId="26606"/>
+          <ac:spMkLst>
+            <pc:docMk/>
+            <pc:sldMk cId="1929971971" sldId="2147470610"/>
+            <ac:spMk id="3" creationId="{7407A4C3-86E5-EFE8-1E18-DC50FF22703B}"/>
+          </ac:spMkLst>
+        </pc:spChg>
+        <pc:spChg chg="add del mod">
+          <ac:chgData name="Dwayne Natwick" userId="d11f0013982d5c78" providerId="LiveId" clId="{67AF20B4-6DC7-492D-BA3B-9FCF6F9AD6CF}" dt="2023-09-15T12:26:05.986" v="27" actId="26606"/>
+          <ac:spMkLst>
+            <pc:docMk/>
+            <pc:sldMk cId="1929971971" sldId="2147470610"/>
+            <ac:spMk id="9" creationId="{BCECCEF1-42D4-E371-C1D3-B372EBE08756}"/>
+          </ac:spMkLst>
+        </pc:spChg>
+        <pc:graphicFrameChg chg="add del">
+          <ac:chgData name="Dwayne Natwick" userId="d11f0013982d5c78" providerId="LiveId" clId="{67AF20B4-6DC7-492D-BA3B-9FCF6F9AD6CF}" dt="2023-09-15T12:25:53.241" v="25" actId="26606"/>
+          <ac:graphicFrameMkLst>
+            <pc:docMk/>
+            <pc:sldMk cId="1929971971" sldId="2147470610"/>
+            <ac:graphicFrameMk id="5" creationId="{F05A35D9-D1C5-338E-A24B-63C76BB54E45}"/>
+          </ac:graphicFrameMkLst>
+        </pc:graphicFrameChg>
+        <pc:graphicFrameChg chg="add del mod">
+          <ac:chgData name="Dwayne Natwick" userId="d11f0013982d5c78" providerId="LiveId" clId="{67AF20B4-6DC7-492D-BA3B-9FCF6F9AD6CF}" dt="2023-09-15T12:26:05.986" v="27" actId="26606"/>
+          <ac:graphicFrameMkLst>
+            <pc:docMk/>
+            <pc:sldMk cId="1929971971" sldId="2147470610"/>
+            <ac:graphicFrameMk id="7" creationId="{CFDAEFEF-2C5F-EEFF-B591-6ABE2E227E31}"/>
+          </ac:graphicFrameMkLst>
+        </pc:graphicFrameChg>
+        <pc:graphicFrameChg chg="add">
+          <ac:chgData name="Dwayne Natwick" userId="d11f0013982d5c78" providerId="LiveId" clId="{67AF20B4-6DC7-492D-BA3B-9FCF6F9AD6CF}" dt="2023-09-15T12:26:06.004" v="28" actId="26606"/>
+          <ac:graphicFrameMkLst>
+            <pc:docMk/>
+            <pc:sldMk cId="1929971971" sldId="2147470610"/>
+            <ac:graphicFrameMk id="11" creationId="{F05A35D9-D1C5-338E-A24B-63C76BB54E45}"/>
+          </ac:graphicFrameMkLst>
+        </pc:graphicFrameChg>
+      </pc:sldChg>
+      <pc:sldChg chg="addSp delSp modSp mod">
+        <pc:chgData name="Dwayne Natwick" userId="d11f0013982d5c78" providerId="LiveId" clId="{67AF20B4-6DC7-492D-BA3B-9FCF6F9AD6CF}" dt="2023-09-15T12:24:51.046" v="11" actId="26606"/>
+        <pc:sldMkLst>
+          <pc:docMk/>
+          <pc:sldMk cId="2421521076" sldId="2147470611"/>
+        </pc:sldMkLst>
+        <pc:spChg chg="mod">
+          <ac:chgData name="Dwayne Natwick" userId="d11f0013982d5c78" providerId="LiveId" clId="{67AF20B4-6DC7-492D-BA3B-9FCF6F9AD6CF}" dt="2023-09-15T12:24:51.046" v="11" actId="26606"/>
+          <ac:spMkLst>
+            <pc:docMk/>
+            <pc:sldMk cId="2421521076" sldId="2147470611"/>
+            <ac:spMk id="2" creationId="{0F4D640B-8499-E0C5-C508-35266E13B6E6}"/>
+          </ac:spMkLst>
+        </pc:spChg>
+        <pc:spChg chg="del">
+          <ac:chgData name="Dwayne Natwick" userId="d11f0013982d5c78" providerId="LiveId" clId="{67AF20B4-6DC7-492D-BA3B-9FCF6F9AD6CF}" dt="2023-09-15T12:24:51.046" v="11" actId="26606"/>
+          <ac:spMkLst>
+            <pc:docMk/>
+            <pc:sldMk cId="2421521076" sldId="2147470611"/>
+            <ac:spMk id="3" creationId="{358EA097-101A-43CC-781A-E0E92A4D22E7}"/>
+          </ac:spMkLst>
+        </pc:spChg>
+        <pc:graphicFrameChg chg="add">
+          <ac:chgData name="Dwayne Natwick" userId="d11f0013982d5c78" providerId="LiveId" clId="{67AF20B4-6DC7-492D-BA3B-9FCF6F9AD6CF}" dt="2023-09-15T12:24:51.046" v="11" actId="26606"/>
+          <ac:graphicFrameMkLst>
+            <pc:docMk/>
+            <pc:sldMk cId="2421521076" sldId="2147470611"/>
+            <ac:graphicFrameMk id="5" creationId="{A5BBB90B-5CC9-A280-14DC-2C91D4F347EE}"/>
+          </ac:graphicFrameMkLst>
+        </pc:graphicFrameChg>
+      </pc:sldChg>
+      <pc:sldChg chg="delSp mod modNotesTx">
+        <pc:chgData name="Dwayne Natwick" userId="d11f0013982d5c78" providerId="LiveId" clId="{67AF20B4-6DC7-492D-BA3B-9FCF6F9AD6CF}" dt="2023-09-15T12:33:18.323" v="157" actId="478"/>
+        <pc:sldMkLst>
+          <pc:docMk/>
+          <pc:sldMk cId="2524577050" sldId="2147470612"/>
+        </pc:sldMkLst>
+        <pc:spChg chg="del">
+          <ac:chgData name="Dwayne Natwick" userId="d11f0013982d5c78" providerId="LiveId" clId="{67AF20B4-6DC7-492D-BA3B-9FCF6F9AD6CF}" dt="2023-09-15T12:33:18.323" v="157" actId="478"/>
+          <ac:spMkLst>
+            <pc:docMk/>
+            <pc:sldMk cId="2524577050" sldId="2147470612"/>
+            <ac:spMk id="4" creationId="{57240181-C93A-F4E8-472C-1AF0F2C2A855}"/>
+          </ac:spMkLst>
+        </pc:spChg>
+        <pc:spChg chg="del">
+          <ac:chgData name="Dwayne Natwick" userId="d11f0013982d5c78" providerId="LiveId" clId="{67AF20B4-6DC7-492D-BA3B-9FCF6F9AD6CF}" dt="2023-09-15T12:33:13.947" v="156" actId="478"/>
+          <ac:spMkLst>
+            <pc:docMk/>
+            <pc:sldMk cId="2524577050" sldId="2147470612"/>
+            <ac:spMk id="5" creationId="{D3A447DE-6903-1590-61FB-AB160302D80B}"/>
+          </ac:spMkLst>
+        </pc:spChg>
+        <pc:spChg chg="del">
+          <ac:chgData name="Dwayne Natwick" userId="d11f0013982d5c78" providerId="LiveId" clId="{67AF20B4-6DC7-492D-BA3B-9FCF6F9AD6CF}" dt="2023-09-15T12:33:06.604" v="154" actId="478"/>
+          <ac:spMkLst>
+            <pc:docMk/>
+            <pc:sldMk cId="2524577050" sldId="2147470612"/>
+            <ac:spMk id="6" creationId="{520C77B9-C55A-8B6C-DC16-CEE27B62CD45}"/>
+          </ac:spMkLst>
+        </pc:spChg>
+        <pc:spChg chg="del">
+          <ac:chgData name="Dwayne Natwick" userId="d11f0013982d5c78" providerId="LiveId" clId="{67AF20B4-6DC7-492D-BA3B-9FCF6F9AD6CF}" dt="2023-09-15T12:33:11.398" v="155" actId="478"/>
+          <ac:spMkLst>
+            <pc:docMk/>
+            <pc:sldMk cId="2524577050" sldId="2147470612"/>
+            <ac:spMk id="7" creationId="{C25B8EDA-4C77-A71B-612F-D5F8559DF688}"/>
+          </ac:spMkLst>
+        </pc:spChg>
+      </pc:sldChg>
+      <pc:sldChg chg="modSp mod">
+        <pc:chgData name="Dwayne Natwick" userId="d11f0013982d5c78" providerId="LiveId" clId="{67AF20B4-6DC7-492D-BA3B-9FCF6F9AD6CF}" dt="2023-09-15T12:24:40.874" v="10" actId="14100"/>
+        <pc:sldMkLst>
+          <pc:docMk/>
+          <pc:sldMk cId="848203549" sldId="2147470613"/>
+        </pc:sldMkLst>
+        <pc:spChg chg="mod ord">
+          <ac:chgData name="Dwayne Natwick" userId="d11f0013982d5c78" providerId="LiveId" clId="{67AF20B4-6DC7-492D-BA3B-9FCF6F9AD6CF}" dt="2023-09-15T12:24:40.874" v="10" actId="14100"/>
+          <ac:spMkLst>
+            <pc:docMk/>
+            <pc:sldMk cId="848203549" sldId="2147470613"/>
+            <ac:spMk id="3" creationId="{2E50BA7C-3255-BC69-812B-892217F5D36D}"/>
+          </ac:spMkLst>
+        </pc:spChg>
+        <pc:picChg chg="mod">
+          <ac:chgData name="Dwayne Natwick" userId="d11f0013982d5c78" providerId="LiveId" clId="{67AF20B4-6DC7-492D-BA3B-9FCF6F9AD6CF}" dt="2023-09-15T12:24:28.644" v="7" actId="26606"/>
+          <ac:picMkLst>
+            <pc:docMk/>
+            <pc:sldMk cId="848203549" sldId="2147470613"/>
+            <ac:picMk id="4" creationId="{D26C38C8-22B0-0868-2D0E-669BDC2059B1}"/>
+          </ac:picMkLst>
+        </pc:picChg>
+      </pc:sldChg>
+      <pc:sldChg chg="addSp delSp modSp mod modClrScheme chgLayout">
+        <pc:chgData name="Dwayne Natwick" userId="d11f0013982d5c78" providerId="LiveId" clId="{67AF20B4-6DC7-492D-BA3B-9FCF6F9AD6CF}" dt="2023-09-15T12:25:30.016" v="23" actId="404"/>
+        <pc:sldMkLst>
+          <pc:docMk/>
+          <pc:sldMk cId="3770102974" sldId="2147470614"/>
+        </pc:sldMkLst>
+        <pc:spChg chg="mod">
+          <ac:chgData name="Dwayne Natwick" userId="d11f0013982d5c78" providerId="LiveId" clId="{67AF20B4-6DC7-492D-BA3B-9FCF6F9AD6CF}" dt="2023-09-15T12:25:17.917" v="16" actId="26606"/>
+          <ac:spMkLst>
+            <pc:docMk/>
+            <pc:sldMk cId="3770102974" sldId="2147470614"/>
+            <ac:spMk id="2" creationId="{CFCF5E71-8482-5C4A-1937-62180CED69B1}"/>
+          </ac:spMkLst>
+        </pc:spChg>
+        <pc:spChg chg="add del">
+          <ac:chgData name="Dwayne Natwick" userId="d11f0013982d5c78" providerId="LiveId" clId="{67AF20B4-6DC7-492D-BA3B-9FCF6F9AD6CF}" dt="2023-09-15T12:25:09.961" v="14" actId="26606"/>
+          <ac:spMkLst>
+            <pc:docMk/>
+            <pc:sldMk cId="3770102974" sldId="2147470614"/>
+            <ac:spMk id="3" creationId="{2E8F6CC6-DEE5-E7CD-0610-AF173BD7F8EC}"/>
+          </ac:spMkLst>
+        </pc:spChg>
+        <pc:spChg chg="add del mod">
+          <ac:chgData name="Dwayne Natwick" userId="d11f0013982d5c78" providerId="LiveId" clId="{67AF20B4-6DC7-492D-BA3B-9FCF6F9AD6CF}" dt="2023-09-15T12:25:14.440" v="15" actId="478"/>
+          <ac:spMkLst>
+            <pc:docMk/>
+            <pc:sldMk cId="3770102974" sldId="2147470614"/>
+            <ac:spMk id="9" creationId="{58699FEA-8D93-6C54-EB4F-88BC2FCE5915}"/>
+          </ac:spMkLst>
+        </pc:spChg>
+        <pc:graphicFrameChg chg="add del">
+          <ac:chgData name="Dwayne Natwick" userId="d11f0013982d5c78" providerId="LiveId" clId="{67AF20B4-6DC7-492D-BA3B-9FCF6F9AD6CF}" dt="2023-09-15T12:25:09.866" v="13" actId="26606"/>
+          <ac:graphicFrameMkLst>
+            <pc:docMk/>
+            <pc:sldMk cId="3770102974" sldId="2147470614"/>
+            <ac:graphicFrameMk id="5" creationId="{5532D69F-20D3-37B9-F271-649CAC81B81A}"/>
+          </ac:graphicFrameMkLst>
+        </pc:graphicFrameChg>
+        <pc:graphicFrameChg chg="add mod modGraphic">
+          <ac:chgData name="Dwayne Natwick" userId="d11f0013982d5c78" providerId="LiveId" clId="{67AF20B4-6DC7-492D-BA3B-9FCF6F9AD6CF}" dt="2023-09-15T12:25:30.016" v="23" actId="404"/>
+          <ac:graphicFrameMkLst>
+            <pc:docMk/>
+            <pc:sldMk cId="3770102974" sldId="2147470614"/>
+            <ac:graphicFrameMk id="7" creationId="{A219546F-E536-A279-B526-1AE693C0FEBC}"/>
+          </ac:graphicFrameMkLst>
+        </pc:graphicFrameChg>
+      </pc:sldChg>
+      <pc:sldChg chg="addSp delSp modSp mod">
+        <pc:chgData name="Dwayne Natwick" userId="d11f0013982d5c78" providerId="LiveId" clId="{67AF20B4-6DC7-492D-BA3B-9FCF6F9AD6CF}" dt="2023-09-15T12:26:40.164" v="31" actId="207"/>
+        <pc:sldMkLst>
+          <pc:docMk/>
+          <pc:sldMk cId="3776730813" sldId="2147470620"/>
+        </pc:sldMkLst>
+        <pc:spChg chg="mod">
+          <ac:chgData name="Dwayne Natwick" userId="d11f0013982d5c78" providerId="LiveId" clId="{67AF20B4-6DC7-492D-BA3B-9FCF6F9AD6CF}" dt="2023-09-15T12:26:19.350" v="29" actId="26606"/>
+          <ac:spMkLst>
+            <pc:docMk/>
+            <pc:sldMk cId="3776730813" sldId="2147470620"/>
+            <ac:spMk id="2" creationId="{B98733DD-1422-5649-B7EC-6C22F68294E7}"/>
+          </ac:spMkLst>
+        </pc:spChg>
+        <pc:spChg chg="del">
+          <ac:chgData name="Dwayne Natwick" userId="d11f0013982d5c78" providerId="LiveId" clId="{67AF20B4-6DC7-492D-BA3B-9FCF6F9AD6CF}" dt="2023-09-15T12:26:19.350" v="29" actId="26606"/>
+          <ac:spMkLst>
+            <pc:docMk/>
+            <pc:sldMk cId="3776730813" sldId="2147470620"/>
+            <ac:spMk id="3" creationId="{6877C1DD-3080-4AEC-3E55-CF8ED035D114}"/>
+          </ac:spMkLst>
+        </pc:spChg>
+        <pc:graphicFrameChg chg="add mod">
+          <ac:chgData name="Dwayne Natwick" userId="d11f0013982d5c78" providerId="LiveId" clId="{67AF20B4-6DC7-492D-BA3B-9FCF6F9AD6CF}" dt="2023-09-15T12:26:40.164" v="31" actId="207"/>
+          <ac:graphicFrameMkLst>
+            <pc:docMk/>
+            <pc:sldMk cId="3776730813" sldId="2147470620"/>
+            <ac:graphicFrameMk id="5" creationId="{EAD11503-D133-32E7-E133-88CB07DFE0F3}"/>
+          </ac:graphicFrameMkLst>
+        </pc:graphicFrameChg>
+      </pc:sldChg>
+      <pc:sldChg chg="addSp delSp modSp mod modClrScheme chgLayout">
+        <pc:chgData name="Dwayne Natwick" userId="d11f0013982d5c78" providerId="LiveId" clId="{67AF20B4-6DC7-492D-BA3B-9FCF6F9AD6CF}" dt="2023-09-15T12:27:22.537" v="41" actId="12"/>
+        <pc:sldMkLst>
+          <pc:docMk/>
+          <pc:sldMk cId="1675599562" sldId="2147470621"/>
+        </pc:sldMkLst>
+        <pc:spChg chg="mod">
+          <ac:chgData name="Dwayne Natwick" userId="d11f0013982d5c78" providerId="LiveId" clId="{67AF20B4-6DC7-492D-BA3B-9FCF6F9AD6CF}" dt="2023-09-15T12:27:16.480" v="40" actId="26606"/>
+          <ac:spMkLst>
+            <pc:docMk/>
+            <pc:sldMk cId="1675599562" sldId="2147470621"/>
+            <ac:spMk id="2" creationId="{4F2E3601-0348-0AC8-926D-2963A6EBDE54}"/>
+          </ac:spMkLst>
+        </pc:spChg>
+        <pc:spChg chg="mod">
+          <ac:chgData name="Dwayne Natwick" userId="d11f0013982d5c78" providerId="LiveId" clId="{67AF20B4-6DC7-492D-BA3B-9FCF6F9AD6CF}" dt="2023-09-15T12:27:22.537" v="41" actId="12"/>
+          <ac:spMkLst>
+            <pc:docMk/>
+            <pc:sldMk cId="1675599562" sldId="2147470621"/>
+            <ac:spMk id="3" creationId="{226A9B3B-731B-E601-049B-025098728B19}"/>
+          </ac:spMkLst>
+        </pc:spChg>
+        <pc:spChg chg="add del mod">
+          <ac:chgData name="Dwayne Natwick" userId="d11f0013982d5c78" providerId="LiveId" clId="{67AF20B4-6DC7-492D-BA3B-9FCF6F9AD6CF}" dt="2023-09-15T12:27:08.351" v="33" actId="26606"/>
+          <ac:spMkLst>
+            <pc:docMk/>
+            <pc:sldMk cId="1675599562" sldId="2147470621"/>
+            <ac:spMk id="8" creationId="{CBDE5322-35C9-7798-3ACA-6181A40C14D0}"/>
+          </ac:spMkLst>
+        </pc:spChg>
+        <pc:spChg chg="add del mod">
+          <ac:chgData name="Dwayne Natwick" userId="d11f0013982d5c78" providerId="LiveId" clId="{67AF20B4-6DC7-492D-BA3B-9FCF6F9AD6CF}" dt="2023-09-15T12:27:11.088" v="35" actId="26606"/>
+          <ac:spMkLst>
+            <pc:docMk/>
+            <pc:sldMk cId="1675599562" sldId="2147470621"/>
+            <ac:spMk id="10" creationId="{795D7EBF-A03F-22DA-4479-3CEB4DE78634}"/>
+          </ac:spMkLst>
+        </pc:spChg>
+      </pc:sldChg>
+      <pc:sldChg chg="delSp modSp mod">
+        <pc:chgData name="Dwayne Natwick" userId="d11f0013982d5c78" providerId="LiveId" clId="{67AF20B4-6DC7-492D-BA3B-9FCF6F9AD6CF}" dt="2023-09-15T12:32:14.657" v="145"/>
+        <pc:sldMkLst>
+          <pc:docMk/>
+          <pc:sldMk cId="4211696148" sldId="2147470622"/>
+        </pc:sldMkLst>
+        <pc:spChg chg="mod">
+          <ac:chgData name="Dwayne Natwick" userId="d11f0013982d5c78" providerId="LiveId" clId="{67AF20B4-6DC7-492D-BA3B-9FCF6F9AD6CF}" dt="2023-09-15T12:32:12.113" v="143" actId="20577"/>
+          <ac:spMkLst>
+            <pc:docMk/>
+            <pc:sldMk cId="4211696148" sldId="2147470622"/>
+            <ac:spMk id="3" creationId="{8EBEE321-11FC-1E70-73C4-F9D3512763DC}"/>
+          </ac:spMkLst>
+        </pc:spChg>
+        <pc:spChg chg="del mod">
+          <ac:chgData name="Dwayne Natwick" userId="d11f0013982d5c78" providerId="LiveId" clId="{67AF20B4-6DC7-492D-BA3B-9FCF6F9AD6CF}" dt="2023-09-15T12:32:14.657" v="145"/>
+          <ac:spMkLst>
+            <pc:docMk/>
+            <pc:sldMk cId="4211696148" sldId="2147470622"/>
+            <ac:spMk id="4" creationId="{894C4432-C891-B2F2-36B5-DC9ABE788A25}"/>
+          </ac:spMkLst>
+        </pc:spChg>
+      </pc:sldChg>
+    </pc:docChg>
+  </pc:docChgLst>
+  <pc:docChgLst>
+    <pc:chgData name="Dwayne Natwick" userId="d11f0013982d5c78" providerId="Windows Live" clId="Web-{71AAC7CB-8687-4658-9B09-DDB30BE95366}"/>
+    <pc:docChg chg="delSld modSld sldOrd">
+      <pc:chgData name="Dwayne Natwick" userId="d11f0013982d5c78" providerId="Windows Live" clId="Web-{71AAC7CB-8687-4658-9B09-DDB30BE95366}" dt="2023-09-15T13:05:49.642" v="212" actId="20577"/>
+      <pc:docMkLst>
+        <pc:docMk/>
+      </pc:docMkLst>
+      <pc:sldChg chg="del">
+        <pc:chgData name="Dwayne Natwick" userId="d11f0013982d5c78" providerId="Windows Live" clId="Web-{71AAC7CB-8687-4658-9B09-DDB30BE95366}" dt="2023-09-15T12:44:28.257" v="0"/>
+        <pc:sldMkLst>
+          <pc:docMk/>
+          <pc:sldMk cId="4270848246" sldId="2147470560"/>
+        </pc:sldMkLst>
+      </pc:sldChg>
+      <pc:sldChg chg="del">
+        <pc:chgData name="Dwayne Natwick" userId="d11f0013982d5c78" providerId="Windows Live" clId="Web-{71AAC7CB-8687-4658-9B09-DDB30BE95366}" dt="2023-09-15T12:44:28.350" v="36"/>
+        <pc:sldMkLst>
+          <pc:docMk/>
+          <pc:sldMk cId="3644458694" sldId="2147470564"/>
+        </pc:sldMkLst>
+      </pc:sldChg>
+      <pc:sldChg chg="del">
+        <pc:chgData name="Dwayne Natwick" userId="d11f0013982d5c78" providerId="Windows Live" clId="Web-{71AAC7CB-8687-4658-9B09-DDB30BE95366}" dt="2023-09-15T12:44:37.835" v="38"/>
+        <pc:sldMkLst>
+          <pc:docMk/>
+          <pc:sldMk cId="2739312586" sldId="2147470565"/>
+        </pc:sldMkLst>
+      </pc:sldChg>
+      <pc:sldChg chg="ord">
+        <pc:chgData name="Dwayne Natwick" userId="d11f0013982d5c78" providerId="Windows Live" clId="Web-{71AAC7CB-8687-4658-9B09-DDB30BE95366}" dt="2023-09-15T12:44:35.898" v="37"/>
+        <pc:sldMkLst>
+          <pc:docMk/>
+          <pc:sldMk cId="2251723249" sldId="2147470571"/>
+        </pc:sldMkLst>
+      </pc:sldChg>
+      <pc:sldChg chg="del">
+        <pc:chgData name="Dwayne Natwick" userId="d11f0013982d5c78" providerId="Windows Live" clId="Web-{71AAC7CB-8687-4658-9B09-DDB30BE95366}" dt="2023-09-15T12:44:28.335" v="34"/>
+        <pc:sldMkLst>
+          <pc:docMk/>
+          <pc:sldMk cId="948136224" sldId="2147470573"/>
+        </pc:sldMkLst>
+      </pc:sldChg>
+      <pc:sldChg chg="del">
+        <pc:chgData name="Dwayne Natwick" userId="d11f0013982d5c78" providerId="Windows Live" clId="Web-{71AAC7CB-8687-4658-9B09-DDB30BE95366}" dt="2023-09-15T12:44:28.304" v="24"/>
+        <pc:sldMkLst>
+          <pc:docMk/>
+          <pc:sldMk cId="2030514790" sldId="2147470574"/>
+        </pc:sldMkLst>
+      </pc:sldChg>
+      <pc:sldChg chg="del">
+        <pc:chgData name="Dwayne Natwick" userId="d11f0013982d5c78" providerId="Windows Live" clId="Web-{71AAC7CB-8687-4658-9B09-DDB30BE95366}" dt="2023-09-15T12:44:28.304" v="22"/>
+        <pc:sldMkLst>
+          <pc:docMk/>
+          <pc:sldMk cId="3649936595" sldId="2147470575"/>
+        </pc:sldMkLst>
+      </pc:sldChg>
+      <pc:sldChg chg="del">
+        <pc:chgData name="Dwayne Natwick" userId="d11f0013982d5c78" providerId="Windows Live" clId="Web-{71AAC7CB-8687-4658-9B09-DDB30BE95366}" dt="2023-09-15T12:44:28.272" v="13"/>
+        <pc:sldMkLst>
+          <pc:docMk/>
+          <pc:sldMk cId="511214272" sldId="2147470576"/>
+        </pc:sldMkLst>
+      </pc:sldChg>
+      <pc:sldChg chg="del">
+        <pc:chgData name="Dwayne Natwick" userId="d11f0013982d5c78" providerId="Windows Live" clId="Web-{71AAC7CB-8687-4658-9B09-DDB30BE95366}" dt="2023-09-15T12:44:28.257" v="9"/>
+        <pc:sldMkLst>
+          <pc:docMk/>
+          <pc:sldMk cId="4196600117" sldId="2147470577"/>
+        </pc:sldMkLst>
+      </pc:sldChg>
+      <pc:sldChg chg="del">
+        <pc:chgData name="Dwayne Natwick" userId="d11f0013982d5c78" providerId="Windows Live" clId="Web-{71AAC7CB-8687-4658-9B09-DDB30BE95366}" dt="2023-09-15T12:44:28.257" v="8"/>
+        <pc:sldMkLst>
+          <pc:docMk/>
+          <pc:sldMk cId="1593797140" sldId="2147470578"/>
+        </pc:sldMkLst>
+      </pc:sldChg>
+      <pc:sldChg chg="del">
+        <pc:chgData name="Dwayne Natwick" userId="d11f0013982d5c78" providerId="Windows Live" clId="Web-{71AAC7CB-8687-4658-9B09-DDB30BE95366}" dt="2023-09-15T12:44:28.272" v="11"/>
+        <pc:sldMkLst>
+          <pc:docMk/>
+          <pc:sldMk cId="90178162" sldId="2147470579"/>
+        </pc:sldMkLst>
+      </pc:sldChg>
+      <pc:sldChg chg="del">
+        <pc:chgData name="Dwayne Natwick" userId="d11f0013982d5c78" providerId="Windows Live" clId="Web-{71AAC7CB-8687-4658-9B09-DDB30BE95366}" dt="2023-09-15T12:44:28.272" v="10"/>
+        <pc:sldMkLst>
+          <pc:docMk/>
+          <pc:sldMk cId="1437570267" sldId="2147470580"/>
+        </pc:sldMkLst>
+      </pc:sldChg>
+      <pc:sldChg chg="del">
+        <pc:chgData name="Dwayne Natwick" userId="d11f0013982d5c78" providerId="Windows Live" clId="Web-{71AAC7CB-8687-4658-9B09-DDB30BE95366}" dt="2023-09-15T12:44:28.257" v="7"/>
+        <pc:sldMkLst>
+          <pc:docMk/>
+          <pc:sldMk cId="1083283128" sldId="2147470581"/>
+        </pc:sldMkLst>
+      </pc:sldChg>
+      <pc:sldChg chg="del">
+        <pc:chgData name="Dwayne Natwick" userId="d11f0013982d5c78" providerId="Windows Live" clId="Web-{71AAC7CB-8687-4658-9B09-DDB30BE95366}" dt="2023-09-15T12:44:28.257" v="4"/>
+        <pc:sldMkLst>
+          <pc:docMk/>
+          <pc:sldMk cId="3763189814" sldId="2147470582"/>
+        </pc:sldMkLst>
+      </pc:sldChg>
+      <pc:sldChg chg="del">
+        <pc:chgData name="Dwayne Natwick" userId="d11f0013982d5c78" providerId="Windows Live" clId="Web-{71AAC7CB-8687-4658-9B09-DDB30BE95366}" dt="2023-09-15T12:44:28.335" v="33"/>
+        <pc:sldMkLst>
+          <pc:docMk/>
+          <pc:sldMk cId="3386646133" sldId="2147470584"/>
+        </pc:sldMkLst>
+      </pc:sldChg>
+      <pc:sldChg chg="del">
+        <pc:chgData name="Dwayne Natwick" userId="d11f0013982d5c78" providerId="Windows Live" clId="Web-{71AAC7CB-8687-4658-9B09-DDB30BE95366}" dt="2023-09-15T12:44:28.335" v="32"/>
+        <pc:sldMkLst>
+          <pc:docMk/>
+          <pc:sldMk cId="3650723693" sldId="2147470585"/>
+        </pc:sldMkLst>
+      </pc:sldChg>
+      <pc:sldChg chg="del">
+        <pc:chgData name="Dwayne Natwick" userId="d11f0013982d5c78" providerId="Windows Live" clId="Web-{71AAC7CB-8687-4658-9B09-DDB30BE95366}" dt="2023-09-15T12:44:28.335" v="31"/>
+        <pc:sldMkLst>
+          <pc:docMk/>
+          <pc:sldMk cId="694622249" sldId="2147470586"/>
+        </pc:sldMkLst>
+      </pc:sldChg>
+      <pc:sldChg chg="del">
+        <pc:chgData name="Dwayne Natwick" userId="d11f0013982d5c78" providerId="Windows Live" clId="Web-{71AAC7CB-8687-4658-9B09-DDB30BE95366}" dt="2023-09-15T12:44:28.335" v="30"/>
+        <pc:sldMkLst>
+          <pc:docMk/>
+          <pc:sldMk cId="347590927" sldId="2147470587"/>
+        </pc:sldMkLst>
+      </pc:sldChg>
+      <pc:sldChg chg="del">
+        <pc:chgData name="Dwayne Natwick" userId="d11f0013982d5c78" providerId="Windows Live" clId="Web-{71AAC7CB-8687-4658-9B09-DDB30BE95366}" dt="2023-09-15T12:44:28.319" v="28"/>
+        <pc:sldMkLst>
+          <pc:docMk/>
+          <pc:sldMk cId="2214484181" sldId="2147470588"/>
+        </pc:sldMkLst>
+      </pc:sldChg>
+      <pc:sldChg chg="del">
+        <pc:chgData name="Dwayne Natwick" userId="d11f0013982d5c78" providerId="Windows Live" clId="Web-{71AAC7CB-8687-4658-9B09-DDB30BE95366}" dt="2023-09-15T12:44:28.319" v="29"/>
+        <pc:sldMkLst>
+          <pc:docMk/>
+          <pc:sldMk cId="3716502182" sldId="2147470589"/>
+        </pc:sldMkLst>
+      </pc:sldChg>
+      <pc:sldChg chg="del">
+        <pc:chgData name="Dwayne Natwick" userId="d11f0013982d5c78" providerId="Windows Live" clId="Web-{71AAC7CB-8687-4658-9B09-DDB30BE95366}" dt="2023-09-15T12:44:28.319" v="27"/>
+        <pc:sldMkLst>
+          <pc:docMk/>
+          <pc:sldMk cId="836223342" sldId="2147470590"/>
+        </pc:sldMkLst>
+      </pc:sldChg>
+      <pc:sldChg chg="del">
+        <pc:chgData name="Dwayne Natwick" userId="d11f0013982d5c78" providerId="Windows Live" clId="Web-{71AAC7CB-8687-4658-9B09-DDB30BE95366}" dt="2023-09-15T12:44:28.304" v="23"/>
+        <pc:sldMkLst>
+          <pc:docMk/>
+          <pc:sldMk cId="1568180102" sldId="2147470591"/>
+        </pc:sldMkLst>
+      </pc:sldChg>
+      <pc:sldChg chg="del">
+        <pc:chgData name="Dwayne Natwick" userId="d11f0013982d5c78" providerId="Windows Live" clId="Web-{71AAC7CB-8687-4658-9B09-DDB30BE95366}" dt="2023-09-15T12:44:28.304" v="25"/>
+        <pc:sldMkLst>
+          <pc:docMk/>
+          <pc:sldMk cId="823722957" sldId="2147470592"/>
+        </pc:sldMkLst>
+      </pc:sldChg>
+      <pc:sldChg chg="del">
+        <pc:chgData name="Dwayne Natwick" userId="d11f0013982d5c78" providerId="Windows Live" clId="Web-{71AAC7CB-8687-4658-9B09-DDB30BE95366}" dt="2023-09-15T12:44:28.335" v="35"/>
+        <pc:sldMkLst>
+          <pc:docMk/>
+          <pc:sldMk cId="3948585883" sldId="2147470593"/>
+        </pc:sldMkLst>
+      </pc:sldChg>
+      <pc:sldChg chg="del">
+        <pc:chgData name="Dwayne Natwick" userId="d11f0013982d5c78" providerId="Windows Live" clId="Web-{71AAC7CB-8687-4658-9B09-DDB30BE95366}" dt="2023-09-15T12:44:28.304" v="21"/>
+        <pc:sldMkLst>
+          <pc:docMk/>
+          <pc:sldMk cId="449857184" sldId="2147470594"/>
+        </pc:sldMkLst>
+      </pc:sldChg>
+      <pc:sldChg chg="del">
+        <pc:chgData name="Dwayne Natwick" userId="d11f0013982d5c78" providerId="Windows Live" clId="Web-{71AAC7CB-8687-4658-9B09-DDB30BE95366}" dt="2023-09-15T12:44:28.288" v="17"/>
+        <pc:sldMkLst>
+          <pc:docMk/>
+          <pc:sldMk cId="3381500547" sldId="2147470595"/>
+        </pc:sldMkLst>
+      </pc:sldChg>
+      <pc:sldChg chg="del">
+        <pc:chgData name="Dwayne Natwick" userId="d11f0013982d5c78" providerId="Windows Live" clId="Web-{71AAC7CB-8687-4658-9B09-DDB30BE95366}" dt="2023-09-15T12:44:28.304" v="20"/>
+        <pc:sldMkLst>
+          <pc:docMk/>
+          <pc:sldMk cId="1619709891" sldId="2147470596"/>
+        </pc:sldMkLst>
+      </pc:sldChg>
+      <pc:sldChg chg="del">
+        <pc:chgData name="Dwayne Natwick" userId="d11f0013982d5c78" providerId="Windows Live" clId="Web-{71AAC7CB-8687-4658-9B09-DDB30BE95366}" dt="2023-09-15T12:44:28.304" v="19"/>
+        <pc:sldMkLst>
+          <pc:docMk/>
+          <pc:sldMk cId="3056138002" sldId="2147470597"/>
+        </pc:sldMkLst>
+      </pc:sldChg>
+      <pc:sldChg chg="del">
+        <pc:chgData name="Dwayne Natwick" userId="d11f0013982d5c78" providerId="Windows Live" clId="Web-{71AAC7CB-8687-4658-9B09-DDB30BE95366}" dt="2023-09-15T12:44:28.288" v="18"/>
+        <pc:sldMkLst>
+          <pc:docMk/>
+          <pc:sldMk cId="1103145275" sldId="2147470598"/>
+        </pc:sldMkLst>
+      </pc:sldChg>
+      <pc:sldChg chg="del">
+        <pc:chgData name="Dwayne Natwick" userId="d11f0013982d5c78" providerId="Windows Live" clId="Web-{71AAC7CB-8687-4658-9B09-DDB30BE95366}" dt="2023-09-15T12:44:28.288" v="15"/>
+        <pc:sldMkLst>
+          <pc:docMk/>
+          <pc:sldMk cId="2015539757" sldId="2147470599"/>
+        </pc:sldMkLst>
+      </pc:sldChg>
+      <pc:sldChg chg="del">
+        <pc:chgData name="Dwayne Natwick" userId="d11f0013982d5c78" providerId="Windows Live" clId="Web-{71AAC7CB-8687-4658-9B09-DDB30BE95366}" dt="2023-09-15T12:44:28.288" v="16"/>
+        <pc:sldMkLst>
+          <pc:docMk/>
+          <pc:sldMk cId="917890403" sldId="2147470600"/>
+        </pc:sldMkLst>
+      </pc:sldChg>
+      <pc:sldChg chg="del">
+        <pc:chgData name="Dwayne Natwick" userId="d11f0013982d5c78" providerId="Windows Live" clId="Web-{71AAC7CB-8687-4658-9B09-DDB30BE95366}" dt="2023-09-15T12:44:28.288" v="14"/>
+        <pc:sldMkLst>
+          <pc:docMk/>
+          <pc:sldMk cId="2983617397" sldId="2147470601"/>
+        </pc:sldMkLst>
+      </pc:sldChg>
+      <pc:sldChg chg="del">
+        <pc:chgData name="Dwayne Natwick" userId="d11f0013982d5c78" providerId="Windows Live" clId="Web-{71AAC7CB-8687-4658-9B09-DDB30BE95366}" dt="2023-09-15T12:44:28.272" v="12"/>
+        <pc:sldMkLst>
+          <pc:docMk/>
+          <pc:sldMk cId="1171446039" sldId="2147470602"/>
+        </pc:sldMkLst>
+      </pc:sldChg>
+      <pc:sldChg chg="del">
+        <pc:chgData name="Dwayne Natwick" userId="d11f0013982d5c78" providerId="Windows Live" clId="Web-{71AAC7CB-8687-4658-9B09-DDB30BE95366}" dt="2023-09-15T12:44:28.257" v="5"/>
+        <pc:sldMkLst>
+          <pc:docMk/>
+          <pc:sldMk cId="818381816" sldId="2147470603"/>
+        </pc:sldMkLst>
+      </pc:sldChg>
+      <pc:sldChg chg="del">
+        <pc:chgData name="Dwayne Natwick" userId="d11f0013982d5c78" providerId="Windows Live" clId="Web-{71AAC7CB-8687-4658-9B09-DDB30BE95366}" dt="2023-09-15T12:44:28.257" v="1"/>
+        <pc:sldMkLst>
+          <pc:docMk/>
+          <pc:sldMk cId="1742974702" sldId="2147470604"/>
+        </pc:sldMkLst>
+      </pc:sldChg>
+      <pc:sldChg chg="del">
+        <pc:chgData name="Dwayne Natwick" userId="d11f0013982d5c78" providerId="Windows Live" clId="Web-{71AAC7CB-8687-4658-9B09-DDB30BE95366}" dt="2023-09-15T12:44:28.257" v="2"/>
+        <pc:sldMkLst>
+          <pc:docMk/>
+          <pc:sldMk cId="1637472956" sldId="2147470605"/>
+        </pc:sldMkLst>
+      </pc:sldChg>
+      <pc:sldChg chg="del">
+        <pc:chgData name="Dwayne Natwick" userId="d11f0013982d5c78" providerId="Windows Live" clId="Web-{71AAC7CB-8687-4658-9B09-DDB30BE95366}" dt="2023-09-15T12:44:28.257" v="3"/>
+        <pc:sldMkLst>
+          <pc:docMk/>
+          <pc:sldMk cId="3543320482" sldId="2147470606"/>
+        </pc:sldMkLst>
+      </pc:sldChg>
+      <pc:sldChg chg="modSp">
+        <pc:chgData name="Dwayne Natwick" userId="d11f0013982d5c78" providerId="Windows Live" clId="Web-{71AAC7CB-8687-4658-9B09-DDB30BE95366}" dt="2023-09-15T12:54:46.410" v="175" actId="20577"/>
+        <pc:sldMkLst>
+          <pc:docMk/>
+          <pc:sldMk cId="2524577050" sldId="2147470612"/>
+        </pc:sldMkLst>
+        <pc:spChg chg="mod">
+          <ac:chgData name="Dwayne Natwick" userId="d11f0013982d5c78" providerId="Windows Live" clId="Web-{71AAC7CB-8687-4658-9B09-DDB30BE95366}" dt="2023-09-15T12:54:46.410" v="175" actId="20577"/>
+          <ac:spMkLst>
+            <pc:docMk/>
+            <pc:sldMk cId="2524577050" sldId="2147470612"/>
+            <ac:spMk id="3" creationId="{675F152E-D720-B366-A514-0FB945F73594}"/>
+          </ac:spMkLst>
+        </pc:spChg>
+      </pc:sldChg>
+      <pc:sldChg chg="del">
+        <pc:chgData name="Dwayne Natwick" userId="d11f0013982d5c78" providerId="Windows Live" clId="Web-{71AAC7CB-8687-4658-9B09-DDB30BE95366}" dt="2023-09-15T12:44:28.257" v="6"/>
+        <pc:sldMkLst>
+          <pc:docMk/>
+          <pc:sldMk cId="3921617707" sldId="2147470616"/>
+        </pc:sldMkLst>
+      </pc:sldChg>
+      <pc:sldChg chg="del">
+        <pc:chgData name="Dwayne Natwick" userId="d11f0013982d5c78" providerId="Windows Live" clId="Web-{71AAC7CB-8687-4658-9B09-DDB30BE95366}" dt="2023-09-15T12:44:28.304" v="26"/>
+        <pc:sldMkLst>
+          <pc:docMk/>
+          <pc:sldMk cId="1753990868" sldId="2147470617"/>
+        </pc:sldMkLst>
+      </pc:sldChg>
+      <pc:sldChg chg="modSp">
+        <pc:chgData name="Dwayne Natwick" userId="d11f0013982d5c78" providerId="Windows Live" clId="Web-{71AAC7CB-8687-4658-9B09-DDB30BE95366}" dt="2023-09-15T13:05:49.642" v="212" actId="20577"/>
+        <pc:sldMkLst>
+          <pc:docMk/>
+          <pc:sldMk cId="4211696148" sldId="2147470622"/>
+        </pc:sldMkLst>
+        <pc:spChg chg="mod">
+          <ac:chgData name="Dwayne Natwick" userId="d11f0013982d5c78" providerId="Windows Live" clId="Web-{71AAC7CB-8687-4658-9B09-DDB30BE95366}" dt="2023-09-15T13:05:49.642" v="212" actId="20577"/>
+          <ac:spMkLst>
+            <pc:docMk/>
+            <pc:sldMk cId="4211696148" sldId="2147470622"/>
+            <ac:spMk id="3" creationId="{8EBEE321-11FC-1E70-73C4-F9D3512763DC}"/>
           </ac:spMkLst>
         </pc:spChg>
       </pc:sldChg>
@@ -2108,1192 +3517,6 @@
           </pc:sldLayoutMkLst>
         </pc:sldLayoutChg>
       </pc:sldMasterChg>
-    </pc:docChg>
-  </pc:docChgLst>
-  <pc:docChgLst>
-    <pc:chgData name="Dwayne Natwick" userId="d11f0013982d5c78" providerId="Windows Live" clId="Web-{E91C9C7B-BB2D-4AFD-B454-4D10D65794B7}"/>
-    <pc:docChg chg="addSld delSld modSld sldOrd">
-      <pc:chgData name="Dwayne Natwick" userId="d11f0013982d5c78" providerId="Windows Live" clId="Web-{E91C9C7B-BB2D-4AFD-B454-4D10D65794B7}" dt="2023-09-14T19:08:05.804" v="1664"/>
-      <pc:docMkLst>
-        <pc:docMk/>
-      </pc:docMkLst>
-      <pc:sldChg chg="del">
-        <pc:chgData name="Dwayne Natwick" userId="d11f0013982d5c78" providerId="Windows Live" clId="Web-{E91C9C7B-BB2D-4AFD-B454-4D10D65794B7}" dt="2023-09-14T17:31:17.464" v="0"/>
-        <pc:sldMkLst>
-          <pc:docMk/>
-          <pc:sldMk cId="3164376787" sldId="2076137029"/>
-        </pc:sldMkLst>
-      </pc:sldChg>
-      <pc:sldChg chg="del">
-        <pc:chgData name="Dwayne Natwick" userId="d11f0013982d5c78" providerId="Windows Live" clId="Web-{E91C9C7B-BB2D-4AFD-B454-4D10D65794B7}" dt="2023-09-14T17:31:17.464" v="2"/>
-        <pc:sldMkLst>
-          <pc:docMk/>
-          <pc:sldMk cId="2024722602" sldId="2145705724"/>
-        </pc:sldMkLst>
-      </pc:sldChg>
-      <pc:sldChg chg="del">
-        <pc:chgData name="Dwayne Natwick" userId="d11f0013982d5c78" providerId="Windows Live" clId="Web-{E91C9C7B-BB2D-4AFD-B454-4D10D65794B7}" dt="2023-09-14T17:31:17.464" v="1"/>
-        <pc:sldMkLst>
-          <pc:docMk/>
-          <pc:sldMk cId="682611613" sldId="2147470555"/>
-        </pc:sldMkLst>
-      </pc:sldChg>
-      <pc:sldChg chg="ord">
-        <pc:chgData name="Dwayne Natwick" userId="d11f0013982d5c78" providerId="Windows Live" clId="Web-{E91C9C7B-BB2D-4AFD-B454-4D10D65794B7}" dt="2023-09-14T17:51:26.121" v="590"/>
-        <pc:sldMkLst>
-          <pc:docMk/>
-          <pc:sldMk cId="3682517411" sldId="2147470559"/>
-        </pc:sldMkLst>
-      </pc:sldChg>
-      <pc:sldChg chg="modSp modNotes">
-        <pc:chgData name="Dwayne Natwick" userId="d11f0013982d5c78" providerId="Windows Live" clId="Web-{E91C9C7B-BB2D-4AFD-B454-4D10D65794B7}" dt="2023-09-14T17:42:38.560" v="492"/>
-        <pc:sldMkLst>
-          <pc:docMk/>
-          <pc:sldMk cId="3861986293" sldId="2147470583"/>
-        </pc:sldMkLst>
-        <pc:spChg chg="mod">
-          <ac:chgData name="Dwayne Natwick" userId="d11f0013982d5c78" providerId="Windows Live" clId="Web-{E91C9C7B-BB2D-4AFD-B454-4D10D65794B7}" dt="2023-09-14T17:42:38.560" v="492"/>
-          <ac:spMkLst>
-            <pc:docMk/>
-            <pc:sldMk cId="3861986293" sldId="2147470583"/>
-            <ac:spMk id="4" creationId="{B269E640-ABA6-E084-C63A-7A1C976F25BF}"/>
-          </ac:spMkLst>
-        </pc:spChg>
-      </pc:sldChg>
-      <pc:sldChg chg="delSp modSp new mod ord modClrScheme chgLayout">
-        <pc:chgData name="Dwayne Natwick" userId="d11f0013982d5c78" providerId="Windows Live" clId="Web-{E91C9C7B-BB2D-4AFD-B454-4D10D65794B7}" dt="2023-09-14T17:33:46.078" v="165" actId="20577"/>
-        <pc:sldMkLst>
-          <pc:docMk/>
-          <pc:sldMk cId="2839524364" sldId="2147470607"/>
-        </pc:sldMkLst>
-        <pc:spChg chg="mod ord">
-          <ac:chgData name="Dwayne Natwick" userId="d11f0013982d5c78" providerId="Windows Live" clId="Web-{E91C9C7B-BB2D-4AFD-B454-4D10D65794B7}" dt="2023-09-14T17:31:51.387" v="29" actId="20577"/>
-          <ac:spMkLst>
-            <pc:docMk/>
-            <pc:sldMk cId="2839524364" sldId="2147470607"/>
-            <ac:spMk id="2" creationId="{09C07B8E-14FF-3C2D-BE0E-F25E0D4B4DB3}"/>
-          </ac:spMkLst>
-        </pc:spChg>
-        <pc:spChg chg="mod ord">
-          <ac:chgData name="Dwayne Natwick" userId="d11f0013982d5c78" providerId="Windows Live" clId="Web-{E91C9C7B-BB2D-4AFD-B454-4D10D65794B7}" dt="2023-09-14T17:33:46.078" v="165" actId="20577"/>
-          <ac:spMkLst>
-            <pc:docMk/>
-            <pc:sldMk cId="2839524364" sldId="2147470607"/>
-            <ac:spMk id="3" creationId="{C9D88242-39E7-FD9D-8E94-B07DD53805B5}"/>
-          </ac:spMkLst>
-        </pc:spChg>
-        <pc:spChg chg="del">
-          <ac:chgData name="Dwayne Natwick" userId="d11f0013982d5c78" providerId="Windows Live" clId="Web-{E91C9C7B-BB2D-4AFD-B454-4D10D65794B7}" dt="2023-09-14T17:31:33.340" v="4"/>
-          <ac:spMkLst>
-            <pc:docMk/>
-            <pc:sldMk cId="2839524364" sldId="2147470607"/>
-            <ac:spMk id="4" creationId="{5042A307-8831-D2F5-44AC-94A741452604}"/>
-          </ac:spMkLst>
-        </pc:spChg>
-      </pc:sldChg>
-      <pc:sldChg chg="modSp new">
-        <pc:chgData name="Dwayne Natwick" userId="d11f0013982d5c78" providerId="Windows Live" clId="Web-{E91C9C7B-BB2D-4AFD-B454-4D10D65794B7}" dt="2023-09-14T17:37:51.240" v="443" actId="20577"/>
-        <pc:sldMkLst>
-          <pc:docMk/>
-          <pc:sldMk cId="4086260143" sldId="2147470608"/>
-        </pc:sldMkLst>
-        <pc:spChg chg="mod">
-          <ac:chgData name="Dwayne Natwick" userId="d11f0013982d5c78" providerId="Windows Live" clId="Web-{E91C9C7B-BB2D-4AFD-B454-4D10D65794B7}" dt="2023-09-14T17:34:02.313" v="184" actId="20577"/>
-          <ac:spMkLst>
-            <pc:docMk/>
-            <pc:sldMk cId="4086260143" sldId="2147470608"/>
-            <ac:spMk id="2" creationId="{BA3D571B-B150-1C46-5F05-A09D93B7AE7A}"/>
-          </ac:spMkLst>
-        </pc:spChg>
-        <pc:spChg chg="mod">
-          <ac:chgData name="Dwayne Natwick" userId="d11f0013982d5c78" providerId="Windows Live" clId="Web-{E91C9C7B-BB2D-4AFD-B454-4D10D65794B7}" dt="2023-09-14T17:37:51.240" v="443" actId="20577"/>
-          <ac:spMkLst>
-            <pc:docMk/>
-            <pc:sldMk cId="4086260143" sldId="2147470608"/>
-            <ac:spMk id="3" creationId="{EEA0802F-FB95-E549-566C-5C162DF6AE92}"/>
-          </ac:spMkLst>
-        </pc:spChg>
-      </pc:sldChg>
-      <pc:sldChg chg="addSp delSp modSp new modNotes">
-        <pc:chgData name="Dwayne Natwick" userId="d11f0013982d5c78" providerId="Windows Live" clId="Web-{E91C9C7B-BB2D-4AFD-B454-4D10D65794B7}" dt="2023-09-14T17:40:31.854" v="487" actId="20577"/>
-        <pc:sldMkLst>
-          <pc:docMk/>
-          <pc:sldMk cId="379969417" sldId="2147470609"/>
-        </pc:sldMkLst>
-        <pc:spChg chg="mod">
-          <ac:chgData name="Dwayne Natwick" userId="d11f0013982d5c78" providerId="Windows Live" clId="Web-{E91C9C7B-BB2D-4AFD-B454-4D10D65794B7}" dt="2023-09-14T17:38:02.037" v="449" actId="20577"/>
-          <ac:spMkLst>
-            <pc:docMk/>
-            <pc:sldMk cId="379969417" sldId="2147470609"/>
-            <ac:spMk id="2" creationId="{C144469C-FA2E-89F4-8275-78C7809263F1}"/>
-          </ac:spMkLst>
-        </pc:spChg>
-        <pc:spChg chg="mod">
-          <ac:chgData name="Dwayne Natwick" userId="d11f0013982d5c78" providerId="Windows Live" clId="Web-{E91C9C7B-BB2D-4AFD-B454-4D10D65794B7}" dt="2023-09-14T17:40:31.854" v="487" actId="20577"/>
-          <ac:spMkLst>
-            <pc:docMk/>
-            <pc:sldMk cId="379969417" sldId="2147470609"/>
-            <ac:spMk id="3" creationId="{F3C47606-EBF4-2063-DFC2-36C74BD4FA71}"/>
-          </ac:spMkLst>
-        </pc:spChg>
-        <pc:spChg chg="add del mod">
-          <ac:chgData name="Dwayne Natwick" userId="d11f0013982d5c78" providerId="Windows Live" clId="Web-{E91C9C7B-BB2D-4AFD-B454-4D10D65794B7}" dt="2023-09-14T17:39:56.619" v="477"/>
-          <ac:spMkLst>
-            <pc:docMk/>
-            <pc:sldMk cId="379969417" sldId="2147470609"/>
-            <ac:spMk id="4" creationId="{90CC4371-D359-AE00-7C53-DC23F88881E8}"/>
-          </ac:spMkLst>
-        </pc:spChg>
-        <pc:spChg chg="add del mod">
-          <ac:chgData name="Dwayne Natwick" userId="d11f0013982d5c78" providerId="Windows Live" clId="Web-{E91C9C7B-BB2D-4AFD-B454-4D10D65794B7}" dt="2023-09-14T17:40:24.385" v="483"/>
-          <ac:spMkLst>
-            <pc:docMk/>
-            <pc:sldMk cId="379969417" sldId="2147470609"/>
-            <ac:spMk id="5" creationId="{4209EB24-B1ED-706B-D799-95AD17C92A69}"/>
-          </ac:spMkLst>
-        </pc:spChg>
-      </pc:sldChg>
-      <pc:sldChg chg="modSp new ord">
-        <pc:chgData name="Dwayne Natwick" userId="d11f0013982d5c78" providerId="Windows Live" clId="Web-{E91C9C7B-BB2D-4AFD-B454-4D10D65794B7}" dt="2023-09-14T18:55:40.078" v="1008" actId="20577"/>
-        <pc:sldMkLst>
-          <pc:docMk/>
-          <pc:sldMk cId="1929971971" sldId="2147470610"/>
-        </pc:sldMkLst>
-        <pc:spChg chg="mod">
-          <ac:chgData name="Dwayne Natwick" userId="d11f0013982d5c78" providerId="Windows Live" clId="Web-{E91C9C7B-BB2D-4AFD-B454-4D10D65794B7}" dt="2023-09-14T17:43:54.203" v="519" actId="20577"/>
-          <ac:spMkLst>
-            <pc:docMk/>
-            <pc:sldMk cId="1929971971" sldId="2147470610"/>
-            <ac:spMk id="2" creationId="{105B6354-2028-24B8-66E1-0D45962243CA}"/>
-          </ac:spMkLst>
-        </pc:spChg>
-        <pc:spChg chg="mod">
-          <ac:chgData name="Dwayne Natwick" userId="d11f0013982d5c78" providerId="Windows Live" clId="Web-{E91C9C7B-BB2D-4AFD-B454-4D10D65794B7}" dt="2023-09-14T18:55:40.078" v="1008" actId="20577"/>
-          <ac:spMkLst>
-            <pc:docMk/>
-            <pc:sldMk cId="1929971971" sldId="2147470610"/>
-            <ac:spMk id="3" creationId="{7407A4C3-86E5-EFE8-1E18-DC50FF22703B}"/>
-          </ac:spMkLst>
-        </pc:spChg>
-      </pc:sldChg>
-      <pc:sldChg chg="delSp modSp new mod modClrScheme chgLayout">
-        <pc:chgData name="Dwayne Natwick" userId="d11f0013982d5c78" providerId="Windows Live" clId="Web-{E91C9C7B-BB2D-4AFD-B454-4D10D65794B7}" dt="2023-09-14T17:56:40.582" v="716" actId="20577"/>
-        <pc:sldMkLst>
-          <pc:docMk/>
-          <pc:sldMk cId="2421521076" sldId="2147470611"/>
-        </pc:sldMkLst>
-        <pc:spChg chg="mod ord">
-          <ac:chgData name="Dwayne Natwick" userId="d11f0013982d5c78" providerId="Windows Live" clId="Web-{E91C9C7B-BB2D-4AFD-B454-4D10D65794B7}" dt="2023-09-14T17:46:12.159" v="549" actId="20577"/>
-          <ac:spMkLst>
-            <pc:docMk/>
-            <pc:sldMk cId="2421521076" sldId="2147470611"/>
-            <ac:spMk id="2" creationId="{0F4D640B-8499-E0C5-C508-35266E13B6E6}"/>
-          </ac:spMkLst>
-        </pc:spChg>
-        <pc:spChg chg="mod ord">
-          <ac:chgData name="Dwayne Natwick" userId="d11f0013982d5c78" providerId="Windows Live" clId="Web-{E91C9C7B-BB2D-4AFD-B454-4D10D65794B7}" dt="2023-09-14T17:56:40.582" v="716" actId="20577"/>
-          <ac:spMkLst>
-            <pc:docMk/>
-            <pc:sldMk cId="2421521076" sldId="2147470611"/>
-            <ac:spMk id="3" creationId="{358EA097-101A-43CC-781A-E0E92A4D22E7}"/>
-          </ac:spMkLst>
-        </pc:spChg>
-        <pc:spChg chg="del">
-          <ac:chgData name="Dwayne Natwick" userId="d11f0013982d5c78" providerId="Windows Live" clId="Web-{E91C9C7B-BB2D-4AFD-B454-4D10D65794B7}" dt="2023-09-14T17:45:27.769" v="522"/>
-          <ac:spMkLst>
-            <pc:docMk/>
-            <pc:sldMk cId="2421521076" sldId="2147470611"/>
-            <ac:spMk id="4" creationId="{9F2C3E0F-6202-6F36-75C7-7F943D05D8A4}"/>
-          </ac:spMkLst>
-        </pc:spChg>
-      </pc:sldChg>
-      <pc:sldChg chg="addSp modSp new">
-        <pc:chgData name="Dwayne Natwick" userId="d11f0013982d5c78" providerId="Windows Live" clId="Web-{E91C9C7B-BB2D-4AFD-B454-4D10D65794B7}" dt="2023-09-14T18:53:57.232" v="890" actId="20577"/>
-        <pc:sldMkLst>
-          <pc:docMk/>
-          <pc:sldMk cId="2524577050" sldId="2147470612"/>
-        </pc:sldMkLst>
-        <pc:spChg chg="mod">
-          <ac:chgData name="Dwayne Natwick" userId="d11f0013982d5c78" providerId="Windows Live" clId="Web-{E91C9C7B-BB2D-4AFD-B454-4D10D65794B7}" dt="2023-09-14T18:53:57.232" v="890" actId="20577"/>
-          <ac:spMkLst>
-            <pc:docMk/>
-            <pc:sldMk cId="2524577050" sldId="2147470612"/>
-            <ac:spMk id="2" creationId="{CDF7A4E4-C3FF-9DA3-1E01-6E7681781D01}"/>
-          </ac:spMkLst>
-        </pc:spChg>
-        <pc:spChg chg="mod">
-          <ac:chgData name="Dwayne Natwick" userId="d11f0013982d5c78" providerId="Windows Live" clId="Web-{E91C9C7B-BB2D-4AFD-B454-4D10D65794B7}" dt="2023-09-14T17:52:29.669" v="601" actId="20577"/>
-          <ac:spMkLst>
-            <pc:docMk/>
-            <pc:sldMk cId="2524577050" sldId="2147470612"/>
-            <ac:spMk id="3" creationId="{675F152E-D720-B366-A514-0FB945F73594}"/>
-          </ac:spMkLst>
-        </pc:spChg>
-        <pc:spChg chg="add mod">
-          <ac:chgData name="Dwayne Natwick" userId="d11f0013982d5c78" providerId="Windows Live" clId="Web-{E91C9C7B-BB2D-4AFD-B454-4D10D65794B7}" dt="2023-09-14T17:52:43.216" v="605" actId="1076"/>
-          <ac:spMkLst>
-            <pc:docMk/>
-            <pc:sldMk cId="2524577050" sldId="2147470612"/>
-            <ac:spMk id="4" creationId="{57240181-C93A-F4E8-472C-1AF0F2C2A855}"/>
-          </ac:spMkLst>
-        </pc:spChg>
-        <pc:spChg chg="add mod">
-          <ac:chgData name="Dwayne Natwick" userId="d11f0013982d5c78" providerId="Windows Live" clId="Web-{E91C9C7B-BB2D-4AFD-B454-4D10D65794B7}" dt="2023-09-14T17:54:08.515" v="611" actId="1076"/>
-          <ac:spMkLst>
-            <pc:docMk/>
-            <pc:sldMk cId="2524577050" sldId="2147470612"/>
-            <ac:spMk id="5" creationId="{D3A447DE-6903-1590-61FB-AB160302D80B}"/>
-          </ac:spMkLst>
-        </pc:spChg>
-        <pc:spChg chg="add mod">
-          <ac:chgData name="Dwayne Natwick" userId="d11f0013982d5c78" providerId="Windows Live" clId="Web-{E91C9C7B-BB2D-4AFD-B454-4D10D65794B7}" dt="2023-09-14T17:54:29.157" v="615" actId="1076"/>
-          <ac:spMkLst>
-            <pc:docMk/>
-            <pc:sldMk cId="2524577050" sldId="2147470612"/>
-            <ac:spMk id="6" creationId="{520C77B9-C55A-8B6C-DC16-CEE27B62CD45}"/>
-          </ac:spMkLst>
-        </pc:spChg>
-        <pc:spChg chg="add mod">
-          <ac:chgData name="Dwayne Natwick" userId="d11f0013982d5c78" providerId="Windows Live" clId="Web-{E91C9C7B-BB2D-4AFD-B454-4D10D65794B7}" dt="2023-09-14T17:54:58.704" v="620" actId="14100"/>
-          <ac:spMkLst>
-            <pc:docMk/>
-            <pc:sldMk cId="2524577050" sldId="2147470612"/>
-            <ac:spMk id="7" creationId="{C25B8EDA-4C77-A71B-612F-D5F8559DF688}"/>
-          </ac:spMkLst>
-        </pc:spChg>
-      </pc:sldChg>
-      <pc:sldChg chg="addSp delSp modSp new mod modClrScheme chgLayout modNotes">
-        <pc:chgData name="Dwayne Natwick" userId="d11f0013982d5c78" providerId="Windows Live" clId="Web-{E91C9C7B-BB2D-4AFD-B454-4D10D65794B7}" dt="2023-09-14T18:49:56.021" v="875"/>
-        <pc:sldMkLst>
-          <pc:docMk/>
-          <pc:sldMk cId="848203549" sldId="2147470613"/>
-        </pc:sldMkLst>
-        <pc:spChg chg="mod">
-          <ac:chgData name="Dwayne Natwick" userId="d11f0013982d5c78" providerId="Windows Live" clId="Web-{E91C9C7B-BB2D-4AFD-B454-4D10D65794B7}" dt="2023-09-14T18:49:22.770" v="864"/>
-          <ac:spMkLst>
-            <pc:docMk/>
-            <pc:sldMk cId="848203549" sldId="2147470613"/>
-            <ac:spMk id="2" creationId="{63644AF7-A23F-1DD9-6E3C-EE7368917D77}"/>
-          </ac:spMkLst>
-        </pc:spChg>
-        <pc:spChg chg="mod">
-          <ac:chgData name="Dwayne Natwick" userId="d11f0013982d5c78" providerId="Windows Live" clId="Web-{E91C9C7B-BB2D-4AFD-B454-4D10D65794B7}" dt="2023-09-14T18:49:35.833" v="868" actId="14100"/>
-          <ac:spMkLst>
-            <pc:docMk/>
-            <pc:sldMk cId="848203549" sldId="2147470613"/>
-            <ac:spMk id="3" creationId="{2E50BA7C-3255-BC69-812B-892217F5D36D}"/>
-          </ac:spMkLst>
-        </pc:spChg>
-        <pc:spChg chg="add del mod">
-          <ac:chgData name="Dwayne Natwick" userId="d11f0013982d5c78" providerId="Windows Live" clId="Web-{E91C9C7B-BB2D-4AFD-B454-4D10D65794B7}" dt="2023-09-14T18:49:56.021" v="875"/>
-          <ac:spMkLst>
-            <pc:docMk/>
-            <pc:sldMk cId="848203549" sldId="2147470613"/>
-            <ac:spMk id="5" creationId="{922D9E5B-053B-2662-2AD3-E7F26E827B71}"/>
-          </ac:spMkLst>
-        </pc:spChg>
-        <pc:picChg chg="add mod">
-          <ac:chgData name="Dwayne Natwick" userId="d11f0013982d5c78" providerId="Windows Live" clId="Web-{E91C9C7B-BB2D-4AFD-B454-4D10D65794B7}" dt="2023-09-14T18:49:22.770" v="864"/>
-          <ac:picMkLst>
-            <pc:docMk/>
-            <pc:sldMk cId="848203549" sldId="2147470613"/>
-            <ac:picMk id="4" creationId="{D26C38C8-22B0-0868-2D0E-669BDC2059B1}"/>
-          </ac:picMkLst>
-        </pc:picChg>
-      </pc:sldChg>
-      <pc:sldChg chg="addSp delSp modSp new modNotes">
-        <pc:chgData name="Dwayne Natwick" userId="d11f0013982d5c78" providerId="Windows Live" clId="Web-{E91C9C7B-BB2D-4AFD-B454-4D10D65794B7}" dt="2023-09-14T18:57:11.581" v="1105"/>
-        <pc:sldMkLst>
-          <pc:docMk/>
-          <pc:sldMk cId="3770102974" sldId="2147470614"/>
-        </pc:sldMkLst>
-        <pc:spChg chg="mod">
-          <ac:chgData name="Dwayne Natwick" userId="d11f0013982d5c78" providerId="Windows Live" clId="Web-{E91C9C7B-BB2D-4AFD-B454-4D10D65794B7}" dt="2023-09-14T18:54:08.513" v="904" actId="20577"/>
-          <ac:spMkLst>
-            <pc:docMk/>
-            <pc:sldMk cId="3770102974" sldId="2147470614"/>
-            <ac:spMk id="2" creationId="{CFCF5E71-8482-5C4A-1937-62180CED69B1}"/>
-          </ac:spMkLst>
-        </pc:spChg>
-        <pc:spChg chg="mod">
-          <ac:chgData name="Dwayne Natwick" userId="d11f0013982d5c78" providerId="Windows Live" clId="Web-{E91C9C7B-BB2D-4AFD-B454-4D10D65794B7}" dt="2023-09-14T18:56:47.659" v="1101" actId="20577"/>
-          <ac:spMkLst>
-            <pc:docMk/>
-            <pc:sldMk cId="3770102974" sldId="2147470614"/>
-            <ac:spMk id="3" creationId="{2E8F6CC6-DEE5-E7CD-0610-AF173BD7F8EC}"/>
-          </ac:spMkLst>
-        </pc:spChg>
-        <pc:spChg chg="add del mod">
-          <ac:chgData name="Dwayne Natwick" userId="d11f0013982d5c78" providerId="Windows Live" clId="Web-{E91C9C7B-BB2D-4AFD-B454-4D10D65794B7}" dt="2023-09-14T18:57:11.581" v="1105"/>
-          <ac:spMkLst>
-            <pc:docMk/>
-            <pc:sldMk cId="3770102974" sldId="2147470614"/>
-            <ac:spMk id="4" creationId="{F59A0AD9-2731-F101-8A88-A97CEEED7C5D}"/>
-          </ac:spMkLst>
-        </pc:spChg>
-      </pc:sldChg>
-      <pc:sldChg chg="addSp delSp modSp new mod chgLayout">
-        <pc:chgData name="Dwayne Natwick" userId="d11f0013982d5c78" providerId="Windows Live" clId="Web-{E91C9C7B-BB2D-4AFD-B454-4D10D65794B7}" dt="2023-09-14T18:57:20.347" v="1109"/>
-        <pc:sldMkLst>
-          <pc:docMk/>
-          <pc:sldMk cId="3933044535" sldId="2147470615"/>
-        </pc:sldMkLst>
-        <pc:spChg chg="mod ord">
-          <ac:chgData name="Dwayne Natwick" userId="d11f0013982d5c78" providerId="Windows Live" clId="Web-{E91C9C7B-BB2D-4AFD-B454-4D10D65794B7}" dt="2023-09-14T18:50:45.163" v="882" actId="20577"/>
-          <ac:spMkLst>
-            <pc:docMk/>
-            <pc:sldMk cId="3933044535" sldId="2147470615"/>
-            <ac:spMk id="2" creationId="{EDF87A23-46AF-F5CE-1408-BC8C91B71A9B}"/>
-          </ac:spMkLst>
-        </pc:spChg>
-        <pc:spChg chg="del">
-          <ac:chgData name="Dwayne Natwick" userId="d11f0013982d5c78" providerId="Windows Live" clId="Web-{E91C9C7B-BB2D-4AFD-B454-4D10D65794B7}" dt="2023-09-14T18:50:39.101" v="878"/>
-          <ac:spMkLst>
-            <pc:docMk/>
-            <pc:sldMk cId="3933044535" sldId="2147470615"/>
-            <ac:spMk id="3" creationId="{884F335E-7FF2-0DF4-80B1-93DACA319859}"/>
-          </ac:spMkLst>
-        </pc:spChg>
-        <pc:spChg chg="add del mod">
-          <ac:chgData name="Dwayne Natwick" userId="d11f0013982d5c78" providerId="Windows Live" clId="Web-{E91C9C7B-BB2D-4AFD-B454-4D10D65794B7}" dt="2023-09-14T18:57:20.347" v="1109"/>
-          <ac:spMkLst>
-            <pc:docMk/>
-            <pc:sldMk cId="3933044535" sldId="2147470615"/>
-            <ac:spMk id="4" creationId="{86024C3E-11CA-B130-F720-2EDCEA10853F}"/>
-          </ac:spMkLst>
-        </pc:spChg>
-      </pc:sldChg>
-      <pc:sldChg chg="add replId">
-        <pc:chgData name="Dwayne Natwick" userId="d11f0013982d5c78" providerId="Windows Live" clId="Web-{E91C9C7B-BB2D-4AFD-B454-4D10D65794B7}" dt="2023-09-14T18:51:18.305" v="883"/>
-        <pc:sldMkLst>
-          <pc:docMk/>
-          <pc:sldMk cId="3921617707" sldId="2147470616"/>
-        </pc:sldMkLst>
-      </pc:sldChg>
-      <pc:sldChg chg="modSp add replId">
-        <pc:chgData name="Dwayne Natwick" userId="d11f0013982d5c78" providerId="Windows Live" clId="Web-{E91C9C7B-BB2D-4AFD-B454-4D10D65794B7}" dt="2023-09-14T18:51:54.634" v="887" actId="20577"/>
-        <pc:sldMkLst>
-          <pc:docMk/>
-          <pc:sldMk cId="1753990868" sldId="2147470617"/>
-        </pc:sldMkLst>
-        <pc:spChg chg="mod">
-          <ac:chgData name="Dwayne Natwick" userId="d11f0013982d5c78" providerId="Windows Live" clId="Web-{E91C9C7B-BB2D-4AFD-B454-4D10D65794B7}" dt="2023-09-14T18:51:54.634" v="887" actId="20577"/>
-          <ac:spMkLst>
-            <pc:docMk/>
-            <pc:sldMk cId="1753990868" sldId="2147470617"/>
-            <ac:spMk id="2" creationId="{EDF87A23-46AF-F5CE-1408-BC8C91B71A9B}"/>
-          </ac:spMkLst>
-        </pc:spChg>
-      </pc:sldChg>
-      <pc:sldChg chg="add replId">
-        <pc:chgData name="Dwayne Natwick" userId="d11f0013982d5c78" providerId="Windows Live" clId="Web-{E91C9C7B-BB2D-4AFD-B454-4D10D65794B7}" dt="2023-09-14T18:52:16.213" v="888"/>
-        <pc:sldMkLst>
-          <pc:docMk/>
-          <pc:sldMk cId="3572404749" sldId="2147470618"/>
-        </pc:sldMkLst>
-      </pc:sldChg>
-      <pc:sldChg chg="modSp new mod chgLayout">
-        <pc:chgData name="Dwayne Natwick" userId="d11f0013982d5c78" providerId="Windows Live" clId="Web-{E91C9C7B-BB2D-4AFD-B454-4D10D65794B7}" dt="2023-09-14T18:57:44.895" v="1139" actId="20577"/>
-        <pc:sldMkLst>
-          <pc:docMk/>
-          <pc:sldMk cId="2409884957" sldId="2147470619"/>
-        </pc:sldMkLst>
-        <pc:spChg chg="mod ord">
-          <ac:chgData name="Dwayne Natwick" userId="d11f0013982d5c78" providerId="Windows Live" clId="Web-{E91C9C7B-BB2D-4AFD-B454-4D10D65794B7}" dt="2023-09-14T18:57:44.895" v="1139" actId="20577"/>
-          <ac:spMkLst>
-            <pc:docMk/>
-            <pc:sldMk cId="2409884957" sldId="2147470619"/>
-            <ac:spMk id="2" creationId="{DD98F413-FA4A-5DAC-66E1-E02E10AE53D2}"/>
-          </ac:spMkLst>
-        </pc:spChg>
-      </pc:sldChg>
-      <pc:sldChg chg="modSp new">
-        <pc:chgData name="Dwayne Natwick" userId="d11f0013982d5c78" providerId="Windows Live" clId="Web-{E91C9C7B-BB2D-4AFD-B454-4D10D65794B7}" dt="2023-09-14T19:03:13.373" v="1632" actId="20577"/>
-        <pc:sldMkLst>
-          <pc:docMk/>
-          <pc:sldMk cId="3776730813" sldId="2147470620"/>
-        </pc:sldMkLst>
-        <pc:spChg chg="mod">
-          <ac:chgData name="Dwayne Natwick" userId="d11f0013982d5c78" providerId="Windows Live" clId="Web-{E91C9C7B-BB2D-4AFD-B454-4D10D65794B7}" dt="2023-09-14T18:57:56.348" v="1142" actId="20577"/>
-          <ac:spMkLst>
-            <pc:docMk/>
-            <pc:sldMk cId="3776730813" sldId="2147470620"/>
-            <ac:spMk id="2" creationId="{B98733DD-1422-5649-B7EC-6C22F68294E7}"/>
-          </ac:spMkLst>
-        </pc:spChg>
-        <pc:spChg chg="mod">
-          <ac:chgData name="Dwayne Natwick" userId="d11f0013982d5c78" providerId="Windows Live" clId="Web-{E91C9C7B-BB2D-4AFD-B454-4D10D65794B7}" dt="2023-09-14T19:03:13.373" v="1632" actId="20577"/>
-          <ac:spMkLst>
-            <pc:docMk/>
-            <pc:sldMk cId="3776730813" sldId="2147470620"/>
-            <ac:spMk id="3" creationId="{6877C1DD-3080-4AEC-3E55-CF8ED035D114}"/>
-          </ac:spMkLst>
-        </pc:spChg>
-      </pc:sldChg>
-      <pc:sldChg chg="addSp delSp modSp new modNotes">
-        <pc:chgData name="Dwayne Natwick" userId="d11f0013982d5c78" providerId="Windows Live" clId="Web-{E91C9C7B-BB2D-4AFD-B454-4D10D65794B7}" dt="2023-09-14T19:08:05.804" v="1664"/>
-        <pc:sldMkLst>
-          <pc:docMk/>
-          <pc:sldMk cId="1675599562" sldId="2147470621"/>
-        </pc:sldMkLst>
-        <pc:spChg chg="mod">
-          <ac:chgData name="Dwayne Natwick" userId="d11f0013982d5c78" providerId="Windows Live" clId="Web-{E91C9C7B-BB2D-4AFD-B454-4D10D65794B7}" dt="2023-09-14T19:03:28.920" v="1644" actId="20577"/>
-          <ac:spMkLst>
-            <pc:docMk/>
-            <pc:sldMk cId="1675599562" sldId="2147470621"/>
-            <ac:spMk id="2" creationId="{4F2E3601-0348-0AC8-926D-2963A6EBDE54}"/>
-          </ac:spMkLst>
-        </pc:spChg>
-        <pc:spChg chg="mod">
-          <ac:chgData name="Dwayne Natwick" userId="d11f0013982d5c78" providerId="Windows Live" clId="Web-{E91C9C7B-BB2D-4AFD-B454-4D10D65794B7}" dt="2023-09-14T19:03:35.499" v="1647" actId="20577"/>
-          <ac:spMkLst>
-            <pc:docMk/>
-            <pc:sldMk cId="1675599562" sldId="2147470621"/>
-            <ac:spMk id="3" creationId="{226A9B3B-731B-E601-049B-025098728B19}"/>
-          </ac:spMkLst>
-        </pc:spChg>
-        <pc:spChg chg="add del mod">
-          <ac:chgData name="Dwayne Natwick" userId="d11f0013982d5c78" providerId="Windows Live" clId="Web-{E91C9C7B-BB2D-4AFD-B454-4D10D65794B7}" dt="2023-09-14T19:08:05.804" v="1664"/>
-          <ac:spMkLst>
-            <pc:docMk/>
-            <pc:sldMk cId="1675599562" sldId="2147470621"/>
-            <ac:spMk id="4" creationId="{475DAF6E-27CB-D2FC-04C5-770BF18601CB}"/>
-          </ac:spMkLst>
-        </pc:spChg>
-      </pc:sldChg>
-      <pc:sldChg chg="addSp modSp new modNotes">
-        <pc:chgData name="Dwayne Natwick" userId="d11f0013982d5c78" providerId="Windows Live" clId="Web-{E91C9C7B-BB2D-4AFD-B454-4D10D65794B7}" dt="2023-09-14T19:04:44.751" v="1660" actId="1076"/>
-        <pc:sldMkLst>
-          <pc:docMk/>
-          <pc:sldMk cId="4211696148" sldId="2147470622"/>
-        </pc:sldMkLst>
-        <pc:spChg chg="mod">
-          <ac:chgData name="Dwayne Natwick" userId="d11f0013982d5c78" providerId="Windows Live" clId="Web-{E91C9C7B-BB2D-4AFD-B454-4D10D65794B7}" dt="2023-09-14T19:04:26.719" v="1655" actId="20577"/>
-          <ac:spMkLst>
-            <pc:docMk/>
-            <pc:sldMk cId="4211696148" sldId="2147470622"/>
-            <ac:spMk id="2" creationId="{BFA64A8C-98C4-0EC5-C359-C3F08F09CCD2}"/>
-          </ac:spMkLst>
-        </pc:spChg>
-        <pc:spChg chg="add mod">
-          <ac:chgData name="Dwayne Natwick" userId="d11f0013982d5c78" providerId="Windows Live" clId="Web-{E91C9C7B-BB2D-4AFD-B454-4D10D65794B7}" dt="2023-09-14T19:04:44.751" v="1660" actId="1076"/>
-          <ac:spMkLst>
-            <pc:docMk/>
-            <pc:sldMk cId="4211696148" sldId="2147470622"/>
-            <ac:spMk id="4" creationId="{894C4432-C891-B2F2-36B5-DC9ABE788A25}"/>
-          </ac:spMkLst>
-        </pc:spChg>
-      </pc:sldChg>
-    </pc:docChg>
-  </pc:docChgLst>
-  <pc:docChgLst>
-    <pc:chgData name="Dwayne Natwick" userId="d11f0013982d5c78" providerId="Windows Live" clId="Web-{71AAC7CB-8687-4658-9B09-DDB30BE95366}"/>
-    <pc:docChg chg="delSld modSld sldOrd">
-      <pc:chgData name="Dwayne Natwick" userId="d11f0013982d5c78" providerId="Windows Live" clId="Web-{71AAC7CB-8687-4658-9B09-DDB30BE95366}" dt="2023-09-15T13:05:49.642" v="212" actId="20577"/>
-      <pc:docMkLst>
-        <pc:docMk/>
-      </pc:docMkLst>
-      <pc:sldChg chg="del">
-        <pc:chgData name="Dwayne Natwick" userId="d11f0013982d5c78" providerId="Windows Live" clId="Web-{71AAC7CB-8687-4658-9B09-DDB30BE95366}" dt="2023-09-15T12:44:28.257" v="0"/>
-        <pc:sldMkLst>
-          <pc:docMk/>
-          <pc:sldMk cId="4270848246" sldId="2147470560"/>
-        </pc:sldMkLst>
-      </pc:sldChg>
-      <pc:sldChg chg="del">
-        <pc:chgData name="Dwayne Natwick" userId="d11f0013982d5c78" providerId="Windows Live" clId="Web-{71AAC7CB-8687-4658-9B09-DDB30BE95366}" dt="2023-09-15T12:44:28.350" v="36"/>
-        <pc:sldMkLst>
-          <pc:docMk/>
-          <pc:sldMk cId="3644458694" sldId="2147470564"/>
-        </pc:sldMkLst>
-      </pc:sldChg>
-      <pc:sldChg chg="del">
-        <pc:chgData name="Dwayne Natwick" userId="d11f0013982d5c78" providerId="Windows Live" clId="Web-{71AAC7CB-8687-4658-9B09-DDB30BE95366}" dt="2023-09-15T12:44:37.835" v="38"/>
-        <pc:sldMkLst>
-          <pc:docMk/>
-          <pc:sldMk cId="2739312586" sldId="2147470565"/>
-        </pc:sldMkLst>
-      </pc:sldChg>
-      <pc:sldChg chg="ord">
-        <pc:chgData name="Dwayne Natwick" userId="d11f0013982d5c78" providerId="Windows Live" clId="Web-{71AAC7CB-8687-4658-9B09-DDB30BE95366}" dt="2023-09-15T12:44:35.898" v="37"/>
-        <pc:sldMkLst>
-          <pc:docMk/>
-          <pc:sldMk cId="2251723249" sldId="2147470571"/>
-        </pc:sldMkLst>
-      </pc:sldChg>
-      <pc:sldChg chg="del">
-        <pc:chgData name="Dwayne Natwick" userId="d11f0013982d5c78" providerId="Windows Live" clId="Web-{71AAC7CB-8687-4658-9B09-DDB30BE95366}" dt="2023-09-15T12:44:28.335" v="34"/>
-        <pc:sldMkLst>
-          <pc:docMk/>
-          <pc:sldMk cId="948136224" sldId="2147470573"/>
-        </pc:sldMkLst>
-      </pc:sldChg>
-      <pc:sldChg chg="del">
-        <pc:chgData name="Dwayne Natwick" userId="d11f0013982d5c78" providerId="Windows Live" clId="Web-{71AAC7CB-8687-4658-9B09-DDB30BE95366}" dt="2023-09-15T12:44:28.304" v="24"/>
-        <pc:sldMkLst>
-          <pc:docMk/>
-          <pc:sldMk cId="2030514790" sldId="2147470574"/>
-        </pc:sldMkLst>
-      </pc:sldChg>
-      <pc:sldChg chg="del">
-        <pc:chgData name="Dwayne Natwick" userId="d11f0013982d5c78" providerId="Windows Live" clId="Web-{71AAC7CB-8687-4658-9B09-DDB30BE95366}" dt="2023-09-15T12:44:28.304" v="22"/>
-        <pc:sldMkLst>
-          <pc:docMk/>
-          <pc:sldMk cId="3649936595" sldId="2147470575"/>
-        </pc:sldMkLst>
-      </pc:sldChg>
-      <pc:sldChg chg="del">
-        <pc:chgData name="Dwayne Natwick" userId="d11f0013982d5c78" providerId="Windows Live" clId="Web-{71AAC7CB-8687-4658-9B09-DDB30BE95366}" dt="2023-09-15T12:44:28.272" v="13"/>
-        <pc:sldMkLst>
-          <pc:docMk/>
-          <pc:sldMk cId="511214272" sldId="2147470576"/>
-        </pc:sldMkLst>
-      </pc:sldChg>
-      <pc:sldChg chg="del">
-        <pc:chgData name="Dwayne Natwick" userId="d11f0013982d5c78" providerId="Windows Live" clId="Web-{71AAC7CB-8687-4658-9B09-DDB30BE95366}" dt="2023-09-15T12:44:28.257" v="9"/>
-        <pc:sldMkLst>
-          <pc:docMk/>
-          <pc:sldMk cId="4196600117" sldId="2147470577"/>
-        </pc:sldMkLst>
-      </pc:sldChg>
-      <pc:sldChg chg="del">
-        <pc:chgData name="Dwayne Natwick" userId="d11f0013982d5c78" providerId="Windows Live" clId="Web-{71AAC7CB-8687-4658-9B09-DDB30BE95366}" dt="2023-09-15T12:44:28.257" v="8"/>
-        <pc:sldMkLst>
-          <pc:docMk/>
-          <pc:sldMk cId="1593797140" sldId="2147470578"/>
-        </pc:sldMkLst>
-      </pc:sldChg>
-      <pc:sldChg chg="del">
-        <pc:chgData name="Dwayne Natwick" userId="d11f0013982d5c78" providerId="Windows Live" clId="Web-{71AAC7CB-8687-4658-9B09-DDB30BE95366}" dt="2023-09-15T12:44:28.272" v="11"/>
-        <pc:sldMkLst>
-          <pc:docMk/>
-          <pc:sldMk cId="90178162" sldId="2147470579"/>
-        </pc:sldMkLst>
-      </pc:sldChg>
-      <pc:sldChg chg="del">
-        <pc:chgData name="Dwayne Natwick" userId="d11f0013982d5c78" providerId="Windows Live" clId="Web-{71AAC7CB-8687-4658-9B09-DDB30BE95366}" dt="2023-09-15T12:44:28.272" v="10"/>
-        <pc:sldMkLst>
-          <pc:docMk/>
-          <pc:sldMk cId="1437570267" sldId="2147470580"/>
-        </pc:sldMkLst>
-      </pc:sldChg>
-      <pc:sldChg chg="del">
-        <pc:chgData name="Dwayne Natwick" userId="d11f0013982d5c78" providerId="Windows Live" clId="Web-{71AAC7CB-8687-4658-9B09-DDB30BE95366}" dt="2023-09-15T12:44:28.257" v="7"/>
-        <pc:sldMkLst>
-          <pc:docMk/>
-          <pc:sldMk cId="1083283128" sldId="2147470581"/>
-        </pc:sldMkLst>
-      </pc:sldChg>
-      <pc:sldChg chg="del">
-        <pc:chgData name="Dwayne Natwick" userId="d11f0013982d5c78" providerId="Windows Live" clId="Web-{71AAC7CB-8687-4658-9B09-DDB30BE95366}" dt="2023-09-15T12:44:28.257" v="4"/>
-        <pc:sldMkLst>
-          <pc:docMk/>
-          <pc:sldMk cId="3763189814" sldId="2147470582"/>
-        </pc:sldMkLst>
-      </pc:sldChg>
-      <pc:sldChg chg="del">
-        <pc:chgData name="Dwayne Natwick" userId="d11f0013982d5c78" providerId="Windows Live" clId="Web-{71AAC7CB-8687-4658-9B09-DDB30BE95366}" dt="2023-09-15T12:44:28.335" v="33"/>
-        <pc:sldMkLst>
-          <pc:docMk/>
-          <pc:sldMk cId="3386646133" sldId="2147470584"/>
-        </pc:sldMkLst>
-      </pc:sldChg>
-      <pc:sldChg chg="del">
-        <pc:chgData name="Dwayne Natwick" userId="d11f0013982d5c78" providerId="Windows Live" clId="Web-{71AAC7CB-8687-4658-9B09-DDB30BE95366}" dt="2023-09-15T12:44:28.335" v="32"/>
-        <pc:sldMkLst>
-          <pc:docMk/>
-          <pc:sldMk cId="3650723693" sldId="2147470585"/>
-        </pc:sldMkLst>
-      </pc:sldChg>
-      <pc:sldChg chg="del">
-        <pc:chgData name="Dwayne Natwick" userId="d11f0013982d5c78" providerId="Windows Live" clId="Web-{71AAC7CB-8687-4658-9B09-DDB30BE95366}" dt="2023-09-15T12:44:28.335" v="31"/>
-        <pc:sldMkLst>
-          <pc:docMk/>
-          <pc:sldMk cId="694622249" sldId="2147470586"/>
-        </pc:sldMkLst>
-      </pc:sldChg>
-      <pc:sldChg chg="del">
-        <pc:chgData name="Dwayne Natwick" userId="d11f0013982d5c78" providerId="Windows Live" clId="Web-{71AAC7CB-8687-4658-9B09-DDB30BE95366}" dt="2023-09-15T12:44:28.335" v="30"/>
-        <pc:sldMkLst>
-          <pc:docMk/>
-          <pc:sldMk cId="347590927" sldId="2147470587"/>
-        </pc:sldMkLst>
-      </pc:sldChg>
-      <pc:sldChg chg="del">
-        <pc:chgData name="Dwayne Natwick" userId="d11f0013982d5c78" providerId="Windows Live" clId="Web-{71AAC7CB-8687-4658-9B09-DDB30BE95366}" dt="2023-09-15T12:44:28.319" v="28"/>
-        <pc:sldMkLst>
-          <pc:docMk/>
-          <pc:sldMk cId="2214484181" sldId="2147470588"/>
-        </pc:sldMkLst>
-      </pc:sldChg>
-      <pc:sldChg chg="del">
-        <pc:chgData name="Dwayne Natwick" userId="d11f0013982d5c78" providerId="Windows Live" clId="Web-{71AAC7CB-8687-4658-9B09-DDB30BE95366}" dt="2023-09-15T12:44:28.319" v="29"/>
-        <pc:sldMkLst>
-          <pc:docMk/>
-          <pc:sldMk cId="3716502182" sldId="2147470589"/>
-        </pc:sldMkLst>
-      </pc:sldChg>
-      <pc:sldChg chg="del">
-        <pc:chgData name="Dwayne Natwick" userId="d11f0013982d5c78" providerId="Windows Live" clId="Web-{71AAC7CB-8687-4658-9B09-DDB30BE95366}" dt="2023-09-15T12:44:28.319" v="27"/>
-        <pc:sldMkLst>
-          <pc:docMk/>
-          <pc:sldMk cId="836223342" sldId="2147470590"/>
-        </pc:sldMkLst>
-      </pc:sldChg>
-      <pc:sldChg chg="del">
-        <pc:chgData name="Dwayne Natwick" userId="d11f0013982d5c78" providerId="Windows Live" clId="Web-{71AAC7CB-8687-4658-9B09-DDB30BE95366}" dt="2023-09-15T12:44:28.304" v="23"/>
-        <pc:sldMkLst>
-          <pc:docMk/>
-          <pc:sldMk cId="1568180102" sldId="2147470591"/>
-        </pc:sldMkLst>
-      </pc:sldChg>
-      <pc:sldChg chg="del">
-        <pc:chgData name="Dwayne Natwick" userId="d11f0013982d5c78" providerId="Windows Live" clId="Web-{71AAC7CB-8687-4658-9B09-DDB30BE95366}" dt="2023-09-15T12:44:28.304" v="25"/>
-        <pc:sldMkLst>
-          <pc:docMk/>
-          <pc:sldMk cId="823722957" sldId="2147470592"/>
-        </pc:sldMkLst>
-      </pc:sldChg>
-      <pc:sldChg chg="del">
-        <pc:chgData name="Dwayne Natwick" userId="d11f0013982d5c78" providerId="Windows Live" clId="Web-{71AAC7CB-8687-4658-9B09-DDB30BE95366}" dt="2023-09-15T12:44:28.335" v="35"/>
-        <pc:sldMkLst>
-          <pc:docMk/>
-          <pc:sldMk cId="3948585883" sldId="2147470593"/>
-        </pc:sldMkLst>
-      </pc:sldChg>
-      <pc:sldChg chg="del">
-        <pc:chgData name="Dwayne Natwick" userId="d11f0013982d5c78" providerId="Windows Live" clId="Web-{71AAC7CB-8687-4658-9B09-DDB30BE95366}" dt="2023-09-15T12:44:28.304" v="21"/>
-        <pc:sldMkLst>
-          <pc:docMk/>
-          <pc:sldMk cId="449857184" sldId="2147470594"/>
-        </pc:sldMkLst>
-      </pc:sldChg>
-      <pc:sldChg chg="del">
-        <pc:chgData name="Dwayne Natwick" userId="d11f0013982d5c78" providerId="Windows Live" clId="Web-{71AAC7CB-8687-4658-9B09-DDB30BE95366}" dt="2023-09-15T12:44:28.288" v="17"/>
-        <pc:sldMkLst>
-          <pc:docMk/>
-          <pc:sldMk cId="3381500547" sldId="2147470595"/>
-        </pc:sldMkLst>
-      </pc:sldChg>
-      <pc:sldChg chg="del">
-        <pc:chgData name="Dwayne Natwick" userId="d11f0013982d5c78" providerId="Windows Live" clId="Web-{71AAC7CB-8687-4658-9B09-DDB30BE95366}" dt="2023-09-15T12:44:28.304" v="20"/>
-        <pc:sldMkLst>
-          <pc:docMk/>
-          <pc:sldMk cId="1619709891" sldId="2147470596"/>
-        </pc:sldMkLst>
-      </pc:sldChg>
-      <pc:sldChg chg="del">
-        <pc:chgData name="Dwayne Natwick" userId="d11f0013982d5c78" providerId="Windows Live" clId="Web-{71AAC7CB-8687-4658-9B09-DDB30BE95366}" dt="2023-09-15T12:44:28.304" v="19"/>
-        <pc:sldMkLst>
-          <pc:docMk/>
-          <pc:sldMk cId="3056138002" sldId="2147470597"/>
-        </pc:sldMkLst>
-      </pc:sldChg>
-      <pc:sldChg chg="del">
-        <pc:chgData name="Dwayne Natwick" userId="d11f0013982d5c78" providerId="Windows Live" clId="Web-{71AAC7CB-8687-4658-9B09-DDB30BE95366}" dt="2023-09-15T12:44:28.288" v="18"/>
-        <pc:sldMkLst>
-          <pc:docMk/>
-          <pc:sldMk cId="1103145275" sldId="2147470598"/>
-        </pc:sldMkLst>
-      </pc:sldChg>
-      <pc:sldChg chg="del">
-        <pc:chgData name="Dwayne Natwick" userId="d11f0013982d5c78" providerId="Windows Live" clId="Web-{71AAC7CB-8687-4658-9B09-DDB30BE95366}" dt="2023-09-15T12:44:28.288" v="15"/>
-        <pc:sldMkLst>
-          <pc:docMk/>
-          <pc:sldMk cId="2015539757" sldId="2147470599"/>
-        </pc:sldMkLst>
-      </pc:sldChg>
-      <pc:sldChg chg="del">
-        <pc:chgData name="Dwayne Natwick" userId="d11f0013982d5c78" providerId="Windows Live" clId="Web-{71AAC7CB-8687-4658-9B09-DDB30BE95366}" dt="2023-09-15T12:44:28.288" v="16"/>
-        <pc:sldMkLst>
-          <pc:docMk/>
-          <pc:sldMk cId="917890403" sldId="2147470600"/>
-        </pc:sldMkLst>
-      </pc:sldChg>
-      <pc:sldChg chg="del">
-        <pc:chgData name="Dwayne Natwick" userId="d11f0013982d5c78" providerId="Windows Live" clId="Web-{71AAC7CB-8687-4658-9B09-DDB30BE95366}" dt="2023-09-15T12:44:28.288" v="14"/>
-        <pc:sldMkLst>
-          <pc:docMk/>
-          <pc:sldMk cId="2983617397" sldId="2147470601"/>
-        </pc:sldMkLst>
-      </pc:sldChg>
-      <pc:sldChg chg="del">
-        <pc:chgData name="Dwayne Natwick" userId="d11f0013982d5c78" providerId="Windows Live" clId="Web-{71AAC7CB-8687-4658-9B09-DDB30BE95366}" dt="2023-09-15T12:44:28.272" v="12"/>
-        <pc:sldMkLst>
-          <pc:docMk/>
-          <pc:sldMk cId="1171446039" sldId="2147470602"/>
-        </pc:sldMkLst>
-      </pc:sldChg>
-      <pc:sldChg chg="del">
-        <pc:chgData name="Dwayne Natwick" userId="d11f0013982d5c78" providerId="Windows Live" clId="Web-{71AAC7CB-8687-4658-9B09-DDB30BE95366}" dt="2023-09-15T12:44:28.257" v="5"/>
-        <pc:sldMkLst>
-          <pc:docMk/>
-          <pc:sldMk cId="818381816" sldId="2147470603"/>
-        </pc:sldMkLst>
-      </pc:sldChg>
-      <pc:sldChg chg="del">
-        <pc:chgData name="Dwayne Natwick" userId="d11f0013982d5c78" providerId="Windows Live" clId="Web-{71AAC7CB-8687-4658-9B09-DDB30BE95366}" dt="2023-09-15T12:44:28.257" v="1"/>
-        <pc:sldMkLst>
-          <pc:docMk/>
-          <pc:sldMk cId="1742974702" sldId="2147470604"/>
-        </pc:sldMkLst>
-      </pc:sldChg>
-      <pc:sldChg chg="del">
-        <pc:chgData name="Dwayne Natwick" userId="d11f0013982d5c78" providerId="Windows Live" clId="Web-{71AAC7CB-8687-4658-9B09-DDB30BE95366}" dt="2023-09-15T12:44:28.257" v="2"/>
-        <pc:sldMkLst>
-          <pc:docMk/>
-          <pc:sldMk cId="1637472956" sldId="2147470605"/>
-        </pc:sldMkLst>
-      </pc:sldChg>
-      <pc:sldChg chg="del">
-        <pc:chgData name="Dwayne Natwick" userId="d11f0013982d5c78" providerId="Windows Live" clId="Web-{71AAC7CB-8687-4658-9B09-DDB30BE95366}" dt="2023-09-15T12:44:28.257" v="3"/>
-        <pc:sldMkLst>
-          <pc:docMk/>
-          <pc:sldMk cId="3543320482" sldId="2147470606"/>
-        </pc:sldMkLst>
-      </pc:sldChg>
-      <pc:sldChg chg="modSp">
-        <pc:chgData name="Dwayne Natwick" userId="d11f0013982d5c78" providerId="Windows Live" clId="Web-{71AAC7CB-8687-4658-9B09-DDB30BE95366}" dt="2023-09-15T12:54:46.410" v="175" actId="20577"/>
-        <pc:sldMkLst>
-          <pc:docMk/>
-          <pc:sldMk cId="2524577050" sldId="2147470612"/>
-        </pc:sldMkLst>
-        <pc:spChg chg="mod">
-          <ac:chgData name="Dwayne Natwick" userId="d11f0013982d5c78" providerId="Windows Live" clId="Web-{71AAC7CB-8687-4658-9B09-DDB30BE95366}" dt="2023-09-15T12:54:46.410" v="175" actId="20577"/>
-          <ac:spMkLst>
-            <pc:docMk/>
-            <pc:sldMk cId="2524577050" sldId="2147470612"/>
-            <ac:spMk id="3" creationId="{675F152E-D720-B366-A514-0FB945F73594}"/>
-          </ac:spMkLst>
-        </pc:spChg>
-      </pc:sldChg>
-      <pc:sldChg chg="del">
-        <pc:chgData name="Dwayne Natwick" userId="d11f0013982d5c78" providerId="Windows Live" clId="Web-{71AAC7CB-8687-4658-9B09-DDB30BE95366}" dt="2023-09-15T12:44:28.257" v="6"/>
-        <pc:sldMkLst>
-          <pc:docMk/>
-          <pc:sldMk cId="3921617707" sldId="2147470616"/>
-        </pc:sldMkLst>
-      </pc:sldChg>
-      <pc:sldChg chg="del">
-        <pc:chgData name="Dwayne Natwick" userId="d11f0013982d5c78" providerId="Windows Live" clId="Web-{71AAC7CB-8687-4658-9B09-DDB30BE95366}" dt="2023-09-15T12:44:28.304" v="26"/>
-        <pc:sldMkLst>
-          <pc:docMk/>
-          <pc:sldMk cId="1753990868" sldId="2147470617"/>
-        </pc:sldMkLst>
-      </pc:sldChg>
-      <pc:sldChg chg="modSp">
-        <pc:chgData name="Dwayne Natwick" userId="d11f0013982d5c78" providerId="Windows Live" clId="Web-{71AAC7CB-8687-4658-9B09-DDB30BE95366}" dt="2023-09-15T13:05:49.642" v="212" actId="20577"/>
-        <pc:sldMkLst>
-          <pc:docMk/>
-          <pc:sldMk cId="4211696148" sldId="2147470622"/>
-        </pc:sldMkLst>
-        <pc:spChg chg="mod">
-          <ac:chgData name="Dwayne Natwick" userId="d11f0013982d5c78" providerId="Windows Live" clId="Web-{71AAC7CB-8687-4658-9B09-DDB30BE95366}" dt="2023-09-15T13:05:49.642" v="212" actId="20577"/>
-          <ac:spMkLst>
-            <pc:docMk/>
-            <pc:sldMk cId="4211696148" sldId="2147470622"/>
-            <ac:spMk id="3" creationId="{8EBEE321-11FC-1E70-73C4-F9D3512763DC}"/>
-          </ac:spMkLst>
-        </pc:spChg>
-      </pc:sldChg>
-    </pc:docChg>
-  </pc:docChgLst>
-  <pc:docChgLst>
-    <pc:chgData name="Dwayne Natwick" userId="d11f0013982d5c78" providerId="LiveId" clId="{67AF20B4-6DC7-492D-BA3B-9FCF6F9AD6CF}"/>
-    <pc:docChg chg="undo custSel modSld">
-      <pc:chgData name="Dwayne Natwick" userId="d11f0013982d5c78" providerId="LiveId" clId="{67AF20B4-6DC7-492D-BA3B-9FCF6F9AD6CF}" dt="2023-09-15T12:33:18.323" v="157" actId="478"/>
-      <pc:docMkLst>
-        <pc:docMk/>
-      </pc:docMkLst>
-      <pc:sldChg chg="addSp modSp mod modClrScheme chgLayout">
-        <pc:chgData name="Dwayne Natwick" userId="d11f0013982d5c78" providerId="LiveId" clId="{67AF20B4-6DC7-492D-BA3B-9FCF6F9AD6CF}" dt="2023-09-15T12:22:20.232" v="0" actId="26606"/>
-        <pc:sldMkLst>
-          <pc:docMk/>
-          <pc:sldMk cId="2839524364" sldId="2147470607"/>
-        </pc:sldMkLst>
-        <pc:spChg chg="mod">
-          <ac:chgData name="Dwayne Natwick" userId="d11f0013982d5c78" providerId="LiveId" clId="{67AF20B4-6DC7-492D-BA3B-9FCF6F9AD6CF}" dt="2023-09-15T12:22:20.232" v="0" actId="26606"/>
-          <ac:spMkLst>
-            <pc:docMk/>
-            <pc:sldMk cId="2839524364" sldId="2147470607"/>
-            <ac:spMk id="2" creationId="{09C07B8E-14FF-3C2D-BE0E-F25E0D4B4DB3}"/>
-          </ac:spMkLst>
-        </pc:spChg>
-        <pc:spChg chg="mod">
-          <ac:chgData name="Dwayne Natwick" userId="d11f0013982d5c78" providerId="LiveId" clId="{67AF20B4-6DC7-492D-BA3B-9FCF6F9AD6CF}" dt="2023-09-15T12:22:20.232" v="0" actId="26606"/>
-          <ac:spMkLst>
-            <pc:docMk/>
-            <pc:sldMk cId="2839524364" sldId="2147470607"/>
-            <ac:spMk id="3" creationId="{C9D88242-39E7-FD9D-8E94-B07DD53805B5}"/>
-          </ac:spMkLst>
-        </pc:spChg>
-        <pc:spChg chg="add mod">
-          <ac:chgData name="Dwayne Natwick" userId="d11f0013982d5c78" providerId="LiveId" clId="{67AF20B4-6DC7-492D-BA3B-9FCF6F9AD6CF}" dt="2023-09-15T12:22:20.232" v="0" actId="26606"/>
-          <ac:spMkLst>
-            <pc:docMk/>
-            <pc:sldMk cId="2839524364" sldId="2147470607"/>
-            <ac:spMk id="8" creationId="{0BEC7ADA-45E0-D0DE-3260-36E676ED3447}"/>
-          </ac:spMkLst>
-        </pc:spChg>
-      </pc:sldChg>
-      <pc:sldChg chg="addSp delSp modSp mod modClrScheme chgLayout">
-        <pc:chgData name="Dwayne Natwick" userId="d11f0013982d5c78" providerId="LiveId" clId="{67AF20B4-6DC7-492D-BA3B-9FCF6F9AD6CF}" dt="2023-09-15T12:22:53.331" v="4" actId="207"/>
-        <pc:sldMkLst>
-          <pc:docMk/>
-          <pc:sldMk cId="4086260143" sldId="2147470608"/>
-        </pc:sldMkLst>
-        <pc:spChg chg="mod">
-          <ac:chgData name="Dwayne Natwick" userId="d11f0013982d5c78" providerId="LiveId" clId="{67AF20B4-6DC7-492D-BA3B-9FCF6F9AD6CF}" dt="2023-09-15T12:22:43.779" v="3" actId="26606"/>
-          <ac:spMkLst>
-            <pc:docMk/>
-            <pc:sldMk cId="4086260143" sldId="2147470608"/>
-            <ac:spMk id="2" creationId="{BA3D571B-B150-1C46-5F05-A09D93B7AE7A}"/>
-          </ac:spMkLst>
-        </pc:spChg>
-        <pc:spChg chg="del">
-          <ac:chgData name="Dwayne Natwick" userId="d11f0013982d5c78" providerId="LiveId" clId="{67AF20B4-6DC7-492D-BA3B-9FCF6F9AD6CF}" dt="2023-09-15T12:22:30.594" v="1" actId="26606"/>
-          <ac:spMkLst>
-            <pc:docMk/>
-            <pc:sldMk cId="4086260143" sldId="2147470608"/>
-            <ac:spMk id="3" creationId="{EEA0802F-FB95-E549-566C-5C162DF6AE92}"/>
-          </ac:spMkLst>
-        </pc:spChg>
-        <pc:spChg chg="add del mod">
-          <ac:chgData name="Dwayne Natwick" userId="d11f0013982d5c78" providerId="LiveId" clId="{67AF20B4-6DC7-492D-BA3B-9FCF6F9AD6CF}" dt="2023-09-15T12:22:37.849" v="2" actId="478"/>
-          <ac:spMkLst>
-            <pc:docMk/>
-            <pc:sldMk cId="4086260143" sldId="2147470608"/>
-            <ac:spMk id="9" creationId="{3C859FFF-7BFD-5EEA-4747-C61450C010D9}"/>
-          </ac:spMkLst>
-        </pc:spChg>
-        <pc:graphicFrameChg chg="add mod modGraphic">
-          <ac:chgData name="Dwayne Natwick" userId="d11f0013982d5c78" providerId="LiveId" clId="{67AF20B4-6DC7-492D-BA3B-9FCF6F9AD6CF}" dt="2023-09-15T12:22:53.331" v="4" actId="207"/>
-          <ac:graphicFrameMkLst>
-            <pc:docMk/>
-            <pc:sldMk cId="4086260143" sldId="2147470608"/>
-            <ac:graphicFrameMk id="5" creationId="{02521839-71E7-D3DB-2A79-15E7270E214C}"/>
-          </ac:graphicFrameMkLst>
-        </pc:graphicFrameChg>
-      </pc:sldChg>
-      <pc:sldChg chg="addSp delSp modSp mod">
-        <pc:chgData name="Dwayne Natwick" userId="d11f0013982d5c78" providerId="LiveId" clId="{67AF20B4-6DC7-492D-BA3B-9FCF6F9AD6CF}" dt="2023-09-15T12:24:13.533" v="6" actId="207"/>
-        <pc:sldMkLst>
-          <pc:docMk/>
-          <pc:sldMk cId="379969417" sldId="2147470609"/>
-        </pc:sldMkLst>
-        <pc:spChg chg="mod">
-          <ac:chgData name="Dwayne Natwick" userId="d11f0013982d5c78" providerId="LiveId" clId="{67AF20B4-6DC7-492D-BA3B-9FCF6F9AD6CF}" dt="2023-09-15T12:23:48.613" v="5" actId="26606"/>
-          <ac:spMkLst>
-            <pc:docMk/>
-            <pc:sldMk cId="379969417" sldId="2147470609"/>
-            <ac:spMk id="2" creationId="{C144469C-FA2E-89F4-8275-78C7809263F1}"/>
-          </ac:spMkLst>
-        </pc:spChg>
-        <pc:spChg chg="del">
-          <ac:chgData name="Dwayne Natwick" userId="d11f0013982d5c78" providerId="LiveId" clId="{67AF20B4-6DC7-492D-BA3B-9FCF6F9AD6CF}" dt="2023-09-15T12:23:48.613" v="5" actId="26606"/>
-          <ac:spMkLst>
-            <pc:docMk/>
-            <pc:sldMk cId="379969417" sldId="2147470609"/>
-            <ac:spMk id="3" creationId="{F3C47606-EBF4-2063-DFC2-36C74BD4FA71}"/>
-          </ac:spMkLst>
-        </pc:spChg>
-        <pc:graphicFrameChg chg="add mod">
-          <ac:chgData name="Dwayne Natwick" userId="d11f0013982d5c78" providerId="LiveId" clId="{67AF20B4-6DC7-492D-BA3B-9FCF6F9AD6CF}" dt="2023-09-15T12:24:13.533" v="6" actId="207"/>
-          <ac:graphicFrameMkLst>
-            <pc:docMk/>
-            <pc:sldMk cId="379969417" sldId="2147470609"/>
-            <ac:graphicFrameMk id="6" creationId="{8F951D51-311C-2EFC-35E8-15B871457F00}"/>
-          </ac:graphicFrameMkLst>
-        </pc:graphicFrameChg>
-      </pc:sldChg>
-      <pc:sldChg chg="addSp delSp modSp mod modClrScheme chgLayout">
-        <pc:chgData name="Dwayne Natwick" userId="d11f0013982d5c78" providerId="LiveId" clId="{67AF20B4-6DC7-492D-BA3B-9FCF6F9AD6CF}" dt="2023-09-15T12:26:06.004" v="28" actId="26606"/>
-        <pc:sldMkLst>
-          <pc:docMk/>
-          <pc:sldMk cId="1929971971" sldId="2147470610"/>
-        </pc:sldMkLst>
-        <pc:spChg chg="mod">
-          <ac:chgData name="Dwayne Natwick" userId="d11f0013982d5c78" providerId="LiveId" clId="{67AF20B4-6DC7-492D-BA3B-9FCF6F9AD6CF}" dt="2023-09-15T12:26:06.004" v="28" actId="26606"/>
-          <ac:spMkLst>
-            <pc:docMk/>
-            <pc:sldMk cId="1929971971" sldId="2147470610"/>
-            <ac:spMk id="2" creationId="{105B6354-2028-24B8-66E1-0D45962243CA}"/>
-          </ac:spMkLst>
-        </pc:spChg>
-        <pc:spChg chg="add del">
-          <ac:chgData name="Dwayne Natwick" userId="d11f0013982d5c78" providerId="LiveId" clId="{67AF20B4-6DC7-492D-BA3B-9FCF6F9AD6CF}" dt="2023-09-15T12:26:06.004" v="28" actId="26606"/>
-          <ac:spMkLst>
-            <pc:docMk/>
-            <pc:sldMk cId="1929971971" sldId="2147470610"/>
-            <ac:spMk id="3" creationId="{7407A4C3-86E5-EFE8-1E18-DC50FF22703B}"/>
-          </ac:spMkLst>
-        </pc:spChg>
-        <pc:spChg chg="add del mod">
-          <ac:chgData name="Dwayne Natwick" userId="d11f0013982d5c78" providerId="LiveId" clId="{67AF20B4-6DC7-492D-BA3B-9FCF6F9AD6CF}" dt="2023-09-15T12:26:05.986" v="27" actId="26606"/>
-          <ac:spMkLst>
-            <pc:docMk/>
-            <pc:sldMk cId="1929971971" sldId="2147470610"/>
-            <ac:spMk id="9" creationId="{BCECCEF1-42D4-E371-C1D3-B372EBE08756}"/>
-          </ac:spMkLst>
-        </pc:spChg>
-        <pc:graphicFrameChg chg="add del">
-          <ac:chgData name="Dwayne Natwick" userId="d11f0013982d5c78" providerId="LiveId" clId="{67AF20B4-6DC7-492D-BA3B-9FCF6F9AD6CF}" dt="2023-09-15T12:25:53.241" v="25" actId="26606"/>
-          <ac:graphicFrameMkLst>
-            <pc:docMk/>
-            <pc:sldMk cId="1929971971" sldId="2147470610"/>
-            <ac:graphicFrameMk id="5" creationId="{F05A35D9-D1C5-338E-A24B-63C76BB54E45}"/>
-          </ac:graphicFrameMkLst>
-        </pc:graphicFrameChg>
-        <pc:graphicFrameChg chg="add del mod">
-          <ac:chgData name="Dwayne Natwick" userId="d11f0013982d5c78" providerId="LiveId" clId="{67AF20B4-6DC7-492D-BA3B-9FCF6F9AD6CF}" dt="2023-09-15T12:26:05.986" v="27" actId="26606"/>
-          <ac:graphicFrameMkLst>
-            <pc:docMk/>
-            <pc:sldMk cId="1929971971" sldId="2147470610"/>
-            <ac:graphicFrameMk id="7" creationId="{CFDAEFEF-2C5F-EEFF-B591-6ABE2E227E31}"/>
-          </ac:graphicFrameMkLst>
-        </pc:graphicFrameChg>
-        <pc:graphicFrameChg chg="add">
-          <ac:chgData name="Dwayne Natwick" userId="d11f0013982d5c78" providerId="LiveId" clId="{67AF20B4-6DC7-492D-BA3B-9FCF6F9AD6CF}" dt="2023-09-15T12:26:06.004" v="28" actId="26606"/>
-          <ac:graphicFrameMkLst>
-            <pc:docMk/>
-            <pc:sldMk cId="1929971971" sldId="2147470610"/>
-            <ac:graphicFrameMk id="11" creationId="{F05A35D9-D1C5-338E-A24B-63C76BB54E45}"/>
-          </ac:graphicFrameMkLst>
-        </pc:graphicFrameChg>
-      </pc:sldChg>
-      <pc:sldChg chg="addSp delSp modSp mod">
-        <pc:chgData name="Dwayne Natwick" userId="d11f0013982d5c78" providerId="LiveId" clId="{67AF20B4-6DC7-492D-BA3B-9FCF6F9AD6CF}" dt="2023-09-15T12:24:51.046" v="11" actId="26606"/>
-        <pc:sldMkLst>
-          <pc:docMk/>
-          <pc:sldMk cId="2421521076" sldId="2147470611"/>
-        </pc:sldMkLst>
-        <pc:spChg chg="mod">
-          <ac:chgData name="Dwayne Natwick" userId="d11f0013982d5c78" providerId="LiveId" clId="{67AF20B4-6DC7-492D-BA3B-9FCF6F9AD6CF}" dt="2023-09-15T12:24:51.046" v="11" actId="26606"/>
-          <ac:spMkLst>
-            <pc:docMk/>
-            <pc:sldMk cId="2421521076" sldId="2147470611"/>
-            <ac:spMk id="2" creationId="{0F4D640B-8499-E0C5-C508-35266E13B6E6}"/>
-          </ac:spMkLst>
-        </pc:spChg>
-        <pc:spChg chg="del">
-          <ac:chgData name="Dwayne Natwick" userId="d11f0013982d5c78" providerId="LiveId" clId="{67AF20B4-6DC7-492D-BA3B-9FCF6F9AD6CF}" dt="2023-09-15T12:24:51.046" v="11" actId="26606"/>
-          <ac:spMkLst>
-            <pc:docMk/>
-            <pc:sldMk cId="2421521076" sldId="2147470611"/>
-            <ac:spMk id="3" creationId="{358EA097-101A-43CC-781A-E0E92A4D22E7}"/>
-          </ac:spMkLst>
-        </pc:spChg>
-        <pc:graphicFrameChg chg="add">
-          <ac:chgData name="Dwayne Natwick" userId="d11f0013982d5c78" providerId="LiveId" clId="{67AF20B4-6DC7-492D-BA3B-9FCF6F9AD6CF}" dt="2023-09-15T12:24:51.046" v="11" actId="26606"/>
-          <ac:graphicFrameMkLst>
-            <pc:docMk/>
-            <pc:sldMk cId="2421521076" sldId="2147470611"/>
-            <ac:graphicFrameMk id="5" creationId="{A5BBB90B-5CC9-A280-14DC-2C91D4F347EE}"/>
-          </ac:graphicFrameMkLst>
-        </pc:graphicFrameChg>
-      </pc:sldChg>
-      <pc:sldChg chg="delSp mod modNotesTx">
-        <pc:chgData name="Dwayne Natwick" userId="d11f0013982d5c78" providerId="LiveId" clId="{67AF20B4-6DC7-492D-BA3B-9FCF6F9AD6CF}" dt="2023-09-15T12:33:18.323" v="157" actId="478"/>
-        <pc:sldMkLst>
-          <pc:docMk/>
-          <pc:sldMk cId="2524577050" sldId="2147470612"/>
-        </pc:sldMkLst>
-        <pc:spChg chg="del">
-          <ac:chgData name="Dwayne Natwick" userId="d11f0013982d5c78" providerId="LiveId" clId="{67AF20B4-6DC7-492D-BA3B-9FCF6F9AD6CF}" dt="2023-09-15T12:33:18.323" v="157" actId="478"/>
-          <ac:spMkLst>
-            <pc:docMk/>
-            <pc:sldMk cId="2524577050" sldId="2147470612"/>
-            <ac:spMk id="4" creationId="{57240181-C93A-F4E8-472C-1AF0F2C2A855}"/>
-          </ac:spMkLst>
-        </pc:spChg>
-        <pc:spChg chg="del">
-          <ac:chgData name="Dwayne Natwick" userId="d11f0013982d5c78" providerId="LiveId" clId="{67AF20B4-6DC7-492D-BA3B-9FCF6F9AD6CF}" dt="2023-09-15T12:33:13.947" v="156" actId="478"/>
-          <ac:spMkLst>
-            <pc:docMk/>
-            <pc:sldMk cId="2524577050" sldId="2147470612"/>
-            <ac:spMk id="5" creationId="{D3A447DE-6903-1590-61FB-AB160302D80B}"/>
-          </ac:spMkLst>
-        </pc:spChg>
-        <pc:spChg chg="del">
-          <ac:chgData name="Dwayne Natwick" userId="d11f0013982d5c78" providerId="LiveId" clId="{67AF20B4-6DC7-492D-BA3B-9FCF6F9AD6CF}" dt="2023-09-15T12:33:06.604" v="154" actId="478"/>
-          <ac:spMkLst>
-            <pc:docMk/>
-            <pc:sldMk cId="2524577050" sldId="2147470612"/>
-            <ac:spMk id="6" creationId="{520C77B9-C55A-8B6C-DC16-CEE27B62CD45}"/>
-          </ac:spMkLst>
-        </pc:spChg>
-        <pc:spChg chg="del">
-          <ac:chgData name="Dwayne Natwick" userId="d11f0013982d5c78" providerId="LiveId" clId="{67AF20B4-6DC7-492D-BA3B-9FCF6F9AD6CF}" dt="2023-09-15T12:33:11.398" v="155" actId="478"/>
-          <ac:spMkLst>
-            <pc:docMk/>
-            <pc:sldMk cId="2524577050" sldId="2147470612"/>
-            <ac:spMk id="7" creationId="{C25B8EDA-4C77-A71B-612F-D5F8559DF688}"/>
-          </ac:spMkLst>
-        </pc:spChg>
-      </pc:sldChg>
-      <pc:sldChg chg="modSp mod">
-        <pc:chgData name="Dwayne Natwick" userId="d11f0013982d5c78" providerId="LiveId" clId="{67AF20B4-6DC7-492D-BA3B-9FCF6F9AD6CF}" dt="2023-09-15T12:24:40.874" v="10" actId="14100"/>
-        <pc:sldMkLst>
-          <pc:docMk/>
-          <pc:sldMk cId="848203549" sldId="2147470613"/>
-        </pc:sldMkLst>
-        <pc:spChg chg="mod ord">
-          <ac:chgData name="Dwayne Natwick" userId="d11f0013982d5c78" providerId="LiveId" clId="{67AF20B4-6DC7-492D-BA3B-9FCF6F9AD6CF}" dt="2023-09-15T12:24:40.874" v="10" actId="14100"/>
-          <ac:spMkLst>
-            <pc:docMk/>
-            <pc:sldMk cId="848203549" sldId="2147470613"/>
-            <ac:spMk id="3" creationId="{2E50BA7C-3255-BC69-812B-892217F5D36D}"/>
-          </ac:spMkLst>
-        </pc:spChg>
-        <pc:picChg chg="mod">
-          <ac:chgData name="Dwayne Natwick" userId="d11f0013982d5c78" providerId="LiveId" clId="{67AF20B4-6DC7-492D-BA3B-9FCF6F9AD6CF}" dt="2023-09-15T12:24:28.644" v="7" actId="26606"/>
-          <ac:picMkLst>
-            <pc:docMk/>
-            <pc:sldMk cId="848203549" sldId="2147470613"/>
-            <ac:picMk id="4" creationId="{D26C38C8-22B0-0868-2D0E-669BDC2059B1}"/>
-          </ac:picMkLst>
-        </pc:picChg>
-      </pc:sldChg>
-      <pc:sldChg chg="addSp delSp modSp mod modClrScheme chgLayout">
-        <pc:chgData name="Dwayne Natwick" userId="d11f0013982d5c78" providerId="LiveId" clId="{67AF20B4-6DC7-492D-BA3B-9FCF6F9AD6CF}" dt="2023-09-15T12:25:30.016" v="23" actId="404"/>
-        <pc:sldMkLst>
-          <pc:docMk/>
-          <pc:sldMk cId="3770102974" sldId="2147470614"/>
-        </pc:sldMkLst>
-        <pc:spChg chg="mod">
-          <ac:chgData name="Dwayne Natwick" userId="d11f0013982d5c78" providerId="LiveId" clId="{67AF20B4-6DC7-492D-BA3B-9FCF6F9AD6CF}" dt="2023-09-15T12:25:17.917" v="16" actId="26606"/>
-          <ac:spMkLst>
-            <pc:docMk/>
-            <pc:sldMk cId="3770102974" sldId="2147470614"/>
-            <ac:spMk id="2" creationId="{CFCF5E71-8482-5C4A-1937-62180CED69B1}"/>
-          </ac:spMkLst>
-        </pc:spChg>
-        <pc:spChg chg="add del">
-          <ac:chgData name="Dwayne Natwick" userId="d11f0013982d5c78" providerId="LiveId" clId="{67AF20B4-6DC7-492D-BA3B-9FCF6F9AD6CF}" dt="2023-09-15T12:25:09.961" v="14" actId="26606"/>
-          <ac:spMkLst>
-            <pc:docMk/>
-            <pc:sldMk cId="3770102974" sldId="2147470614"/>
-            <ac:spMk id="3" creationId="{2E8F6CC6-DEE5-E7CD-0610-AF173BD7F8EC}"/>
-          </ac:spMkLst>
-        </pc:spChg>
-        <pc:spChg chg="add del mod">
-          <ac:chgData name="Dwayne Natwick" userId="d11f0013982d5c78" providerId="LiveId" clId="{67AF20B4-6DC7-492D-BA3B-9FCF6F9AD6CF}" dt="2023-09-15T12:25:14.440" v="15" actId="478"/>
-          <ac:spMkLst>
-            <pc:docMk/>
-            <pc:sldMk cId="3770102974" sldId="2147470614"/>
-            <ac:spMk id="9" creationId="{58699FEA-8D93-6C54-EB4F-88BC2FCE5915}"/>
-          </ac:spMkLst>
-        </pc:spChg>
-        <pc:graphicFrameChg chg="add del">
-          <ac:chgData name="Dwayne Natwick" userId="d11f0013982d5c78" providerId="LiveId" clId="{67AF20B4-6DC7-492D-BA3B-9FCF6F9AD6CF}" dt="2023-09-15T12:25:09.866" v="13" actId="26606"/>
-          <ac:graphicFrameMkLst>
-            <pc:docMk/>
-            <pc:sldMk cId="3770102974" sldId="2147470614"/>
-            <ac:graphicFrameMk id="5" creationId="{5532D69F-20D3-37B9-F271-649CAC81B81A}"/>
-          </ac:graphicFrameMkLst>
-        </pc:graphicFrameChg>
-        <pc:graphicFrameChg chg="add mod modGraphic">
-          <ac:chgData name="Dwayne Natwick" userId="d11f0013982d5c78" providerId="LiveId" clId="{67AF20B4-6DC7-492D-BA3B-9FCF6F9AD6CF}" dt="2023-09-15T12:25:30.016" v="23" actId="404"/>
-          <ac:graphicFrameMkLst>
-            <pc:docMk/>
-            <pc:sldMk cId="3770102974" sldId="2147470614"/>
-            <ac:graphicFrameMk id="7" creationId="{A219546F-E536-A279-B526-1AE693C0FEBC}"/>
-          </ac:graphicFrameMkLst>
-        </pc:graphicFrameChg>
-      </pc:sldChg>
-      <pc:sldChg chg="addSp delSp modSp mod">
-        <pc:chgData name="Dwayne Natwick" userId="d11f0013982d5c78" providerId="LiveId" clId="{67AF20B4-6DC7-492D-BA3B-9FCF6F9AD6CF}" dt="2023-09-15T12:26:40.164" v="31" actId="207"/>
-        <pc:sldMkLst>
-          <pc:docMk/>
-          <pc:sldMk cId="3776730813" sldId="2147470620"/>
-        </pc:sldMkLst>
-        <pc:spChg chg="mod">
-          <ac:chgData name="Dwayne Natwick" userId="d11f0013982d5c78" providerId="LiveId" clId="{67AF20B4-6DC7-492D-BA3B-9FCF6F9AD6CF}" dt="2023-09-15T12:26:19.350" v="29" actId="26606"/>
-          <ac:spMkLst>
-            <pc:docMk/>
-            <pc:sldMk cId="3776730813" sldId="2147470620"/>
-            <ac:spMk id="2" creationId="{B98733DD-1422-5649-B7EC-6C22F68294E7}"/>
-          </ac:spMkLst>
-        </pc:spChg>
-        <pc:spChg chg="del">
-          <ac:chgData name="Dwayne Natwick" userId="d11f0013982d5c78" providerId="LiveId" clId="{67AF20B4-6DC7-492D-BA3B-9FCF6F9AD6CF}" dt="2023-09-15T12:26:19.350" v="29" actId="26606"/>
-          <ac:spMkLst>
-            <pc:docMk/>
-            <pc:sldMk cId="3776730813" sldId="2147470620"/>
-            <ac:spMk id="3" creationId="{6877C1DD-3080-4AEC-3E55-CF8ED035D114}"/>
-          </ac:spMkLst>
-        </pc:spChg>
-        <pc:graphicFrameChg chg="add mod">
-          <ac:chgData name="Dwayne Natwick" userId="d11f0013982d5c78" providerId="LiveId" clId="{67AF20B4-6DC7-492D-BA3B-9FCF6F9AD6CF}" dt="2023-09-15T12:26:40.164" v="31" actId="207"/>
-          <ac:graphicFrameMkLst>
-            <pc:docMk/>
-            <pc:sldMk cId="3776730813" sldId="2147470620"/>
-            <ac:graphicFrameMk id="5" creationId="{EAD11503-D133-32E7-E133-88CB07DFE0F3}"/>
-          </ac:graphicFrameMkLst>
-        </pc:graphicFrameChg>
-      </pc:sldChg>
-      <pc:sldChg chg="addSp delSp modSp mod modClrScheme chgLayout">
-        <pc:chgData name="Dwayne Natwick" userId="d11f0013982d5c78" providerId="LiveId" clId="{67AF20B4-6DC7-492D-BA3B-9FCF6F9AD6CF}" dt="2023-09-15T12:27:22.537" v="41" actId="12"/>
-        <pc:sldMkLst>
-          <pc:docMk/>
-          <pc:sldMk cId="1675599562" sldId="2147470621"/>
-        </pc:sldMkLst>
-        <pc:spChg chg="mod">
-          <ac:chgData name="Dwayne Natwick" userId="d11f0013982d5c78" providerId="LiveId" clId="{67AF20B4-6DC7-492D-BA3B-9FCF6F9AD6CF}" dt="2023-09-15T12:27:16.480" v="40" actId="26606"/>
-          <ac:spMkLst>
-            <pc:docMk/>
-            <pc:sldMk cId="1675599562" sldId="2147470621"/>
-            <ac:spMk id="2" creationId="{4F2E3601-0348-0AC8-926D-2963A6EBDE54}"/>
-          </ac:spMkLst>
-        </pc:spChg>
-        <pc:spChg chg="mod">
-          <ac:chgData name="Dwayne Natwick" userId="d11f0013982d5c78" providerId="LiveId" clId="{67AF20B4-6DC7-492D-BA3B-9FCF6F9AD6CF}" dt="2023-09-15T12:27:22.537" v="41" actId="12"/>
-          <ac:spMkLst>
-            <pc:docMk/>
-            <pc:sldMk cId="1675599562" sldId="2147470621"/>
-            <ac:spMk id="3" creationId="{226A9B3B-731B-E601-049B-025098728B19}"/>
-          </ac:spMkLst>
-        </pc:spChg>
-        <pc:spChg chg="add del mod">
-          <ac:chgData name="Dwayne Natwick" userId="d11f0013982d5c78" providerId="LiveId" clId="{67AF20B4-6DC7-492D-BA3B-9FCF6F9AD6CF}" dt="2023-09-15T12:27:08.351" v="33" actId="26606"/>
-          <ac:spMkLst>
-            <pc:docMk/>
-            <pc:sldMk cId="1675599562" sldId="2147470621"/>
-            <ac:spMk id="8" creationId="{CBDE5322-35C9-7798-3ACA-6181A40C14D0}"/>
-          </ac:spMkLst>
-        </pc:spChg>
-        <pc:spChg chg="add del mod">
-          <ac:chgData name="Dwayne Natwick" userId="d11f0013982d5c78" providerId="LiveId" clId="{67AF20B4-6DC7-492D-BA3B-9FCF6F9AD6CF}" dt="2023-09-15T12:27:11.088" v="35" actId="26606"/>
-          <ac:spMkLst>
-            <pc:docMk/>
-            <pc:sldMk cId="1675599562" sldId="2147470621"/>
-            <ac:spMk id="10" creationId="{795D7EBF-A03F-22DA-4479-3CEB4DE78634}"/>
-          </ac:spMkLst>
-        </pc:spChg>
-      </pc:sldChg>
-      <pc:sldChg chg="delSp modSp mod">
-        <pc:chgData name="Dwayne Natwick" userId="d11f0013982d5c78" providerId="LiveId" clId="{67AF20B4-6DC7-492D-BA3B-9FCF6F9AD6CF}" dt="2023-09-15T12:32:14.657" v="145"/>
-        <pc:sldMkLst>
-          <pc:docMk/>
-          <pc:sldMk cId="4211696148" sldId="2147470622"/>
-        </pc:sldMkLst>
-        <pc:spChg chg="mod">
-          <ac:chgData name="Dwayne Natwick" userId="d11f0013982d5c78" providerId="LiveId" clId="{67AF20B4-6DC7-492D-BA3B-9FCF6F9AD6CF}" dt="2023-09-15T12:32:12.113" v="143" actId="20577"/>
-          <ac:spMkLst>
-            <pc:docMk/>
-            <pc:sldMk cId="4211696148" sldId="2147470622"/>
-            <ac:spMk id="3" creationId="{8EBEE321-11FC-1E70-73C4-F9D3512763DC}"/>
-          </ac:spMkLst>
-        </pc:spChg>
-        <pc:spChg chg="del mod">
-          <ac:chgData name="Dwayne Natwick" userId="d11f0013982d5c78" providerId="LiveId" clId="{67AF20B4-6DC7-492D-BA3B-9FCF6F9AD6CF}" dt="2023-09-15T12:32:14.657" v="145"/>
-          <ac:spMkLst>
-            <pc:docMk/>
-            <pc:sldMk cId="4211696148" sldId="2147470622"/>
-            <ac:spMk id="4" creationId="{894C4432-C891-B2F2-36B5-DC9ABE788A25}"/>
-          </ac:spMkLst>
-        </pc:spChg>
-      </pc:sldChg>
     </pc:docChg>
   </pc:docChgLst>
 </pc:chgInfo>
@@ -9687,7 +9910,7 @@
 <dgm:dataModel xmlns:dgm="http://schemas.openxmlformats.org/drawingml/2006/diagram" xmlns:a="http://schemas.openxmlformats.org/drawingml/2006/main">
   <dgm:ptLst>
     <dgm:pt modelId="{A6D18301-54A6-4D9F-9E1C-020EEFF69F07}" type="doc">
-      <dgm:prSet loTypeId="urn:microsoft.com/office/officeart/2008/layout/LinedList" loCatId="list" qsTypeId="urn:microsoft.com/office/officeart/2005/8/quickstyle/simple1" qsCatId="simple" csTypeId="urn:microsoft.com/office/officeart/2005/8/colors/accent1_2" csCatId="accent1"/>
+      <dgm:prSet loTypeId="urn:microsoft.com/office/officeart/2008/layout/LinedList" loCatId="list" qsTypeId="urn:microsoft.com/office/officeart/2005/8/quickstyle/simple1" qsCatId="simple" csTypeId="urn:microsoft.com/office/officeart/2005/8/colors/accent1_2" csCatId="accent1" phldr="1"/>
       <dgm:spPr/>
       <dgm:t>
         <a:bodyPr/>
@@ -9705,10 +9928,10 @@
         <a:lstStyle/>
         <a:p>
           <a:r>
-            <a:rPr lang="en-US" baseline="0"/>
-            <a:t>Blocks products from purchase in public marketplace</a:t>
+            <a:rPr lang="en-US" baseline="0" dirty="0"/>
+            <a:t>Blocks products from purchase in public marketplace (exceptions: of Microsoft published and endorsed Linux distributions)</a:t>
           </a:r>
-          <a:endParaRPr lang="en-US"/>
+          <a:endParaRPr lang="en-US" dirty="0"/>
         </a:p>
       </dgm:t>
     </dgm:pt>
@@ -9983,10 +10206,10 @@
         <a:lstStyle/>
         <a:p>
           <a:r>
-            <a:rPr lang="en-US" baseline="0"/>
-            <a:t>Azure Marketplace Limitations</a:t>
+            <a:rPr lang="en-US" baseline="0" dirty="0"/>
+            <a:t>Marketplace Limitations</a:t>
           </a:r>
-          <a:endParaRPr lang="en-US"/>
+          <a:endParaRPr lang="en-US" dirty="0"/>
         </a:p>
       </dgm:t>
     </dgm:pt>
@@ -10118,10 +10341,10 @@
         <a:lstStyle/>
         <a:p>
           <a:r>
-            <a:rPr lang="en-US" baseline="0"/>
+            <a:rPr lang="en-US" baseline="0" dirty="0"/>
             <a:t>No "out of the box" integration with enterprise procurement or workflow</a:t>
           </a:r>
-          <a:endParaRPr lang="en-US"/>
+          <a:endParaRPr lang="en-US" dirty="0"/>
         </a:p>
       </dgm:t>
     </dgm:pt>
@@ -13343,12 +13566,12 @@
         <a:fontRef idx="minor"/>
       </dsp:style>
       <dsp:txBody>
-        <a:bodyPr spcFirstLastPara="0" vert="horz" wrap="square" lIns="121920" tIns="121920" rIns="121920" bIns="121920" numCol="1" spcCol="1270" anchor="t" anchorCtr="0">
+        <a:bodyPr spcFirstLastPara="0" vert="horz" wrap="square" lIns="110490" tIns="110490" rIns="110490" bIns="110490" numCol="1" spcCol="1270" anchor="t" anchorCtr="0">
           <a:noAutofit/>
         </a:bodyPr>
         <a:lstStyle/>
         <a:p>
-          <a:pPr marL="0" lvl="0" indent="0" algn="l" defTabSz="1422400">
+          <a:pPr marL="0" lvl="0" indent="0" algn="l" defTabSz="1289050">
             <a:lnSpc>
               <a:spcPct val="90000"/>
             </a:lnSpc>
@@ -13361,10 +13584,10 @@
             <a:buNone/>
           </a:pPr>
           <a:r>
-            <a:rPr lang="en-US" sz="3200" kern="1200" baseline="0"/>
-            <a:t>Blocks products from purchase in public marketplace</a:t>
+            <a:rPr lang="en-US" sz="2900" kern="1200" baseline="0" dirty="0"/>
+            <a:t>Blocks products from purchase in public marketplace (exceptions: of Microsoft published and endorsed Linux distributions)</a:t>
           </a:r>
-          <a:endParaRPr lang="en-US" sz="3200" kern="1200"/>
+          <a:endParaRPr lang="en-US" sz="2900" kern="1200" dirty="0"/>
         </a:p>
       </dsp:txBody>
       <dsp:txXfrm>
@@ -13453,12 +13676,12 @@
         <a:fontRef idx="minor"/>
       </dsp:style>
       <dsp:txBody>
-        <a:bodyPr spcFirstLastPara="0" vert="horz" wrap="square" lIns="121920" tIns="121920" rIns="121920" bIns="121920" numCol="1" spcCol="1270" anchor="t" anchorCtr="0">
+        <a:bodyPr spcFirstLastPara="0" vert="horz" wrap="square" lIns="110490" tIns="110490" rIns="110490" bIns="110490" numCol="1" spcCol="1270" anchor="t" anchorCtr="0">
           <a:noAutofit/>
         </a:bodyPr>
         <a:lstStyle/>
         <a:p>
-          <a:pPr marL="0" lvl="0" indent="0" algn="l" defTabSz="1422400">
+          <a:pPr marL="0" lvl="0" indent="0" algn="l" defTabSz="1289050">
             <a:lnSpc>
               <a:spcPct val="90000"/>
             </a:lnSpc>
@@ -13471,10 +13694,10 @@
             <a:buNone/>
           </a:pPr>
           <a:r>
-            <a:rPr lang="en-US" sz="3200" kern="1200" baseline="0"/>
+            <a:rPr lang="en-US" sz="2900" kern="1200" baseline="0"/>
             <a:t>Users submit requests to add a product to the allowlist</a:t>
           </a:r>
-          <a:endParaRPr lang="en-US" sz="3200" kern="1200"/>
+          <a:endParaRPr lang="en-US" sz="2900" kern="1200"/>
         </a:p>
       </dsp:txBody>
       <dsp:txXfrm>
@@ -13563,12 +13786,12 @@
         <a:fontRef idx="minor"/>
       </dsp:style>
       <dsp:txBody>
-        <a:bodyPr spcFirstLastPara="0" vert="horz" wrap="square" lIns="121920" tIns="121920" rIns="121920" bIns="121920" numCol="1" spcCol="1270" anchor="t" anchorCtr="0">
+        <a:bodyPr spcFirstLastPara="0" vert="horz" wrap="square" lIns="110490" tIns="110490" rIns="110490" bIns="110490" numCol="1" spcCol="1270" anchor="t" anchorCtr="0">
           <a:noAutofit/>
         </a:bodyPr>
         <a:lstStyle/>
         <a:p>
-          <a:pPr marL="0" lvl="0" indent="0" algn="l" defTabSz="1422400">
+          <a:pPr marL="0" lvl="0" indent="0" algn="l" defTabSz="1289050">
             <a:lnSpc>
               <a:spcPct val="90000"/>
             </a:lnSpc>
@@ -13581,10 +13804,10 @@
             <a:buNone/>
           </a:pPr>
           <a:r>
-            <a:rPr lang="en-US" sz="3200" kern="1200" baseline="0"/>
+            <a:rPr lang="en-US" sz="2900" kern="1200" baseline="0"/>
             <a:t>Marketplace administrator has authority to approve request</a:t>
           </a:r>
-          <a:endParaRPr lang="en-US" sz="3200" kern="1200"/>
+          <a:endParaRPr lang="en-US" sz="2900" kern="1200"/>
         </a:p>
       </dsp:txBody>
       <dsp:txXfrm>
@@ -13673,12 +13896,12 @@
         <a:fontRef idx="minor"/>
       </dsp:style>
       <dsp:txBody>
-        <a:bodyPr spcFirstLastPara="0" vert="horz" wrap="square" lIns="121920" tIns="121920" rIns="121920" bIns="121920" numCol="1" spcCol="1270" anchor="t" anchorCtr="0">
+        <a:bodyPr spcFirstLastPara="0" vert="horz" wrap="square" lIns="110490" tIns="110490" rIns="110490" bIns="110490" numCol="1" spcCol="1270" anchor="t" anchorCtr="0">
           <a:noAutofit/>
         </a:bodyPr>
         <a:lstStyle/>
         <a:p>
-          <a:pPr marL="0" lvl="0" indent="0" algn="l" defTabSz="1422400">
+          <a:pPr marL="0" lvl="0" indent="0" algn="l" defTabSz="1289050">
             <a:lnSpc>
               <a:spcPct val="90000"/>
             </a:lnSpc>
@@ -13691,10 +13914,10 @@
             <a:buNone/>
           </a:pPr>
           <a:r>
-            <a:rPr lang="en-US" sz="3200" kern="1200" baseline="0"/>
+            <a:rPr lang="en-US" sz="2900" kern="1200" baseline="0"/>
             <a:t>Private offers can be automatically enabled, if configured to</a:t>
           </a:r>
-          <a:endParaRPr lang="en-US" sz="3200" kern="1200"/>
+          <a:endParaRPr lang="en-US" sz="2900" kern="1200"/>
         </a:p>
       </dsp:txBody>
       <dsp:txXfrm>
@@ -13818,10 +14041,10 @@
             <a:buChar char="•"/>
           </a:pPr>
           <a:r>
-            <a:rPr lang="en-US" sz="2000" kern="1200" baseline="0"/>
+            <a:rPr lang="en-US" sz="2000" kern="1200" baseline="0" dirty="0"/>
             <a:t>No "out of the box" integration with enterprise procurement or workflow</a:t>
           </a:r>
-          <a:endParaRPr lang="en-US" sz="2000" kern="1200"/>
+          <a:endParaRPr lang="en-US" sz="2000" kern="1200" dirty="0"/>
         </a:p>
       </dsp:txBody>
       <dsp:txXfrm rot="-5400000">
@@ -13891,10 +14114,10 @@
             <a:buNone/>
           </a:pPr>
           <a:r>
-            <a:rPr lang="en-US" sz="2900" kern="1200" baseline="0"/>
-            <a:t>Azure Marketplace Limitations</a:t>
+            <a:rPr lang="en-US" sz="2900" kern="1200" baseline="0" dirty="0"/>
+            <a:t>Marketplace Limitations</a:t>
           </a:r>
-          <a:endParaRPr lang="en-US" sz="2900" kern="1200"/>
+          <a:endParaRPr lang="en-US" sz="2900" kern="1200" dirty="0"/>
         </a:p>
       </dsp:txBody>
       <dsp:txXfrm>
@@ -22273,7 +22496,7 @@
           <a:p>
             <a:fld id="{0D354273-E04F-4A6B-AB46-301CAB090479}" type="datetimeFigureOut">
               <a:rPr lang="en-US" smtClean="0"/>
-              <a:t>9/15/2023</a:t>
+              <a:t>11/13/2023</a:t>
             </a:fld>
             <a:endParaRPr lang="en-US"/>
           </a:p>
@@ -22776,7 +22999,7 @@
           <a:p>
             <a:fld id="{297A4B63-AD09-44DE-BEEC-F379281B23CC}" type="slidenum">
               <a:rPr lang="en-US" smtClean="0"/>
-              <a:t>55</a:t>
+              <a:t>17</a:t>
             </a:fld>
             <a:endParaRPr lang="en-US"/>
           </a:p>
@@ -22866,7 +23089,7 @@
           <a:p>
             <a:fld id="{297A4B63-AD09-44DE-BEEC-F379281B23CC}" type="slidenum">
               <a:rPr lang="en-US" smtClean="0"/>
-              <a:t>57</a:t>
+              <a:t>20</a:t>
             </a:fld>
             <a:endParaRPr lang="en-US"/>
           </a:p>
@@ -22956,7 +23179,7 @@
           <a:p>
             <a:fld id="{297A4B63-AD09-44DE-BEEC-F379281B23CC}" type="slidenum">
               <a:rPr lang="en-US" smtClean="0"/>
-              <a:t>58</a:t>
+              <a:t>21</a:t>
             </a:fld>
             <a:endParaRPr lang="en-US"/>
           </a:p>
@@ -23093,7 +23316,7 @@
                 <a:tabLst/>
                 <a:defRPr/>
               </a:pPr>
-              <a:t>59</a:t>
+              <a:t>22</a:t>
             </a:fld>
             <a:endParaRPr kumimoji="0" lang="en-US" sz="1200" b="0" i="0" u="none" strike="noStrike" kern="1200" cap="none" spc="0" normalizeH="0" baseline="0" noProof="0">
               <a:ln>
@@ -23501,7 +23724,7 @@
                 <a:tabLst/>
                 <a:defRPr/>
               </a:pPr>
-              <a:t>43</a:t>
+              <a:t>4</a:t>
             </a:fld>
             <a:endParaRPr kumimoji="0" lang="en-US" sz="1200" b="0" i="0" u="none" strike="noStrike" kern="1200" cap="none" spc="0" normalizeH="0" baseline="0" noProof="0">
               <a:ln>
@@ -24102,7 +24325,7 @@
                 <a:tabLst/>
                 <a:defRPr/>
               </a:pPr>
-              <a:t>44</a:t>
+              <a:t>6</a:t>
             </a:fld>
             <a:endParaRPr kumimoji="0" lang="en-US" sz="1200" b="0" i="0" u="none" strike="noStrike" kern="1200" cap="none" spc="0" normalizeH="0" baseline="0" noProof="0">
               <a:ln>
@@ -24213,7 +24436,7 @@
           <a:p>
             <a:fld id="{297A4B63-AD09-44DE-BEEC-F379281B23CC}" type="slidenum">
               <a:rPr lang="en-US" smtClean="0"/>
-              <a:t>47</a:t>
+              <a:t>9</a:t>
             </a:fld>
             <a:endParaRPr lang="en-US"/>
           </a:p>
@@ -24303,7 +24526,7 @@
           <a:p>
             <a:fld id="{297A4B63-AD09-44DE-BEEC-F379281B23CC}" type="slidenum">
               <a:rPr lang="en-US" smtClean="0"/>
-              <a:t>48</a:t>
+              <a:t>10</a:t>
             </a:fld>
             <a:endParaRPr lang="en-US"/>
           </a:p>
@@ -24398,7 +24621,7 @@
           <a:p>
             <a:fld id="{297A4B63-AD09-44DE-BEEC-F379281B23CC}" type="slidenum">
               <a:rPr lang="en-US" smtClean="0"/>
-              <a:t>49</a:t>
+              <a:t>11</a:t>
             </a:fld>
             <a:endParaRPr lang="en-US"/>
           </a:p>
@@ -24634,7 +24857,7 @@
           <a:p>
             <a:fld id="{297A4B63-AD09-44DE-BEEC-F379281B23CC}" type="slidenum">
               <a:rPr lang="en-US" smtClean="0"/>
-              <a:t>52</a:t>
+              <a:t>14</a:t>
             </a:fld>
             <a:endParaRPr lang="en-US"/>
           </a:p>
@@ -28020,7 +28243,7 @@
           <a:p>
             <a:fld id="{5B804146-93B5-4C8A-9A4F-B58F5551F951}" type="datetimeFigureOut">
               <a:rPr lang="en-US" smtClean="0"/>
-              <a:t>9/15/2023</a:t>
+              <a:t>11/13/2023</a:t>
             </a:fld>
             <a:endParaRPr lang="en-US"/>
           </a:p>
@@ -32312,12 +32535,12 @@
               </a:lnSpc>
             </a:pPr>
             <a:r>
-              <a:rPr lang="en-US" sz="3700">
+              <a:rPr lang="en-US" sz="3700" dirty="0">
                 <a:cs typeface="Segoe UI"/>
               </a:rPr>
-              <a:t>Microsoft Azure Marketplace</a:t>
+              <a:t>Microsoft Commercial Marketplace</a:t>
             </a:r>
-            <a:endParaRPr lang="en-US" sz="3700"/>
+            <a:endParaRPr lang="en-US" sz="3700" dirty="0"/>
           </a:p>
         </p:txBody>
       </p:sp>
@@ -33565,8 +33788,8 @@
           <a:lstStyle/>
           <a:p>
             <a:r>
-              <a:rPr lang="en-US"/>
-              <a:t>Azure Private Marketplace</a:t>
+              <a:rPr lang="en-US" dirty="0"/>
+              <a:t>Private Marketplace</a:t>
             </a:r>
           </a:p>
         </p:txBody>
@@ -33587,7 +33810,7 @@
             <p:ph sz="quarter" idx="10"/>
             <p:extLst>
               <p:ext uri="{D42A27DB-BD31-4B8C-83A1-F6EECF244321}">
-                <p14:modId xmlns:p14="http://schemas.microsoft.com/office/powerpoint/2010/main" val="541834131"/>
+                <p14:modId xmlns:p14="http://schemas.microsoft.com/office/powerpoint/2010/main" val="805655330"/>
               </p:ext>
             </p:extLst>
           </p:nvPr>
@@ -33686,7 +33909,7 @@
             <p:ph sz="quarter" idx="10"/>
             <p:extLst>
               <p:ext uri="{D42A27DB-BD31-4B8C-83A1-F6EECF244321}">
-                <p14:modId xmlns:p14="http://schemas.microsoft.com/office/powerpoint/2010/main" val="2261787843"/>
+                <p14:modId xmlns:p14="http://schemas.microsoft.com/office/powerpoint/2010/main" val="3857716844"/>
               </p:ext>
             </p:extLst>
           </p:nvPr>
@@ -34663,13 +34886,13 @@
               </a:tabLst>
             </a:pPr>
             <a:r>
-              <a:rPr lang="en-US" sz="1400">
+              <a:rPr lang="en-US" sz="1400" dirty="0">
                 <a:ea typeface="Calibri" panose="020F0502020204030204" pitchFamily="34" charset="0"/>
                 <a:cs typeface="Arial"/>
               </a:rPr>
-              <a:t>Accessing and navigating the Microsoft Azure Marketplace.</a:t>
+              <a:t>Accessing and navigating the Microsoft Marketplace.</a:t>
             </a:r>
-            <a:endParaRPr lang="en-US" sz="1400">
+            <a:endParaRPr lang="en-US" sz="1400" dirty="0">
               <a:effectLst/>
               <a:ea typeface="Calibri" panose="020F0502020204030204" pitchFamily="34" charset="0"/>
               <a:cs typeface="Arial"/>
@@ -34715,13 +34938,13 @@
               </a:tabLst>
             </a:pPr>
             <a:r>
-              <a:rPr lang="en-US" sz="1400">
+              <a:rPr lang="en-US" sz="1400" dirty="0">
                 <a:ea typeface="Calibri" panose="020F0502020204030204" pitchFamily="34" charset="0"/>
                 <a:cs typeface="Arial"/>
               </a:rPr>
-              <a:t>Searching and deploying solutions in the Microsoft Azure Marketplace.</a:t>
+              <a:t>Searching and deploying solutions in the Microsoft Marketplace.</a:t>
             </a:r>
-            <a:endParaRPr lang="en-US" sz="1400">
+            <a:endParaRPr lang="en-US" sz="1400" dirty="0">
               <a:effectLst/>
               <a:ea typeface="Calibri" panose="020F0502020204030204" pitchFamily="34" charset="0"/>
               <a:cs typeface="Arial" panose="020B0604020202020204" pitchFamily="34" charset="0"/>
@@ -34767,14 +34990,14 @@
               </a:tabLst>
             </a:pPr>
             <a:r>
-              <a:rPr lang="en-US" sz="1400">
+              <a:rPr lang="en-US" sz="1400" dirty="0">
                 <a:ea typeface="Calibri" panose="020F0502020204030204" pitchFamily="34" charset="0"/>
                 <a:cs typeface="Arial"/>
               </a:rPr>
-              <a:t>Integration of procurement applications into the Microsoft Azure Marketplace</a:t>
+              <a:t>Integration of procurement applications into the Microsoft Marketplace</a:t>
             </a:r>
             <a:r>
-              <a:rPr lang="en-US" sz="1400">
+              <a:rPr lang="en-US" sz="1400" dirty="0">
                 <a:effectLst/>
                 <a:ea typeface="Calibri" panose="020F0502020204030204" pitchFamily="34" charset="0"/>
                 <a:cs typeface="Arial"/>
@@ -34822,14 +35045,14 @@
               </a:tabLst>
             </a:pPr>
             <a:r>
-              <a:rPr lang="en-US" sz="1400">
+              <a:rPr lang="en-US" sz="1400" dirty="0">
                 <a:ea typeface="Calibri" panose="020F0502020204030204" pitchFamily="34" charset="0"/>
                 <a:cs typeface="Arial"/>
               </a:rPr>
-              <a:t>Microsoft Azure Marketplace governance and permissions</a:t>
+              <a:t>Microsoft Marketplace governance and permissions</a:t>
             </a:r>
             <a:r>
-              <a:rPr lang="en-US" sz="1400">
+              <a:rPr lang="en-US" sz="1400" dirty="0">
                 <a:effectLst/>
                 <a:ea typeface="Calibri" panose="020F0502020204030204" pitchFamily="34" charset="0"/>
                 <a:cs typeface="Arial"/>
@@ -36058,13 +36281,13 @@
             </a:lstStyle>
             <a:p>
               <a:r>
-                <a:rPr lang="en-US" sz="1800">
+                <a:rPr lang="en-US" sz="1800" dirty="0">
                   <a:solidFill>
                     <a:schemeClr val="tx1"/>
                   </a:solidFill>
                   <a:cs typeface="Segoe UI"/>
                 </a:rPr>
-                <a:t>Explain how to Integrate Azure Marketplace with Procurement Systems.</a:t>
+                <a:t>Explain how to enable SSO to Marketplace with Procurement Systems.</a:t>
               </a:r>
             </a:p>
           </p:txBody>
@@ -36166,9 +36389,9 @@
         <p:grpSpPr>
           <a:xfrm>
             <a:off x="3987847" y="2455846"/>
-            <a:ext cx="7621541" cy="276999"/>
+            <a:ext cx="7621541" cy="553998"/>
             <a:chOff x="3987847" y="2196868"/>
-            <a:chExt cx="7621541" cy="276999"/>
+            <a:chExt cx="7621541" cy="553998"/>
           </a:xfrm>
         </p:grpSpPr>
         <p:sp>
@@ -36186,7 +36409,7 @@
           <p:spPr>
             <a:xfrm>
               <a:off x="4214813" y="2196868"/>
-              <a:ext cx="7394575" cy="276999"/>
+              <a:ext cx="7394575" cy="553998"/>
             </a:xfrm>
             <a:prstGeom prst="rect">
               <a:avLst/>
@@ -36296,13 +36519,31 @@
             </a:lstStyle>
             <a:p>
               <a:r>
-                <a:rPr lang="en-US" sz="1800">
+                <a:rPr lang="en-US" sz="1800" dirty="0">
                   <a:solidFill>
                     <a:schemeClr val="tx1"/>
                   </a:solidFill>
                   <a:cs typeface="Segoe UI"/>
                 </a:rPr>
-                <a:t>Understand the ways to Integrate of Entra ID to Procurement Systems.</a:t>
+                <a:t>Understand the ways to enable of </a:t>
+              </a:r>
+              <a:r>
+                <a:rPr lang="en-US" sz="1800" dirty="0" err="1">
+                  <a:solidFill>
+                    <a:schemeClr val="tx1"/>
+                  </a:solidFill>
+                  <a:cs typeface="Segoe UI"/>
+                </a:rPr>
+                <a:t>Entra</a:t>
+              </a:r>
+              <a:r>
+                <a:rPr lang="en-US" sz="1800" dirty="0">
+                  <a:solidFill>
+                    <a:schemeClr val="tx1"/>
+                  </a:solidFill>
+                  <a:cs typeface="Segoe UI"/>
+                </a:rPr>
+                <a:t> ID authentication and authorization to Procurement Systems.</a:t>
               </a:r>
             </a:p>
           </p:txBody>
@@ -36403,7 +36644,7 @@
         </p:nvGrpSpPr>
         <p:grpSpPr>
           <a:xfrm>
-            <a:off x="3987847" y="3183349"/>
+            <a:off x="3987847" y="3351392"/>
             <a:ext cx="7621541" cy="276999"/>
             <a:chOff x="3987847" y="2730268"/>
             <a:chExt cx="7621541" cy="276999"/>
@@ -36534,7 +36775,7 @@
             </a:lstStyle>
             <a:p>
               <a:r>
-                <a:rPr lang="en-US" sz="1800">
+                <a:rPr lang="en-US" sz="1800" dirty="0">
                   <a:solidFill>
                     <a:schemeClr val="tx1"/>
                   </a:solidFill>
@@ -36543,13 +36784,13 @@
                 <a:t>How to </a:t>
               </a:r>
               <a:r>
-                <a:rPr lang="en-US" sz="1800">
+                <a:rPr lang="en-US" sz="1800" dirty="0">
                   <a:ea typeface="+mn-lt"/>
                   <a:cs typeface="+mn-lt"/>
                 </a:rPr>
-                <a:t>Set up a Private Azure Marketplace.</a:t>
+                <a:t>Set up a private Marketplace.</a:t>
               </a:r>
-              <a:endParaRPr lang="en-US" sz="1800">
+              <a:endParaRPr lang="en-US" sz="1800" dirty="0">
                 <a:solidFill>
                   <a:schemeClr val="tx1"/>
                 </a:solidFill>
@@ -36785,7 +37026,7 @@
             </a:lstStyle>
             <a:p>
               <a:r>
-                <a:rPr lang="en-US" sz="1800">
+                <a:rPr lang="en-US" sz="1800" dirty="0">
                   <a:solidFill>
                     <a:schemeClr val="tx1"/>
                   </a:solidFill>
@@ -36794,13 +37035,23 @@
                 <a:t>How to </a:t>
               </a:r>
               <a:r>
-                <a:rPr lang="en-US" sz="1800">
+                <a:rPr lang="en-US" sz="1800" dirty="0">
+                  <a:solidFill>
+                    <a:schemeClr val="tx1"/>
+                  </a:solidFill>
                   <a:ea typeface="+mn-lt"/>
                   <a:cs typeface="+mn-lt"/>
                 </a:rPr>
-                <a:t>Create purchasing permissions and resource limits. </a:t>
+                <a:t>c</a:t>
               </a:r>
-              <a:endParaRPr lang="en-US"/>
+              <a:r>
+                <a:rPr lang="en-US" sz="1800" dirty="0">
+                  <a:ea typeface="+mn-lt"/>
+                  <a:cs typeface="+mn-lt"/>
+                </a:rPr>
+                <a:t>reate purchasing permissions and resource limits. </a:t>
+              </a:r>
+              <a:endParaRPr lang="en-US" dirty="0"/>
             </a:p>
           </p:txBody>
         </p:sp>
@@ -38001,15 +38252,15 @@
           <a:lstStyle/>
           <a:p>
             <a:r>
-              <a:rPr lang="en-US">
+              <a:rPr lang="en-US" dirty="0">
                 <a:solidFill>
                   <a:srgbClr val="FFFFFF"/>
                 </a:solidFill>
                 <a:cs typeface="Segoe UI"/>
               </a:rPr>
-              <a:t>Day Two: Azure Marketplace procurement application integration and governance</a:t>
+              <a:t>Day Two: Marketplace procurement application integration and governance</a:t>
             </a:r>
-            <a:endParaRPr lang="en-US" altLang="zh-CN">
+            <a:endParaRPr lang="en-US" altLang="zh-CN" dirty="0">
               <a:solidFill>
                 <a:srgbClr val="FFFFFF"/>
               </a:solidFill>
@@ -38446,7 +38697,7 @@
           <p:nvPr>
             <p:extLst>
               <p:ext uri="{D42A27DB-BD31-4B8C-83A1-F6EECF244321}">
-                <p14:modId xmlns:p14="http://schemas.microsoft.com/office/powerpoint/2010/main" val="1014208434"/>
+                <p14:modId xmlns:p14="http://schemas.microsoft.com/office/powerpoint/2010/main" val="2431226382"/>
               </p:ext>
             </p:extLst>
           </p:nvPr>
@@ -38983,12 +39234,12 @@
                         <a:buNone/>
                       </a:pPr>
                       <a:r>
-                        <a:rPr lang="en-US" sz="1600">
+                        <a:rPr lang="en-US" sz="1600" dirty="0">
                           <a:solidFill>
                             <a:schemeClr val="tx2"/>
                           </a:solidFill>
                         </a:rPr>
-                        <a:t>What is Microsoft Azure Marketplace</a:t>
+                        <a:t>What is Microsoft Marketplace</a:t>
                       </a:r>
                     </a:p>
                   </a:txBody>
@@ -39175,12 +39426,12 @@
                     <a:p>
                       <a:pPr algn="l" fontAlgn="b"/>
                       <a:r>
-                        <a:rPr lang="en-US" sz="1600">
+                        <a:rPr lang="en-US" sz="1600" dirty="0">
                           <a:solidFill>
                             <a:schemeClr val="tx2"/>
                           </a:solidFill>
                         </a:rPr>
-                        <a:t>Purchasing in Azure Marketplace </a:t>
+                        <a:t>Purchasing in Marketplace </a:t>
                       </a:r>
                     </a:p>
                   </a:txBody>
@@ -39780,7 +40031,7 @@
                         <a:buNone/>
                       </a:pPr>
                       <a:r>
-                        <a:rPr lang="en-US" sz="1600" b="0" i="0" u="none" strike="noStrike" noProof="0">
+                        <a:rPr lang="en-US" sz="1600" b="0" i="0" u="none" strike="noStrike" noProof="0" dirty="0">
                           <a:solidFill>
                             <a:schemeClr val="tx2"/>
                           </a:solidFill>
@@ -39788,7 +40039,7 @@
                         </a:rPr>
                         <a:t>Wrap-up – General Channel </a:t>
                       </a:r>
-                      <a:endParaRPr lang="en-US" sz="1600" b="0" i="0" u="none" strike="noStrike" noProof="0">
+                      <a:endParaRPr lang="en-US" sz="1600" b="0" i="0" u="none" strike="noStrike" noProof="0" dirty="0">
                         <a:solidFill>
                           <a:srgbClr val="E6E6E6"/>
                         </a:solidFill>
@@ -39862,14 +40113,14 @@
           <p:nvPr>
             <p:extLst>
               <p:ext uri="{D42A27DB-BD31-4B8C-83A1-F6EECF244321}">
-                <p14:modId xmlns:p14="http://schemas.microsoft.com/office/powerpoint/2010/main" val="1498839789"/>
+                <p14:modId xmlns:p14="http://schemas.microsoft.com/office/powerpoint/2010/main" val="2643932422"/>
               </p:ext>
             </p:extLst>
           </p:nvPr>
         </p:nvGraphicFramePr>
         <p:xfrm>
           <a:off x="4027715" y="3242233"/>
-          <a:ext cx="8117153" cy="3493008"/>
+          <a:ext cx="8117153" cy="3005328"/>
         </p:xfrm>
         <a:graphic>
           <a:graphicData uri="http://schemas.openxmlformats.org/drawingml/2006/table">
@@ -40402,12 +40653,12 @@
                         <a:buNone/>
                       </a:pPr>
                       <a:r>
-                        <a:rPr lang="en-US" sz="1600">
+                        <a:rPr lang="en-US" sz="1600" dirty="0">
                           <a:solidFill>
                             <a:schemeClr val="tx2"/>
                           </a:solidFill>
                         </a:rPr>
-                        <a:t>Integrating Azure Marketplace with Procurement Systems</a:t>
+                        <a:t>Integrating Marketplace with Procurement Systems</a:t>
                       </a:r>
                     </a:p>
                   </a:txBody>
@@ -40612,12 +40863,12 @@
                     <a:p>
                       <a:pPr algn="l" fontAlgn="b"/>
                       <a:r>
-                        <a:rPr lang="en-US" sz="1600">
+                        <a:rPr lang="en-US" sz="1600" dirty="0">
                           <a:solidFill>
                             <a:schemeClr val="tx2"/>
                           </a:solidFill>
                         </a:rPr>
-                        <a:t>Lab – Integration of Entra ID to Procurement System (i.e. Ariba, Coupa, SNOW)</a:t>
+                        <a:t>Lab – </a:t>
                       </a:r>
                     </a:p>
                   </a:txBody>
@@ -41002,12 +41253,12 @@
                         <a:buNone/>
                       </a:pPr>
                       <a:r>
-                        <a:rPr lang="en-US" sz="1600">
+                        <a:rPr lang="en-US" sz="1600" dirty="0">
                           <a:solidFill>
                             <a:schemeClr val="tx2"/>
                           </a:solidFill>
                         </a:rPr>
-                        <a:t>Setting up a Private Azure Marketplace</a:t>
+                        <a:t>Setting up a private Azure Marketplace</a:t>
                       </a:r>
                     </a:p>
                   </a:txBody>
@@ -41196,7 +41447,7 @@
                         <a:buNone/>
                       </a:pPr>
                       <a:r>
-                        <a:rPr lang="en-US" sz="1600">
+                        <a:rPr lang="en-US" sz="1600" dirty="0">
                           <a:solidFill>
                             <a:schemeClr val="tx2"/>
                           </a:solidFill>
@@ -42648,8 +42899,8 @@
               <a:defRPr/>
             </a:pPr>
             <a:r>
-              <a:rPr lang="en-US"/>
-              <a:t>In this module, you’ll begin by learning how to connect procurement applications to Azure Marketplace.  You will also create a private Azure Marketplace and setup purchasing permissions.</a:t>
+              <a:rPr lang="en-US" dirty="0"/>
+              <a:t>In this module, you’ll begin by learning how to connect procurement applications to Marketplace.  You will also create a private Marketplace and setup purchasing permissions.</a:t>
             </a:r>
           </a:p>
         </p:txBody>
@@ -43010,27 +43261,10 @@
               <a:defRPr/>
             </a:pPr>
             <a:r>
-              <a:rPr lang="en-US" sz="1400"/>
-              <a:t>Integrate </a:t>
+              <a:rPr lang="en-US" sz="1400" dirty="0"/>
+              <a:t>Integrate Marketplace with Procurement Systems.</a:t>
             </a:r>
-            <a:r>
-              <a:rPr kumimoji="0" lang="en-US" sz="1400" b="0" i="0" u="none" strike="noStrike" kern="1200" cap="none" spc="0" normalizeH="0" baseline="0" noProof="0">
-                <a:ln>
-                  <a:noFill/>
-                </a:ln>
-                <a:effectLst/>
-                <a:uLnTx/>
-                <a:uFillTx/>
-                <a:ea typeface="+mn-ea"/>
-                <a:cs typeface="+mn-cs"/>
-              </a:rPr>
-              <a:t>Azure </a:t>
-            </a:r>
-            <a:r>
-              <a:rPr lang="en-US" sz="1400"/>
-              <a:t>Marketplace with Procurement Systems.</a:t>
-            </a:r>
-            <a:endParaRPr lang="en-US">
+            <a:endParaRPr lang="en-US" dirty="0">
               <a:ea typeface="+mn-ea"/>
               <a:cs typeface="+mn-cs"/>
             </a:endParaRPr>
@@ -43483,10 +43717,10 @@
               <a:defRPr/>
             </a:pPr>
             <a:r>
-              <a:rPr lang="en-US" sz="1400">
+              <a:rPr lang="en-US" sz="1400" dirty="0">
                 <a:cs typeface="Segoe UI"/>
               </a:rPr>
-              <a:t>Setting up a Private Azure Marketplace.</a:t>
+              <a:t>Setting up a private Marketplace.</a:t>
             </a:r>
           </a:p>
         </p:txBody>
@@ -43523,11 +43757,11 @@
               <a:defRPr/>
             </a:pPr>
             <a:r>
-              <a:rPr lang="en-US" sz="1400"/>
-              <a:t>Create purchasing permissions and resource limits</a:t>
+              <a:rPr lang="en-US" sz="1400" dirty="0"/>
+              <a:t>Create purchasing permissions and resource purchase limits</a:t>
             </a:r>
             <a:r>
-              <a:rPr kumimoji="0" lang="en-US" sz="1400" b="0" i="0" u="none" strike="noStrike" kern="1200" cap="none" spc="0" normalizeH="0" baseline="0" noProof="0">
+              <a:rPr kumimoji="0" lang="en-US" sz="1400" b="0" i="0" u="none" strike="noStrike" kern="1200" cap="none" spc="0" normalizeH="0" baseline="0" noProof="0" dirty="0">
                 <a:ln>
                   <a:noFill/>
                 </a:ln>
@@ -43539,7 +43773,7 @@
               </a:rPr>
               <a:t>.</a:t>
             </a:r>
-            <a:endParaRPr lang="en-US" sz="1400"/>
+            <a:endParaRPr lang="en-US" sz="1400" dirty="0"/>
           </a:p>
         </p:txBody>
       </p:sp>
@@ -46044,29 +46278,6 @@
 </file>
 
 <file path=customXml/item1.xml><?xml version="1.0" encoding="utf-8"?>
-<p:properties xmlns:p="http://schemas.microsoft.com/office/2006/metadata/properties" xmlns:xsi="http://www.w3.org/2001/XMLSchema-instance" xmlns:pc="http://schemas.microsoft.com/office/infopath/2007/PartnerControls">
-  <documentManagement>
-    <lcf76f155ced4ddcb4097134ff3c332f xmlns="ec9ab3cf-5ffc-4e23-9951-e59f1d4d2772">
-      <Terms xmlns="http://schemas.microsoft.com/office/infopath/2007/PartnerControls"/>
-    </lcf76f155ced4ddcb4097134ff3c332f>
-    <Credits xmlns="ec9ab3cf-5ffc-4e23-9951-e59f1d4d2772" xsi:nil="true"/>
-    <Audience xmlns="ec9ab3cf-5ffc-4e23-9951-e59f1d4d2772" xsi:nil="true"/>
-    <TaxCatchAll xmlns="df7f103e-597c-493b-bc31-914106b908e0" xsi:nil="true"/>
-    <OverallScore xmlns="ec9ab3cf-5ffc-4e23-9951-e59f1d4d2772" xsi:nil="true"/>
-  </documentManagement>
-</p:properties>
-</file>
-
-<file path=customXml/item2.xml><?xml version="1.0" encoding="utf-8"?>
-<?mso-contentType ?>
-<FormTemplates xmlns="http://schemas.microsoft.com/sharepoint/v3/contenttype/forms">
-  <Display>DocumentLibraryForm</Display>
-  <Edit>DocumentLibraryForm</Edit>
-  <New>DocumentLibraryForm</New>
-</FormTemplates>
-</file>
-
-<file path=customXml/item3.xml><?xml version="1.0" encoding="utf-8"?>
 <ct:contentTypeSchema xmlns:ct="http://schemas.microsoft.com/office/2006/metadata/contentType" xmlns:ma="http://schemas.microsoft.com/office/2006/metadata/properties/metaAttributes" ct:_="" ma:_="" ma:contentTypeName="Document" ma:contentTypeID="0x010100F9AA89542497BB44B17EFF15C96C765B" ma:contentTypeVersion="22" ma:contentTypeDescription="Create a new document." ma:contentTypeScope="" ma:versionID="c9e3a3a2a1871a01c0bb174ddf2a8ada">
   <xsd:schema xmlns:xsd="http://www.w3.org/2001/XMLSchema" xmlns:xs="http://www.w3.org/2001/XMLSchema" xmlns:p="http://schemas.microsoft.com/office/2006/metadata/properties" xmlns:ns2="ec9ab3cf-5ffc-4e23-9951-e59f1d4d2772" xmlns:ns3="df7f103e-597c-493b-bc31-914106b908e0" targetNamespace="http://schemas.microsoft.com/office/2006/metadata/properties" ma:root="true" ma:fieldsID="9b3649dff5115b20f453b846654cb8f9" ns2:_="" ns3:_="">
     <xsd:import namespace="ec9ab3cf-5ffc-4e23-9951-e59f1d4d2772"/>
@@ -46356,26 +46567,30 @@
 </ct:contentTypeSchema>
 </file>
 
-<file path=customXml/itemProps1.xml><?xml version="1.0" encoding="utf-8"?>
-<ds:datastoreItem xmlns:ds="http://schemas.openxmlformats.org/officeDocument/2006/customXml" ds:itemID="{EDCB3B52-9508-4A63-AFCC-05E7630C15CA}">
-  <ds:schemaRefs>
-    <ds:schemaRef ds:uri="df7f103e-597c-493b-bc31-914106b908e0"/>
-    <ds:schemaRef ds:uri="ec9ab3cf-5ffc-4e23-9951-e59f1d4d2772"/>
-    <ds:schemaRef ds:uri="http://schemas.microsoft.com/office/2006/metadata/properties"/>
-    <ds:schemaRef ds:uri="http://schemas.microsoft.com/office/infopath/2007/PartnerControls"/>
-  </ds:schemaRefs>
-</ds:datastoreItem>
+<file path=customXml/item2.xml><?xml version="1.0" encoding="utf-8"?>
+<?mso-contentType ?>
+<FormTemplates xmlns="http://schemas.microsoft.com/sharepoint/v3/contenttype/forms">
+  <Display>DocumentLibraryForm</Display>
+  <Edit>DocumentLibraryForm</Edit>
+  <New>DocumentLibraryForm</New>
+</FormTemplates>
 </file>
 
-<file path=customXml/itemProps2.xml><?xml version="1.0" encoding="utf-8"?>
-<ds:datastoreItem xmlns:ds="http://schemas.openxmlformats.org/officeDocument/2006/customXml" ds:itemID="{08B55F93-F793-45E6-8EF9-B02CA25D11D4}">
-  <ds:schemaRefs>
-    <ds:schemaRef ds:uri="http://schemas.microsoft.com/sharepoint/v3/contenttype/forms"/>
-  </ds:schemaRefs>
-</ds:datastoreItem>
+<file path=customXml/item3.xml><?xml version="1.0" encoding="utf-8"?>
+<p:properties xmlns:p="http://schemas.microsoft.com/office/2006/metadata/properties" xmlns:xsi="http://www.w3.org/2001/XMLSchema-instance" xmlns:pc="http://schemas.microsoft.com/office/infopath/2007/PartnerControls">
+  <documentManagement>
+    <lcf76f155ced4ddcb4097134ff3c332f xmlns="ec9ab3cf-5ffc-4e23-9951-e59f1d4d2772">
+      <Terms xmlns="http://schemas.microsoft.com/office/infopath/2007/PartnerControls"/>
+    </lcf76f155ced4ddcb4097134ff3c332f>
+    <Credits xmlns="ec9ab3cf-5ffc-4e23-9951-e59f1d4d2772" xsi:nil="true"/>
+    <Audience xmlns="ec9ab3cf-5ffc-4e23-9951-e59f1d4d2772" xsi:nil="true"/>
+    <TaxCatchAll xmlns="df7f103e-597c-493b-bc31-914106b908e0" xsi:nil="true"/>
+    <OverallScore xmlns="ec9ab3cf-5ffc-4e23-9951-e59f1d4d2772" xsi:nil="true"/>
+  </documentManagement>
+</p:properties>
 </file>
 
-<file path=customXml/itemProps3.xml><?xml version="1.0" encoding="utf-8"?>
+<file path=customXml/itemProps1.xml><?xml version="1.0" encoding="utf-8"?>
 <ds:datastoreItem xmlns:ds="http://schemas.openxmlformats.org/officeDocument/2006/customXml" ds:itemID="{C5DC1468-2D5A-4AF4-B6A1-FA3F00E879EA}">
   <ds:schemaRefs>
     <ds:schemaRef ds:uri="df7f103e-597c-493b-bc31-914106b908e0"/>
@@ -46394,6 +46609,25 @@
 </ds:datastoreItem>
 </file>
 
+<file path=customXml/itemProps2.xml><?xml version="1.0" encoding="utf-8"?>
+<ds:datastoreItem xmlns:ds="http://schemas.openxmlformats.org/officeDocument/2006/customXml" ds:itemID="{08B55F93-F793-45E6-8EF9-B02CA25D11D4}">
+  <ds:schemaRefs>
+    <ds:schemaRef ds:uri="http://schemas.microsoft.com/sharepoint/v3/contenttype/forms"/>
+  </ds:schemaRefs>
+</ds:datastoreItem>
+</file>
+
+<file path=customXml/itemProps3.xml><?xml version="1.0" encoding="utf-8"?>
+<ds:datastoreItem xmlns:ds="http://schemas.openxmlformats.org/officeDocument/2006/customXml" ds:itemID="{EDCB3B52-9508-4A63-AFCC-05E7630C15CA}">
+  <ds:schemaRefs>
+    <ds:schemaRef ds:uri="df7f103e-597c-493b-bc31-914106b908e0"/>
+    <ds:schemaRef ds:uri="ec9ab3cf-5ffc-4e23-9951-e59f1d4d2772"/>
+    <ds:schemaRef ds:uri="http://schemas.microsoft.com/office/2006/metadata/properties"/>
+    <ds:schemaRef ds:uri="http://schemas.microsoft.com/office/infopath/2007/PartnerControls"/>
+  </ds:schemaRefs>
+</ds:datastoreItem>
+</file>
+
 <file path=docMetadata/LabelInfo.xml><?xml version="1.0" encoding="utf-8"?>
 <clbl:labelList xmlns:clbl="http://schemas.microsoft.com/office/2020/mipLabelMetadata">
   <clbl:label id="{f42aa342-8706-4288-bd11-ebb85995028c}" enabled="1" method="Standard" siteId="{72f988bf-86f1-41af-91ab-2d7cd011db47}" contentBits="0" removed="0"/>

</xml_diff>